<commit_message>
Adds pathfinder(), changes function order, implements <object>
</commit_message>
<xml_diff>
--- a/3 Entwicklungsphase/weekly_meeting_10.pptx
+++ b/3 Entwicklungsphase/weekly_meeting_10.pptx
@@ -269,7 +269,7 @@
           <a:p>
             <a:fld id="{7E2CC3E8-F4D3-4BD0-85C9-D1B5AC4917BD}" type="datetimeFigureOut">
               <a:rPr lang="en-US" smtClean="0"/>
-              <a:t>6/13/2018</a:t>
+              <a:t>6/18/2018</a:t>
             </a:fld>
             <a:endParaRPr lang="en-US"/>
           </a:p>
@@ -323,7 +323,7 @@
           <a:p>
             <a:fld id="{99293C7F-59EB-4A3A-A30C-171723B2F31C}" type="slidenum">
               <a:rPr lang="en-US" smtClean="0"/>
-              <a:t>‹Nr.›</a:t>
+              <a:t>‹#›</a:t>
             </a:fld>
             <a:endParaRPr lang="en-US"/>
           </a:p>
@@ -467,7 +467,7 @@
           <a:p>
             <a:fld id="{7E2CC3E8-F4D3-4BD0-85C9-D1B5AC4917BD}" type="datetimeFigureOut">
               <a:rPr lang="en-US" smtClean="0"/>
-              <a:t>6/13/2018</a:t>
+              <a:t>6/18/2018</a:t>
             </a:fld>
             <a:endParaRPr lang="en-US"/>
           </a:p>
@@ -521,7 +521,7 @@
           <a:p>
             <a:fld id="{99293C7F-59EB-4A3A-A30C-171723B2F31C}" type="slidenum">
               <a:rPr lang="en-US" smtClean="0"/>
-              <a:t>‹Nr.›</a:t>
+              <a:t>‹#›</a:t>
             </a:fld>
             <a:endParaRPr lang="en-US"/>
           </a:p>
@@ -675,7 +675,7 @@
           <a:p>
             <a:fld id="{7E2CC3E8-F4D3-4BD0-85C9-D1B5AC4917BD}" type="datetimeFigureOut">
               <a:rPr lang="en-US" smtClean="0"/>
-              <a:t>6/13/2018</a:t>
+              <a:t>6/18/2018</a:t>
             </a:fld>
             <a:endParaRPr lang="en-US"/>
           </a:p>
@@ -729,7 +729,7 @@
           <a:p>
             <a:fld id="{99293C7F-59EB-4A3A-A30C-171723B2F31C}" type="slidenum">
               <a:rPr lang="en-US" smtClean="0"/>
-              <a:t>‹Nr.›</a:t>
+              <a:t>‹#›</a:t>
             </a:fld>
             <a:endParaRPr lang="en-US"/>
           </a:p>
@@ -873,7 +873,7 @@
           <a:p>
             <a:fld id="{7E2CC3E8-F4D3-4BD0-85C9-D1B5AC4917BD}" type="datetimeFigureOut">
               <a:rPr lang="en-US" smtClean="0"/>
-              <a:t>6/13/2018</a:t>
+              <a:t>6/18/2018</a:t>
             </a:fld>
             <a:endParaRPr lang="en-US"/>
           </a:p>
@@ -927,7 +927,7 @@
           <a:p>
             <a:fld id="{99293C7F-59EB-4A3A-A30C-171723B2F31C}" type="slidenum">
               <a:rPr lang="en-US" smtClean="0"/>
-              <a:t>‹Nr.›</a:t>
+              <a:t>‹#›</a:t>
             </a:fld>
             <a:endParaRPr lang="en-US"/>
           </a:p>
@@ -1148,7 +1148,7 @@
           <a:p>
             <a:fld id="{7E2CC3E8-F4D3-4BD0-85C9-D1B5AC4917BD}" type="datetimeFigureOut">
               <a:rPr lang="en-US" smtClean="0"/>
-              <a:t>6/13/2018</a:t>
+              <a:t>6/18/2018</a:t>
             </a:fld>
             <a:endParaRPr lang="en-US"/>
           </a:p>
@@ -1202,7 +1202,7 @@
           <a:p>
             <a:fld id="{99293C7F-59EB-4A3A-A30C-171723B2F31C}" type="slidenum">
               <a:rPr lang="en-US" smtClean="0"/>
-              <a:t>‹Nr.›</a:t>
+              <a:t>‹#›</a:t>
             </a:fld>
             <a:endParaRPr lang="en-US"/>
           </a:p>
@@ -1413,7 +1413,7 @@
           <a:p>
             <a:fld id="{7E2CC3E8-F4D3-4BD0-85C9-D1B5AC4917BD}" type="datetimeFigureOut">
               <a:rPr lang="en-US" smtClean="0"/>
-              <a:t>6/13/2018</a:t>
+              <a:t>6/18/2018</a:t>
             </a:fld>
             <a:endParaRPr lang="en-US"/>
           </a:p>
@@ -1467,7 +1467,7 @@
           <a:p>
             <a:fld id="{99293C7F-59EB-4A3A-A30C-171723B2F31C}" type="slidenum">
               <a:rPr lang="en-US" smtClean="0"/>
-              <a:t>‹Nr.›</a:t>
+              <a:t>‹#›</a:t>
             </a:fld>
             <a:endParaRPr lang="en-US"/>
           </a:p>
@@ -1825,7 +1825,7 @@
           <a:p>
             <a:fld id="{7E2CC3E8-F4D3-4BD0-85C9-D1B5AC4917BD}" type="datetimeFigureOut">
               <a:rPr lang="en-US" smtClean="0"/>
-              <a:t>6/13/2018</a:t>
+              <a:t>6/18/2018</a:t>
             </a:fld>
             <a:endParaRPr lang="en-US"/>
           </a:p>
@@ -1879,7 +1879,7 @@
           <a:p>
             <a:fld id="{99293C7F-59EB-4A3A-A30C-171723B2F31C}" type="slidenum">
               <a:rPr lang="en-US" smtClean="0"/>
-              <a:t>‹Nr.›</a:t>
+              <a:t>‹#›</a:t>
             </a:fld>
             <a:endParaRPr lang="en-US"/>
           </a:p>
@@ -1966,7 +1966,7 @@
           <a:p>
             <a:fld id="{7E2CC3E8-F4D3-4BD0-85C9-D1B5AC4917BD}" type="datetimeFigureOut">
               <a:rPr lang="en-US" smtClean="0"/>
-              <a:t>6/13/2018</a:t>
+              <a:t>6/18/2018</a:t>
             </a:fld>
             <a:endParaRPr lang="en-US"/>
           </a:p>
@@ -2020,7 +2020,7 @@
           <a:p>
             <a:fld id="{99293C7F-59EB-4A3A-A30C-171723B2F31C}" type="slidenum">
               <a:rPr lang="en-US" smtClean="0"/>
-              <a:t>‹Nr.›</a:t>
+              <a:t>‹#›</a:t>
             </a:fld>
             <a:endParaRPr lang="en-US"/>
           </a:p>
@@ -2079,7 +2079,7 @@
           <a:p>
             <a:fld id="{7E2CC3E8-F4D3-4BD0-85C9-D1B5AC4917BD}" type="datetimeFigureOut">
               <a:rPr lang="en-US" smtClean="0"/>
-              <a:t>6/13/2018</a:t>
+              <a:t>6/18/2018</a:t>
             </a:fld>
             <a:endParaRPr lang="en-US"/>
           </a:p>
@@ -2133,7 +2133,7 @@
           <a:p>
             <a:fld id="{99293C7F-59EB-4A3A-A30C-171723B2F31C}" type="slidenum">
               <a:rPr lang="en-US" smtClean="0"/>
-              <a:t>‹Nr.›</a:t>
+              <a:t>‹#›</a:t>
             </a:fld>
             <a:endParaRPr lang="en-US"/>
           </a:p>
@@ -2390,7 +2390,7 @@
           <a:p>
             <a:fld id="{7E2CC3E8-F4D3-4BD0-85C9-D1B5AC4917BD}" type="datetimeFigureOut">
               <a:rPr lang="en-US" smtClean="0"/>
-              <a:t>6/13/2018</a:t>
+              <a:t>6/18/2018</a:t>
             </a:fld>
             <a:endParaRPr lang="en-US"/>
           </a:p>
@@ -2444,7 +2444,7 @@
           <a:p>
             <a:fld id="{99293C7F-59EB-4A3A-A30C-171723B2F31C}" type="slidenum">
               <a:rPr lang="en-US" smtClean="0"/>
-              <a:t>‹Nr.›</a:t>
+              <a:t>‹#›</a:t>
             </a:fld>
             <a:endParaRPr lang="en-US"/>
           </a:p>
@@ -2678,7 +2678,7 @@
           <a:p>
             <a:fld id="{7E2CC3E8-F4D3-4BD0-85C9-D1B5AC4917BD}" type="datetimeFigureOut">
               <a:rPr lang="en-US" smtClean="0"/>
-              <a:t>6/13/2018</a:t>
+              <a:t>6/18/2018</a:t>
             </a:fld>
             <a:endParaRPr lang="en-US"/>
           </a:p>
@@ -2732,7 +2732,7 @@
           <a:p>
             <a:fld id="{99293C7F-59EB-4A3A-A30C-171723B2F31C}" type="slidenum">
               <a:rPr lang="en-US" smtClean="0"/>
-              <a:t>‹Nr.›</a:t>
+              <a:t>‹#›</a:t>
             </a:fld>
             <a:endParaRPr lang="en-US"/>
           </a:p>
@@ -2919,7 +2919,7 @@
           <a:p>
             <a:fld id="{7E2CC3E8-F4D3-4BD0-85C9-D1B5AC4917BD}" type="datetimeFigureOut">
               <a:rPr lang="en-US" smtClean="0"/>
-              <a:t>6/13/2018</a:t>
+              <a:t>6/18/2018</a:t>
             </a:fld>
             <a:endParaRPr lang="en-US"/>
           </a:p>
@@ -3009,7 +3009,7 @@
           <a:p>
             <a:fld id="{99293C7F-59EB-4A3A-A30C-171723B2F31C}" type="slidenum">
               <a:rPr lang="en-US" smtClean="0"/>
-              <a:t>‹Nr.›</a:t>
+              <a:t>‹#›</a:t>
             </a:fld>
             <a:endParaRPr lang="en-US"/>
           </a:p>
@@ -3406,25 +3406,8 @@
                   </a:schemeClr>
                 </a:solidFill>
               </a:rPr>
-              <a:t>Weekly Meeting </a:t>
-            </a:r>
-            <a:r>
-              <a:rPr lang="en-US" b="1" dirty="0" smtClean="0">
-                <a:solidFill>
-                  <a:schemeClr val="bg1">
-                    <a:lumMod val="50000"/>
-                  </a:schemeClr>
-                </a:solidFill>
-              </a:rPr>
-              <a:t>10</a:t>
-            </a:r>
-            <a:endParaRPr lang="en-US" b="1" dirty="0">
-              <a:solidFill>
-                <a:schemeClr val="bg1">
-                  <a:lumMod val="50000"/>
-                </a:schemeClr>
-              </a:solidFill>
-            </a:endParaRPr>
+              <a:t>Weekly Meeting 10</a:t>
+            </a:r>
           </a:p>
           <a:p>
             <a:endParaRPr lang="en-US" b="1" dirty="0">
@@ -3646,17 +3629,7 @@
                   </a:schemeClr>
                 </a:solidFill>
               </a:rPr>
-              <a:t>Weekly Sprint </a:t>
-            </a:r>
-            <a:r>
-              <a:rPr lang="en-US" sz="1600" b="1" dirty="0" smtClean="0">
-                <a:solidFill>
-                  <a:schemeClr val="bg1">
-                    <a:lumMod val="50000"/>
-                  </a:schemeClr>
-                </a:solidFill>
-              </a:rPr>
-              <a:t>10</a:t>
+              <a:t>Weekly Sprint 10</a:t>
             </a:r>
             <a:endParaRPr lang="en-US" sz="3200" dirty="0">
               <a:solidFill>
@@ -4018,25 +3991,8 @@
                   </a:schemeClr>
                 </a:solidFill>
               </a:rPr>
-              <a:t>Overview of tasks: Week </a:t>
-            </a:r>
-            <a:r>
-              <a:rPr lang="en-US" sz="1600" b="1" dirty="0">
-                <a:solidFill>
-                  <a:schemeClr val="bg1">
-                    <a:lumMod val="50000"/>
-                  </a:schemeClr>
-                </a:solidFill>
-              </a:rPr>
-              <a:t>10</a:t>
-            </a:r>
-            <a:endParaRPr lang="en-US" sz="1600" b="1" dirty="0">
-              <a:solidFill>
-                <a:schemeClr val="bg1">
-                  <a:lumMod val="50000"/>
-                </a:schemeClr>
-              </a:solidFill>
-            </a:endParaRPr>
+              <a:t>Overview of tasks: Week 10</a:t>
+            </a:r>
           </a:p>
         </p:txBody>
       </p:sp>
@@ -4168,7 +4124,7 @@
           <a:lstStyle/>
           <a:p>
             <a:r>
-              <a:rPr lang="de-DE" sz="8000" dirty="0" smtClean="0">
+              <a:rPr lang="de-DE" sz="8000" dirty="0">
                 <a:solidFill>
                   <a:srgbClr val="FF0000"/>
                 </a:solidFill>
@@ -4277,7 +4233,7 @@
               <a:t> of tasks: Week </a:t>
             </a:r>
             <a:r>
-              <a:rPr lang="en-US" sz="1600" b="1" dirty="0" smtClean="0">
+              <a:rPr lang="en-US" sz="1600" b="1" dirty="0">
                 <a:solidFill>
                   <a:schemeClr val="bg1">
                     <a:lumMod val="50000"/>
@@ -4286,13 +4242,6 @@
               </a:rPr>
               <a:t>10</a:t>
             </a:r>
-            <a:endParaRPr lang="en-US" sz="1600" b="1" dirty="0">
-              <a:solidFill>
-                <a:schemeClr val="bg1">
-                  <a:lumMod val="50000"/>
-                </a:schemeClr>
-              </a:solidFill>
-            </a:endParaRPr>
           </a:p>
         </p:txBody>
       </p:sp>
@@ -4497,7 +4446,7 @@
           <a:lstStyle/>
           <a:p>
             <a:r>
-              <a:rPr lang="de-DE" sz="8000" dirty="0" smtClean="0">
+              <a:rPr lang="de-DE" sz="8000" dirty="0">
                 <a:solidFill>
                   <a:srgbClr val="FF0000"/>
                 </a:solidFill>
@@ -4621,14 +4570,6 @@
               </a:rPr>
               <a:t>Boardlet</a:t>
             </a:r>
-            <a:r>
-              <a:rPr lang="en-US" sz="3200" b="1" dirty="0">
-                <a:solidFill>
-                  <a:srgbClr val="339966"/>
-                </a:solidFill>
-              </a:rPr>
-              <a:t/>
-            </a:r>
             <a:br>
               <a:rPr lang="en-US" sz="3200" b="1" dirty="0">
                 <a:solidFill>
@@ -4644,17 +4585,7 @@
                   </a:schemeClr>
                 </a:solidFill>
               </a:rPr>
-              <a:t>Weekly Sprint </a:t>
-            </a:r>
-            <a:r>
-              <a:rPr lang="en-US" sz="1600" b="1" dirty="0" smtClean="0">
-                <a:solidFill>
-                  <a:schemeClr val="bg1">
-                    <a:lumMod val="50000"/>
-                  </a:schemeClr>
-                </a:solidFill>
-              </a:rPr>
-              <a:t>10</a:t>
+              <a:t>Weekly Sprint 10</a:t>
             </a:r>
             <a:endParaRPr lang="en-US" sz="3200" dirty="0">
               <a:solidFill>
@@ -5209,7 +5140,7 @@
           <a:lstStyle/>
           <a:p>
             <a:r>
-              <a:rPr lang="de-DE" sz="8000" dirty="0" smtClean="0">
+              <a:rPr lang="de-DE" sz="8000" dirty="0">
                 <a:solidFill>
                   <a:srgbClr val="FF0000"/>
                 </a:solidFill>
@@ -5305,25 +5236,8 @@
                   </a:schemeClr>
                 </a:solidFill>
               </a:rPr>
-              <a:t>Overview of tasks: Week </a:t>
-            </a:r>
-            <a:r>
-              <a:rPr lang="en-US" sz="1600" b="1" dirty="0">
-                <a:solidFill>
-                  <a:schemeClr val="bg1">
-                    <a:lumMod val="50000"/>
-                  </a:schemeClr>
-                </a:solidFill>
-              </a:rPr>
-              <a:t>10 </a:t>
-            </a:r>
-            <a:endParaRPr lang="en-US" sz="1600" b="1" dirty="0">
-              <a:solidFill>
-                <a:schemeClr val="bg1">
-                  <a:lumMod val="50000"/>
-                </a:schemeClr>
-              </a:solidFill>
-            </a:endParaRPr>
+              <a:t>Overview of tasks: Week 10 </a:t>
+            </a:r>
           </a:p>
         </p:txBody>
       </p:sp>
@@ -5620,7 +5534,7 @@
           <a:lstStyle/>
           <a:p>
             <a:r>
-              <a:rPr lang="de-DE" sz="8000" dirty="0" smtClean="0">
+              <a:rPr lang="de-DE" sz="8000" dirty="0">
                 <a:solidFill>
                   <a:srgbClr val="FF0000"/>
                 </a:solidFill>
@@ -5738,14 +5652,6 @@
               </a:rPr>
               <a:t>Boardlet</a:t>
             </a:r>
-            <a:r>
-              <a:rPr lang="en-US" sz="3200" b="1" dirty="0">
-                <a:solidFill>
-                  <a:srgbClr val="339966"/>
-                </a:solidFill>
-              </a:rPr>
-              <a:t/>
-            </a:r>
             <a:br>
               <a:rPr lang="en-US" sz="3200" b="1" dirty="0">
                 <a:solidFill>
@@ -5761,17 +5667,7 @@
                   </a:schemeClr>
                 </a:solidFill>
               </a:rPr>
-              <a:t>Weekly Sprint </a:t>
-            </a:r>
-            <a:r>
-              <a:rPr lang="en-US" sz="1600" b="1" dirty="0">
-                <a:solidFill>
-                  <a:schemeClr val="bg1">
-                    <a:lumMod val="50000"/>
-                  </a:schemeClr>
-                </a:solidFill>
-              </a:rPr>
-              <a:t>10</a:t>
+              <a:t>Weekly Sprint 10</a:t>
             </a:r>
             <a:endParaRPr lang="en-US" sz="3200" dirty="0">
               <a:solidFill>
@@ -6524,7 +6420,7 @@
           <a:lstStyle/>
           <a:p>
             <a:r>
-              <a:rPr lang="de-DE" sz="8000" dirty="0" smtClean="0">
+              <a:rPr lang="de-DE" sz="8000" dirty="0">
                 <a:solidFill>
                   <a:srgbClr val="FF0000"/>
                 </a:solidFill>

</xml_diff>

<commit_message>
Minor changes to pid-boardlet.js
</commit_message>
<xml_diff>
--- a/3 Entwicklungsphase/weekly_meeting_10.pptx
+++ b/3 Entwicklungsphase/weekly_meeting_10.pptx
@@ -6,16 +6,16 @@
   </p:sldMasterIdLst>
   <p:sldIdLst>
     <p:sldId id="256" r:id="rId2"/>
-    <p:sldId id="263" r:id="rId3"/>
-    <p:sldId id="266" r:id="rId4"/>
+    <p:sldId id="276" r:id="rId3"/>
+    <p:sldId id="277" r:id="rId4"/>
     <p:sldId id="269" r:id="rId5"/>
     <p:sldId id="267" r:id="rId6"/>
     <p:sldId id="270" r:id="rId7"/>
     <p:sldId id="273" r:id="rId8"/>
-    <p:sldId id="275" r:id="rId9"/>
-    <p:sldId id="274" r:id="rId10"/>
-    <p:sldId id="272" r:id="rId11"/>
-    <p:sldId id="271" r:id="rId12"/>
+    <p:sldId id="274" r:id="rId9"/>
+    <p:sldId id="272" r:id="rId10"/>
+    <p:sldId id="271" r:id="rId11"/>
+    <p:sldId id="263" r:id="rId12"/>
   </p:sldIdLst>
   <p:sldSz cx="12192000" cy="6858000"/>
   <p:notesSz cx="6858000" cy="9144000"/>
@@ -269,7 +269,7 @@
           <a:p>
             <a:fld id="{7E2CC3E8-F4D3-4BD0-85C9-D1B5AC4917BD}" type="datetimeFigureOut">
               <a:rPr lang="en-US" smtClean="0"/>
-              <a:t>6/18/2018</a:t>
+              <a:t>6/19/2018</a:t>
             </a:fld>
             <a:endParaRPr lang="en-US"/>
           </a:p>
@@ -323,7 +323,7 @@
           <a:p>
             <a:fld id="{99293C7F-59EB-4A3A-A30C-171723B2F31C}" type="slidenum">
               <a:rPr lang="en-US" smtClean="0"/>
-              <a:t>‹#›</a:t>
+              <a:t>‹Nr.›</a:t>
             </a:fld>
             <a:endParaRPr lang="en-US"/>
           </a:p>
@@ -467,7 +467,7 @@
           <a:p>
             <a:fld id="{7E2CC3E8-F4D3-4BD0-85C9-D1B5AC4917BD}" type="datetimeFigureOut">
               <a:rPr lang="en-US" smtClean="0"/>
-              <a:t>6/18/2018</a:t>
+              <a:t>6/19/2018</a:t>
             </a:fld>
             <a:endParaRPr lang="en-US"/>
           </a:p>
@@ -521,7 +521,7 @@
           <a:p>
             <a:fld id="{99293C7F-59EB-4A3A-A30C-171723B2F31C}" type="slidenum">
               <a:rPr lang="en-US" smtClean="0"/>
-              <a:t>‹#›</a:t>
+              <a:t>‹Nr.›</a:t>
             </a:fld>
             <a:endParaRPr lang="en-US"/>
           </a:p>
@@ -675,7 +675,7 @@
           <a:p>
             <a:fld id="{7E2CC3E8-F4D3-4BD0-85C9-D1B5AC4917BD}" type="datetimeFigureOut">
               <a:rPr lang="en-US" smtClean="0"/>
-              <a:t>6/18/2018</a:t>
+              <a:t>6/19/2018</a:t>
             </a:fld>
             <a:endParaRPr lang="en-US"/>
           </a:p>
@@ -729,7 +729,7 @@
           <a:p>
             <a:fld id="{99293C7F-59EB-4A3A-A30C-171723B2F31C}" type="slidenum">
               <a:rPr lang="en-US" smtClean="0"/>
-              <a:t>‹#›</a:t>
+              <a:t>‹Nr.›</a:t>
             </a:fld>
             <a:endParaRPr lang="en-US"/>
           </a:p>
@@ -873,7 +873,7 @@
           <a:p>
             <a:fld id="{7E2CC3E8-F4D3-4BD0-85C9-D1B5AC4917BD}" type="datetimeFigureOut">
               <a:rPr lang="en-US" smtClean="0"/>
-              <a:t>6/18/2018</a:t>
+              <a:t>6/19/2018</a:t>
             </a:fld>
             <a:endParaRPr lang="en-US"/>
           </a:p>
@@ -927,7 +927,7 @@
           <a:p>
             <a:fld id="{99293C7F-59EB-4A3A-A30C-171723B2F31C}" type="slidenum">
               <a:rPr lang="en-US" smtClean="0"/>
-              <a:t>‹#›</a:t>
+              <a:t>‹Nr.›</a:t>
             </a:fld>
             <a:endParaRPr lang="en-US"/>
           </a:p>
@@ -1148,7 +1148,7 @@
           <a:p>
             <a:fld id="{7E2CC3E8-F4D3-4BD0-85C9-D1B5AC4917BD}" type="datetimeFigureOut">
               <a:rPr lang="en-US" smtClean="0"/>
-              <a:t>6/18/2018</a:t>
+              <a:t>6/19/2018</a:t>
             </a:fld>
             <a:endParaRPr lang="en-US"/>
           </a:p>
@@ -1202,7 +1202,7 @@
           <a:p>
             <a:fld id="{99293C7F-59EB-4A3A-A30C-171723B2F31C}" type="slidenum">
               <a:rPr lang="en-US" smtClean="0"/>
-              <a:t>‹#›</a:t>
+              <a:t>‹Nr.›</a:t>
             </a:fld>
             <a:endParaRPr lang="en-US"/>
           </a:p>
@@ -1413,7 +1413,7 @@
           <a:p>
             <a:fld id="{7E2CC3E8-F4D3-4BD0-85C9-D1B5AC4917BD}" type="datetimeFigureOut">
               <a:rPr lang="en-US" smtClean="0"/>
-              <a:t>6/18/2018</a:t>
+              <a:t>6/19/2018</a:t>
             </a:fld>
             <a:endParaRPr lang="en-US"/>
           </a:p>
@@ -1467,7 +1467,7 @@
           <a:p>
             <a:fld id="{99293C7F-59EB-4A3A-A30C-171723B2F31C}" type="slidenum">
               <a:rPr lang="en-US" smtClean="0"/>
-              <a:t>‹#›</a:t>
+              <a:t>‹Nr.›</a:t>
             </a:fld>
             <a:endParaRPr lang="en-US"/>
           </a:p>
@@ -1825,7 +1825,7 @@
           <a:p>
             <a:fld id="{7E2CC3E8-F4D3-4BD0-85C9-D1B5AC4917BD}" type="datetimeFigureOut">
               <a:rPr lang="en-US" smtClean="0"/>
-              <a:t>6/18/2018</a:t>
+              <a:t>6/19/2018</a:t>
             </a:fld>
             <a:endParaRPr lang="en-US"/>
           </a:p>
@@ -1879,7 +1879,7 @@
           <a:p>
             <a:fld id="{99293C7F-59EB-4A3A-A30C-171723B2F31C}" type="slidenum">
               <a:rPr lang="en-US" smtClean="0"/>
-              <a:t>‹#›</a:t>
+              <a:t>‹Nr.›</a:t>
             </a:fld>
             <a:endParaRPr lang="en-US"/>
           </a:p>
@@ -1966,7 +1966,7 @@
           <a:p>
             <a:fld id="{7E2CC3E8-F4D3-4BD0-85C9-D1B5AC4917BD}" type="datetimeFigureOut">
               <a:rPr lang="en-US" smtClean="0"/>
-              <a:t>6/18/2018</a:t>
+              <a:t>6/19/2018</a:t>
             </a:fld>
             <a:endParaRPr lang="en-US"/>
           </a:p>
@@ -2020,7 +2020,7 @@
           <a:p>
             <a:fld id="{99293C7F-59EB-4A3A-A30C-171723B2F31C}" type="slidenum">
               <a:rPr lang="en-US" smtClean="0"/>
-              <a:t>‹#›</a:t>
+              <a:t>‹Nr.›</a:t>
             </a:fld>
             <a:endParaRPr lang="en-US"/>
           </a:p>
@@ -2079,7 +2079,7 @@
           <a:p>
             <a:fld id="{7E2CC3E8-F4D3-4BD0-85C9-D1B5AC4917BD}" type="datetimeFigureOut">
               <a:rPr lang="en-US" smtClean="0"/>
-              <a:t>6/18/2018</a:t>
+              <a:t>6/19/2018</a:t>
             </a:fld>
             <a:endParaRPr lang="en-US"/>
           </a:p>
@@ -2133,7 +2133,7 @@
           <a:p>
             <a:fld id="{99293C7F-59EB-4A3A-A30C-171723B2F31C}" type="slidenum">
               <a:rPr lang="en-US" smtClean="0"/>
-              <a:t>‹#›</a:t>
+              <a:t>‹Nr.›</a:t>
             </a:fld>
             <a:endParaRPr lang="en-US"/>
           </a:p>
@@ -2390,7 +2390,7 @@
           <a:p>
             <a:fld id="{7E2CC3E8-F4D3-4BD0-85C9-D1B5AC4917BD}" type="datetimeFigureOut">
               <a:rPr lang="en-US" smtClean="0"/>
-              <a:t>6/18/2018</a:t>
+              <a:t>6/19/2018</a:t>
             </a:fld>
             <a:endParaRPr lang="en-US"/>
           </a:p>
@@ -2444,7 +2444,7 @@
           <a:p>
             <a:fld id="{99293C7F-59EB-4A3A-A30C-171723B2F31C}" type="slidenum">
               <a:rPr lang="en-US" smtClean="0"/>
-              <a:t>‹#›</a:t>
+              <a:t>‹Nr.›</a:t>
             </a:fld>
             <a:endParaRPr lang="en-US"/>
           </a:p>
@@ -2678,7 +2678,7 @@
           <a:p>
             <a:fld id="{7E2CC3E8-F4D3-4BD0-85C9-D1B5AC4917BD}" type="datetimeFigureOut">
               <a:rPr lang="en-US" smtClean="0"/>
-              <a:t>6/18/2018</a:t>
+              <a:t>6/19/2018</a:t>
             </a:fld>
             <a:endParaRPr lang="en-US"/>
           </a:p>
@@ -2732,7 +2732,7 @@
           <a:p>
             <a:fld id="{99293C7F-59EB-4A3A-A30C-171723B2F31C}" type="slidenum">
               <a:rPr lang="en-US" smtClean="0"/>
-              <a:t>‹#›</a:t>
+              <a:t>‹Nr.›</a:t>
             </a:fld>
             <a:endParaRPr lang="en-US"/>
           </a:p>
@@ -2919,7 +2919,7 @@
           <a:p>
             <a:fld id="{7E2CC3E8-F4D3-4BD0-85C9-D1B5AC4917BD}" type="datetimeFigureOut">
               <a:rPr lang="en-US" smtClean="0"/>
-              <a:t>6/18/2018</a:t>
+              <a:t>6/19/2018</a:t>
             </a:fld>
             <a:endParaRPr lang="en-US"/>
           </a:p>
@@ -3009,7 +3009,7 @@
           <a:p>
             <a:fld id="{99293C7F-59EB-4A3A-A30C-171723B2F31C}" type="slidenum">
               <a:rPr lang="en-US" smtClean="0"/>
-              <a:t>‹#›</a:t>
+              <a:t>‹Nr.›</a:t>
             </a:fld>
             <a:endParaRPr lang="en-US"/>
           </a:p>
@@ -3558,6 +3558,13 @@
   <p:clrMapOvr>
     <a:masterClrMapping/>
   </p:clrMapOvr>
+  <p:timing>
+    <p:tnLst>
+      <p:par>
+        <p:cTn id="1" dur="indefinite" restart="never" nodeType="tmRoot"/>
+      </p:par>
+    </p:tnLst>
+  </p:timing>
 </p:sld>
 </file>
 
@@ -3612,7 +3619,7 @@
                   <a:srgbClr val="339966"/>
                 </a:solidFill>
               </a:rPr>
-              <a:t>Issues and challenges</a:t>
+              <a:t>Next Sprint</a:t>
             </a:r>
             <a:br>
               <a:rPr lang="en-US" sz="3200" b="1" dirty="0">
@@ -3646,7 +3653,7 @@
           <p:cNvPr id="3" name="Picture 2" descr="Image result for gefasoft logo svg">
             <a:extLst>
               <a:ext uri="{FF2B5EF4-FFF2-40B4-BE49-F238E27FC236}">
-                <a16:creationId xmlns:a16="http://schemas.microsoft.com/office/drawing/2014/main" id="{5DA2FDA9-D2FA-45F6-9AD2-642CB386E662}"/>
+                <a16:creationId xmlns:a16="http://schemas.microsoft.com/office/drawing/2014/main" id="{B88C6BB7-9506-441C-AAC0-C315A42FF0AE}"/>
               </a:ext>
             </a:extLst>
           </p:cNvPr>
@@ -3716,7 +3723,7 @@
           <p:cNvPr id="4" name="Content Placeholder 2">
             <a:extLst>
               <a:ext uri="{FF2B5EF4-FFF2-40B4-BE49-F238E27FC236}">
-                <a16:creationId xmlns:a16="http://schemas.microsoft.com/office/drawing/2014/main" id="{B056E6DA-8F2D-4F02-95E0-EB7B6F24C8A6}"/>
+                <a16:creationId xmlns:a16="http://schemas.microsoft.com/office/drawing/2014/main" id="{B6EEADBC-18EF-4D5E-AD61-A99C29F1EFBF}"/>
               </a:ext>
             </a:extLst>
           </p:cNvPr>
@@ -3729,34 +3736,127 @@
         </p:nvSpPr>
         <p:spPr>
           <a:xfrm>
-            <a:off x="476363" y="1126808"/>
-            <a:ext cx="10890771" cy="5548309"/>
-          </a:xfrm>
-        </p:spPr>
-        <p:txBody>
-          <a:bodyPr/>
+            <a:off x="416440" y="1118945"/>
+            <a:ext cx="5879064" cy="4223763"/>
+          </a:xfrm>
+        </p:spPr>
+        <p:txBody>
+          <a:bodyPr>
+            <a:normAutofit/>
+          </a:bodyPr>
           <a:lstStyle/>
           <a:p>
-            <a:endParaRPr lang="en-US" sz="2000" dirty="0"/>
-          </a:p>
-          <a:p>
-            <a:endParaRPr lang="en-US" sz="2000" dirty="0"/>
-          </a:p>
-          <a:p>
-            <a:endParaRPr lang="en-US" sz="2000" dirty="0"/>
+            <a:pPr marL="0" indent="0" algn="just">
+              <a:buNone/>
+            </a:pPr>
+            <a:r>
+              <a:rPr lang="en-GB" sz="2400" b="1" dirty="0" smtClean="0"/>
+              <a:t>Finish </a:t>
+            </a:r>
+            <a:endParaRPr lang="en-GB" sz="2400" b="1" dirty="0"/>
+          </a:p>
+          <a:p>
+            <a:pPr algn="just"/>
+            <a:r>
+              <a:rPr lang="en-GB" sz="2000" dirty="0" err="1" smtClean="0"/>
+              <a:t>Boardlet</a:t>
+            </a:r>
+            <a:r>
+              <a:rPr lang="en-GB" sz="2000" dirty="0" smtClean="0"/>
+              <a:t> Design</a:t>
+            </a:r>
+          </a:p>
+          <a:p>
+            <a:pPr lvl="1" algn="just"/>
+            <a:r>
+              <a:rPr lang="en-GB" sz="1600" dirty="0" smtClean="0"/>
+              <a:t>Fix floating buttons (side-by-side)</a:t>
+            </a:r>
+            <a:endParaRPr lang="en-GB" sz="1600" dirty="0" smtClean="0"/>
+          </a:p>
+          <a:p>
+            <a:pPr algn="just"/>
+            <a:r>
+              <a:rPr lang="en-GB" sz="2000" dirty="0" smtClean="0"/>
+              <a:t>Database queries</a:t>
+            </a:r>
+          </a:p>
+          <a:p>
+            <a:pPr lvl="1" algn="just"/>
+            <a:r>
+              <a:rPr lang="en-GB" sz="1600" dirty="0"/>
+              <a:t>Nodes</a:t>
+            </a:r>
+          </a:p>
+          <a:p>
+            <a:pPr lvl="1" algn="just"/>
+            <a:r>
+              <a:rPr lang="en-GB" sz="1600" dirty="0"/>
+              <a:t>Connections</a:t>
+            </a:r>
+          </a:p>
+          <a:p>
+            <a:pPr lvl="1" algn="just"/>
+            <a:r>
+              <a:rPr lang="en-GB" sz="1600" dirty="0"/>
+              <a:t>Process Variables</a:t>
+            </a:r>
+          </a:p>
+          <a:p>
+            <a:pPr algn="just"/>
+            <a:r>
+              <a:rPr lang="en-GB" sz="2000" dirty="0" smtClean="0"/>
+              <a:t>Graph layout algorithm</a:t>
+            </a:r>
+          </a:p>
+          <a:p>
+            <a:pPr algn="just"/>
+            <a:r>
+              <a:rPr lang="en-GB" sz="2000" dirty="0" smtClean="0"/>
+              <a:t>Animations via sapient-bind</a:t>
+            </a:r>
+          </a:p>
+          <a:p>
+            <a:pPr algn="just"/>
+            <a:r>
+              <a:rPr lang="en-GB" sz="2000" dirty="0" smtClean="0"/>
+              <a:t>Documentation and Commenting</a:t>
+            </a:r>
+          </a:p>
+          <a:p>
+            <a:pPr algn="just"/>
+            <a:r>
+              <a:rPr lang="en-GB" sz="2000" dirty="0" smtClean="0"/>
+              <a:t>Testing</a:t>
+            </a:r>
+          </a:p>
+          <a:p>
+            <a:pPr algn="just"/>
+            <a:endParaRPr lang="en-GB" sz="1400" dirty="0"/>
+          </a:p>
+          <a:p>
+            <a:pPr algn="just"/>
+            <a:endParaRPr lang="en-GB" sz="1400" dirty="0"/>
           </a:p>
         </p:txBody>
       </p:sp>
     </p:spTree>
     <p:extLst>
       <p:ext uri="{BB962C8B-B14F-4D97-AF65-F5344CB8AC3E}">
-        <p14:creationId xmlns:p14="http://schemas.microsoft.com/office/powerpoint/2010/main" val="2843521589"/>
+        <p14:creationId xmlns:p14="http://schemas.microsoft.com/office/powerpoint/2010/main" val="267352282"/>
       </p:ext>
     </p:extLst>
   </p:cSld>
   <p:clrMapOvr>
     <a:masterClrMapping/>
   </p:clrMapOvr>
+  <p:timing>
+    <p:tnLst>
+      <p:par>
+        <p:cTn id="1" dur="indefinite" restart="never" nodeType="tmRoot"/>
+      </p:par>
+    </p:tnLst>
+  </p:timing>
 </p:sld>
 </file>
 
@@ -3806,12 +3906,20 @@
           <a:lstStyle/>
           <a:p>
             <a:r>
+              <a:rPr lang="en-US" sz="3200" b="1" dirty="0" smtClean="0">
+                <a:solidFill>
+                  <a:srgbClr val="339966"/>
+                </a:solidFill>
+              </a:rPr>
+              <a:t>Project </a:t>
+            </a:r>
+            <a:r>
               <a:rPr lang="en-US" sz="3200" b="1" dirty="0">
                 <a:solidFill>
                   <a:srgbClr val="339966"/>
                 </a:solidFill>
               </a:rPr>
-              <a:t>Next Sprint</a:t>
+              <a:t>– Overview</a:t>
             </a:r>
             <a:br>
               <a:rPr lang="en-US" sz="3200" b="1" dirty="0">
@@ -3828,24 +3936,17 @@
                   </a:schemeClr>
                 </a:solidFill>
               </a:rPr>
-              <a:t>Weekly Sprint 10</a:t>
-            </a:r>
-            <a:endParaRPr lang="en-US" sz="3200" dirty="0">
-              <a:solidFill>
-                <a:schemeClr val="bg1">
-                  <a:lumMod val="50000"/>
-                </a:schemeClr>
-              </a:solidFill>
-            </a:endParaRPr>
+              <a:t>Overview of tasks: Week 10</a:t>
+            </a:r>
           </a:p>
         </p:txBody>
       </p:sp>
       <p:pic>
         <p:nvPicPr>
-          <p:cNvPr id="3" name="Picture 2" descr="Image result for gefasoft logo svg">
-            <a:extLst>
-              <a:ext uri="{FF2B5EF4-FFF2-40B4-BE49-F238E27FC236}">
-                <a16:creationId xmlns:a16="http://schemas.microsoft.com/office/drawing/2014/main" id="{B88C6BB7-9506-441C-AAC0-C315A42FF0AE}"/>
+          <p:cNvPr id="5" name="Picture 2" descr="Image result for gefasoft logo svg">
+            <a:extLst>
+              <a:ext uri="{FF2B5EF4-FFF2-40B4-BE49-F238E27FC236}">
+                <a16:creationId xmlns:a16="http://schemas.microsoft.com/office/drawing/2014/main" id="{AB1D2124-FC8F-4BCD-9E0B-43BF17E713D1}"/>
               </a:ext>
             </a:extLst>
           </p:cNvPr>
@@ -3910,16 +4011,55 @@
           </a:extLst>
         </p:spPr>
       </p:pic>
+      <p:pic>
+        <p:nvPicPr>
+          <p:cNvPr id="3" name="Grafik 2">
+            <a:hlinkClick r:id="rId4"/>
+          </p:cNvPr>
+          <p:cNvPicPr>
+            <a:picLocks noChangeAspect="1"/>
+          </p:cNvPicPr>
+          <p:nvPr/>
+        </p:nvPicPr>
+        <p:blipFill>
+          <a:blip r:embed="rId5">
+            <a:extLst>
+              <a:ext uri="{28A0092B-C50C-407E-A947-70E740481C1C}">
+                <a14:useLocalDpi xmlns:a14="http://schemas.microsoft.com/office/drawing/2010/main" val="0"/>
+              </a:ext>
+            </a:extLst>
+          </a:blip>
+          <a:stretch>
+            <a:fillRect/>
+          </a:stretch>
+        </p:blipFill>
+        <p:spPr>
+          <a:xfrm>
+            <a:off x="161795" y="2194561"/>
+            <a:ext cx="11893193" cy="3135186"/>
+          </a:xfrm>
+          <a:prstGeom prst="rect">
+            <a:avLst/>
+          </a:prstGeom>
+        </p:spPr>
+      </p:pic>
     </p:spTree>
     <p:extLst>
       <p:ext uri="{BB962C8B-B14F-4D97-AF65-F5344CB8AC3E}">
-        <p14:creationId xmlns:p14="http://schemas.microsoft.com/office/powerpoint/2010/main" val="267352282"/>
+        <p14:creationId xmlns:p14="http://schemas.microsoft.com/office/powerpoint/2010/main" val="3054448464"/>
       </p:ext>
     </p:extLst>
   </p:cSld>
   <p:clrMapOvr>
     <a:masterClrMapping/>
   </p:clrMapOvr>
+  <p:timing>
+    <p:tnLst>
+      <p:par>
+        <p:cTn id="1" dur="indefinite" restart="never" nodeType="tmRoot"/>
+      </p:par>
+    </p:tnLst>
+  </p:timing>
 </p:sld>
 </file>
 
@@ -3940,6 +4080,36 @@
           <a:chExt cx="0" cy="0"/>
         </a:xfrm>
       </p:grpSpPr>
+      <p:pic>
+        <p:nvPicPr>
+          <p:cNvPr id="11" name="Grafik 10"/>
+          <p:cNvPicPr>
+            <a:picLocks noChangeAspect="1"/>
+          </p:cNvPicPr>
+          <p:nvPr/>
+        </p:nvPicPr>
+        <p:blipFill>
+          <a:blip r:embed="rId2">
+            <a:extLst>
+              <a:ext uri="{28A0092B-C50C-407E-A947-70E740481C1C}">
+                <a14:useLocalDpi xmlns:a14="http://schemas.microsoft.com/office/drawing/2010/main" val="0"/>
+              </a:ext>
+            </a:extLst>
+          </a:blip>
+          <a:stretch>
+            <a:fillRect/>
+          </a:stretch>
+        </p:blipFill>
+        <p:spPr>
+          <a:xfrm>
+            <a:off x="686534" y="1010194"/>
+            <a:ext cx="6613491" cy="5468849"/>
+          </a:xfrm>
+          <a:prstGeom prst="rect">
+            <a:avLst/>
+          </a:prstGeom>
+        </p:spPr>
+      </p:pic>
       <p:sp>
         <p:nvSpPr>
           <p:cNvPr id="2" name="Title 1">
@@ -3991,52 +4161,17 @@
                   </a:schemeClr>
                 </a:solidFill>
               </a:rPr>
-              <a:t>Overview of tasks: Week 10</a:t>
-            </a:r>
-          </a:p>
-        </p:txBody>
-      </p:sp>
-      <p:pic>
-        <p:nvPicPr>
-          <p:cNvPr id="22" name="Picture 21">
-            <a:extLst>
-              <a:ext uri="{FF2B5EF4-FFF2-40B4-BE49-F238E27FC236}">
-                <a16:creationId xmlns:a16="http://schemas.microsoft.com/office/drawing/2014/main" id="{CB3870D8-E8AA-4129-A0A2-D088B4BC1F0C}"/>
-              </a:ext>
-            </a:extLst>
-          </p:cNvPr>
-          <p:cNvPicPr>
-            <a:picLocks noChangeAspect="1"/>
-          </p:cNvPicPr>
-          <p:nvPr/>
-        </p:nvPicPr>
-        <p:blipFill rotWithShape="1">
-          <a:blip r:embed="rId2">
-            <a:extLst>
-              <a:ext uri="{28A0092B-C50C-407E-A947-70E740481C1C}">
-                <a14:useLocalDpi xmlns:a14="http://schemas.microsoft.com/office/drawing/2010/main" val="0"/>
-              </a:ext>
-            </a:extLst>
-          </a:blip>
-          <a:srcRect l="365"/>
-          <a:stretch/>
-        </p:blipFill>
-        <p:spPr>
-          <a:xfrm>
-            <a:off x="621245" y="1010194"/>
-            <a:ext cx="6015560" cy="5554243"/>
-          </a:xfrm>
-          <a:prstGeom prst="rect">
-            <a:avLst/>
-          </a:prstGeom>
-        </p:spPr>
-      </p:pic>
+              <a:t>Overview of tasks: Week 10 </a:t>
+            </a:r>
+          </a:p>
+        </p:txBody>
+      </p:sp>
       <p:pic>
         <p:nvPicPr>
           <p:cNvPr id="5" name="Picture 2" descr="Image result for gefasoft logo svg">
             <a:extLst>
               <a:ext uri="{FF2B5EF4-FFF2-40B4-BE49-F238E27FC236}">
-                <a16:creationId xmlns:a16="http://schemas.microsoft.com/office/drawing/2014/main" id="{AB1D2124-FC8F-4BCD-9E0B-43BF17E713D1}"/>
+                <a16:creationId xmlns:a16="http://schemas.microsoft.com/office/drawing/2014/main" id="{5F490901-FAF6-4F6B-885B-A6CD92F7732F}"/>
               </a:ext>
             </a:extLst>
           </p:cNvPr>
@@ -4101,54 +4236,23 @@
           </a:extLst>
         </p:spPr>
       </p:pic>
-      <p:sp>
-        <p:nvSpPr>
-          <p:cNvPr id="6" name="Textfeld 5"/>
-          <p:cNvSpPr txBox="1"/>
-          <p:nvPr/>
-        </p:nvSpPr>
-        <p:spPr>
-          <a:xfrm>
-            <a:off x="1288473" y="2769478"/>
-            <a:ext cx="3649287" cy="1323439"/>
-          </a:xfrm>
-          <a:prstGeom prst="rect">
-            <a:avLst/>
-          </a:prstGeom>
-          <a:noFill/>
-        </p:spPr>
-        <p:txBody>
-          <a:bodyPr wrap="square" rtlCol="0">
-            <a:spAutoFit/>
-          </a:bodyPr>
-          <a:lstStyle/>
-          <a:p>
-            <a:r>
-              <a:rPr lang="de-DE" sz="8000" dirty="0">
-                <a:solidFill>
-                  <a:srgbClr val="FF0000"/>
-                </a:solidFill>
-              </a:rPr>
-              <a:t>UPDATE</a:t>
-            </a:r>
-            <a:endParaRPr lang="de-DE" dirty="0">
-              <a:solidFill>
-                <a:srgbClr val="FF0000"/>
-              </a:solidFill>
-            </a:endParaRPr>
-          </a:p>
-        </p:txBody>
-      </p:sp>
     </p:spTree>
     <p:extLst>
       <p:ext uri="{BB962C8B-B14F-4D97-AF65-F5344CB8AC3E}">
-        <p14:creationId xmlns:p14="http://schemas.microsoft.com/office/powerpoint/2010/main" val="3054448464"/>
+        <p14:creationId xmlns:p14="http://schemas.microsoft.com/office/powerpoint/2010/main" val="2271369118"/>
       </p:ext>
     </p:extLst>
   </p:cSld>
   <p:clrMapOvr>
     <a:masterClrMapping/>
   </p:clrMapOvr>
+  <p:timing>
+    <p:tnLst>
+      <p:par>
+        <p:cTn id="1" dur="indefinite" restart="never" nodeType="tmRoot"/>
+      </p:par>
+    </p:tnLst>
+  </p:timing>
 </p:sld>
 </file>
 
@@ -4169,6 +4273,36 @@
           <a:chExt cx="0" cy="0"/>
         </a:xfrm>
       </p:grpSpPr>
+      <p:pic>
+        <p:nvPicPr>
+          <p:cNvPr id="11" name="Grafik 10"/>
+          <p:cNvPicPr>
+            <a:picLocks noChangeAspect="1"/>
+          </p:cNvPicPr>
+          <p:nvPr/>
+        </p:nvPicPr>
+        <p:blipFill>
+          <a:blip r:embed="rId2">
+            <a:extLst>
+              <a:ext uri="{28A0092B-C50C-407E-A947-70E740481C1C}">
+                <a14:useLocalDpi xmlns:a14="http://schemas.microsoft.com/office/drawing/2010/main" val="0"/>
+              </a:ext>
+            </a:extLst>
+          </a:blip>
+          <a:stretch>
+            <a:fillRect/>
+          </a:stretch>
+        </p:blipFill>
+        <p:spPr>
+          <a:xfrm>
+            <a:off x="686534" y="1010194"/>
+            <a:ext cx="6613491" cy="5468849"/>
+          </a:xfrm>
+          <a:prstGeom prst="rect">
+            <a:avLst/>
+          </a:prstGeom>
+        </p:spPr>
+      </p:pic>
       <p:sp>
         <p:nvSpPr>
           <p:cNvPr id="2" name="Title 1">
@@ -4213,26 +4347,6 @@
               </a:rPr>
             </a:br>
             <a:r>
-              <a:rPr lang="en-US" sz="1600" b="1" dirty="0" err="1">
-                <a:solidFill>
-                  <a:prstClr val="white">
-                    <a:lumMod val="50000"/>
-                  </a:prstClr>
-                </a:solidFill>
-              </a:rPr>
-              <a:t>Overview</a:t>
-            </a:r>
-            <a:r>
-              <a:rPr lang="en-US" sz="1600" b="1" dirty="0">
-                <a:solidFill>
-                  <a:prstClr val="white">
-                    <a:lumMod val="50000"/>
-                  </a:prstClr>
-                </a:solidFill>
-              </a:rPr>
-              <a:t> of tasks: Week </a:t>
-            </a:r>
-            <a:r>
               <a:rPr lang="en-US" sz="1600" b="1" dirty="0">
                 <a:solidFill>
                   <a:schemeClr val="bg1">
@@ -4240,125 +4354,17 @@
                   </a:schemeClr>
                 </a:solidFill>
               </a:rPr>
-              <a:t>10</a:t>
-            </a:r>
-          </a:p>
-        </p:txBody>
-      </p:sp>
-      <p:grpSp>
-        <p:nvGrpSpPr>
-          <p:cNvPr id="8" name="Group 7">
-            <a:extLst>
-              <a:ext uri="{FF2B5EF4-FFF2-40B4-BE49-F238E27FC236}">
-                <a16:creationId xmlns:a16="http://schemas.microsoft.com/office/drawing/2014/main" id="{BC2FBB54-FD15-4D38-AAA1-006F47815CD3}"/>
-              </a:ext>
-            </a:extLst>
-          </p:cNvPr>
-          <p:cNvGrpSpPr/>
-          <p:nvPr/>
-        </p:nvGrpSpPr>
-        <p:grpSpPr>
-          <a:xfrm>
-            <a:off x="611720" y="1010194"/>
-            <a:ext cx="6025085" cy="5554243"/>
-            <a:chOff x="611720" y="1010194"/>
-            <a:chExt cx="6025085" cy="5554243"/>
-          </a:xfrm>
-        </p:grpSpPr>
-        <p:pic>
-          <p:nvPicPr>
-            <p:cNvPr id="22" name="Picture 21">
-              <a:extLst>
-                <a:ext uri="{FF2B5EF4-FFF2-40B4-BE49-F238E27FC236}">
-                  <a16:creationId xmlns:a16="http://schemas.microsoft.com/office/drawing/2014/main" id="{CB3870D8-E8AA-4129-A0A2-D088B4BC1F0C}"/>
-                </a:ext>
-              </a:extLst>
-            </p:cNvPr>
-            <p:cNvPicPr>
-              <a:picLocks noChangeAspect="1"/>
-            </p:cNvPicPr>
-            <p:nvPr/>
-          </p:nvPicPr>
-          <p:blipFill rotWithShape="1">
-            <a:blip r:embed="rId2">
-              <a:extLst>
-                <a:ext uri="{28A0092B-C50C-407E-A947-70E740481C1C}">
-                  <a14:useLocalDpi xmlns:a14="http://schemas.microsoft.com/office/drawing/2010/main" val="0"/>
-                </a:ext>
-              </a:extLst>
-            </a:blip>
-            <a:srcRect l="365"/>
-            <a:stretch/>
-          </p:blipFill>
-          <p:spPr>
-            <a:xfrm>
-              <a:off x="621245" y="1010194"/>
-              <a:ext cx="6015560" cy="5554243"/>
-            </a:xfrm>
-            <a:prstGeom prst="rect">
-              <a:avLst/>
-            </a:prstGeom>
-          </p:spPr>
-        </p:pic>
-        <p:sp>
-          <p:nvSpPr>
-            <p:cNvPr id="3" name="Rectangle 2">
-              <a:extLst>
-                <a:ext uri="{FF2B5EF4-FFF2-40B4-BE49-F238E27FC236}">
-                  <a16:creationId xmlns:a16="http://schemas.microsoft.com/office/drawing/2014/main" id="{DB33D53D-CEA6-4793-AA59-162439CE6782}"/>
-                </a:ext>
-              </a:extLst>
-            </p:cNvPr>
-            <p:cNvSpPr/>
-            <p:nvPr/>
-          </p:nvSpPr>
-          <p:spPr>
-            <a:xfrm>
-              <a:off x="611720" y="2762250"/>
-              <a:ext cx="6015560" cy="971550"/>
-            </a:xfrm>
-            <a:prstGeom prst="rect">
-              <a:avLst/>
-            </a:prstGeom>
-            <a:noFill/>
-            <a:ln w="57150">
-              <a:solidFill>
-                <a:schemeClr val="tx1"/>
-              </a:solidFill>
-            </a:ln>
-          </p:spPr>
-          <p:style>
-            <a:lnRef idx="2">
-              <a:schemeClr val="accent1">
-                <a:shade val="50000"/>
-              </a:schemeClr>
-            </a:lnRef>
-            <a:fillRef idx="1">
-              <a:schemeClr val="accent1"/>
-            </a:fillRef>
-            <a:effectRef idx="0">
-              <a:schemeClr val="accent1"/>
-            </a:effectRef>
-            <a:fontRef idx="minor">
-              <a:schemeClr val="lt1"/>
-            </a:fontRef>
-          </p:style>
-          <p:txBody>
-            <a:bodyPr rtlCol="0" anchor="ctr"/>
-            <a:lstStyle/>
-            <a:p>
-              <a:pPr algn="ctr"/>
-              <a:endParaRPr lang="en-US" dirty="0"/>
-            </a:p>
-          </p:txBody>
-        </p:sp>
-      </p:grpSp>
+              <a:t>Overview of tasks: Week 10 </a:t>
+            </a:r>
+          </a:p>
+        </p:txBody>
+      </p:sp>
       <p:pic>
         <p:nvPicPr>
-          <p:cNvPr id="6" name="Picture 2" descr="Image result for gefasoft logo svg">
-            <a:extLst>
-              <a:ext uri="{FF2B5EF4-FFF2-40B4-BE49-F238E27FC236}">
-                <a16:creationId xmlns:a16="http://schemas.microsoft.com/office/drawing/2014/main" id="{33F896EA-C477-4764-BAA0-D16D62BF7321}"/>
+          <p:cNvPr id="5" name="Picture 2" descr="Image result for gefasoft logo svg">
+            <a:extLst>
+              <a:ext uri="{FF2B5EF4-FFF2-40B4-BE49-F238E27FC236}">
+                <a16:creationId xmlns:a16="http://schemas.microsoft.com/office/drawing/2014/main" id="{5F490901-FAF6-4F6B-885B-A6CD92F7732F}"/>
               </a:ext>
             </a:extLst>
           </p:cNvPr>
@@ -4425,52 +4431,73 @@
       </p:pic>
       <p:sp>
         <p:nvSpPr>
-          <p:cNvPr id="7" name="Textfeld 6"/>
-          <p:cNvSpPr txBox="1"/>
-          <p:nvPr/>
-        </p:nvSpPr>
-        <p:spPr>
-          <a:xfrm>
-            <a:off x="1288473" y="2769478"/>
-            <a:ext cx="3649287" cy="1323439"/>
+          <p:cNvPr id="3" name="Rectangle 2">
+            <a:extLst>
+              <a:ext uri="{FF2B5EF4-FFF2-40B4-BE49-F238E27FC236}">
+                <a16:creationId xmlns:a16="http://schemas.microsoft.com/office/drawing/2014/main" id="{DB33D53D-CEA6-4793-AA59-162439CE6782}"/>
+              </a:ext>
+            </a:extLst>
+          </p:cNvPr>
+          <p:cNvSpPr/>
+          <p:nvPr/>
+        </p:nvSpPr>
+        <p:spPr>
+          <a:xfrm>
+            <a:off x="669907" y="2100869"/>
+            <a:ext cx="6613491" cy="1880927"/>
           </a:xfrm>
           <a:prstGeom prst="rect">
             <a:avLst/>
           </a:prstGeom>
           <a:noFill/>
-        </p:spPr>
-        <p:txBody>
-          <a:bodyPr wrap="square" rtlCol="0">
-            <a:spAutoFit/>
-          </a:bodyPr>
+          <a:ln w="57150">
+            <a:solidFill>
+              <a:schemeClr val="tx1"/>
+            </a:solidFill>
+          </a:ln>
+        </p:spPr>
+        <p:style>
+          <a:lnRef idx="2">
+            <a:schemeClr val="accent1">
+              <a:shade val="50000"/>
+            </a:schemeClr>
+          </a:lnRef>
+          <a:fillRef idx="1">
+            <a:schemeClr val="accent1"/>
+          </a:fillRef>
+          <a:effectRef idx="0">
+            <a:schemeClr val="accent1"/>
+          </a:effectRef>
+          <a:fontRef idx="minor">
+            <a:schemeClr val="lt1"/>
+          </a:fontRef>
+        </p:style>
+        <p:txBody>
+          <a:bodyPr rtlCol="0" anchor="ctr"/>
           <a:lstStyle/>
           <a:p>
-            <a:r>
-              <a:rPr lang="de-DE" sz="8000" dirty="0">
-                <a:solidFill>
-                  <a:srgbClr val="FF0000"/>
-                </a:solidFill>
-              </a:rPr>
-              <a:t>UPDATE</a:t>
-            </a:r>
-            <a:endParaRPr lang="de-DE" dirty="0">
-              <a:solidFill>
-                <a:srgbClr val="FF0000"/>
-              </a:solidFill>
-            </a:endParaRPr>
+            <a:pPr algn="ctr"/>
+            <a:endParaRPr lang="en-US" dirty="0"/>
           </a:p>
         </p:txBody>
       </p:sp>
     </p:spTree>
     <p:extLst>
       <p:ext uri="{BB962C8B-B14F-4D97-AF65-F5344CB8AC3E}">
-        <p14:creationId xmlns:p14="http://schemas.microsoft.com/office/powerpoint/2010/main" val="3985829654"/>
+        <p14:creationId xmlns:p14="http://schemas.microsoft.com/office/powerpoint/2010/main" val="437459039"/>
       </p:ext>
     </p:extLst>
   </p:cSld>
   <p:clrMapOvr>
     <a:masterClrMapping/>
   </p:clrMapOvr>
+  <p:timing>
+    <p:tnLst>
+      <p:par>
+        <p:cTn id="1" dur="indefinite" restart="never" nodeType="tmRoot"/>
+      </p:par>
+    </p:tnLst>
+  </p:timing>
 </p:sld>
 </file>
 
@@ -4493,19 +4520,13 @@
       </p:grpSpPr>
       <p:pic>
         <p:nvPicPr>
-          <p:cNvPr id="109" name="Picture 108">
-            <a:extLst>
-              <a:ext uri="{FF2B5EF4-FFF2-40B4-BE49-F238E27FC236}">
-                <a16:creationId xmlns:a16="http://schemas.microsoft.com/office/drawing/2014/main" id="{75E3B58E-2C2C-4550-B476-658939F011D1}"/>
-              </a:ext>
-            </a:extLst>
-          </p:cNvPr>
+          <p:cNvPr id="16" name="Grafik 15"/>
           <p:cNvPicPr>
             <a:picLocks noChangeAspect="1"/>
           </p:cNvPicPr>
           <p:nvPr/>
         </p:nvPicPr>
-        <p:blipFill rotWithShape="1">
+        <p:blipFill>
           <a:blip r:embed="rId2">
             <a:extLst>
               <a:ext uri="{28A0092B-C50C-407E-A947-70E740481C1C}">
@@ -4513,13 +4534,14 @@
               </a:ext>
             </a:extLst>
           </a:blip>
-          <a:srcRect t="549"/>
-          <a:stretch/>
+          <a:stretch>
+            <a:fillRect/>
+          </a:stretch>
         </p:blipFill>
         <p:spPr>
           <a:xfrm>
-            <a:off x="477739" y="2070100"/>
-            <a:ext cx="5094658" cy="3451224"/>
+            <a:off x="456149" y="2043783"/>
+            <a:ext cx="5092189" cy="3518595"/>
           </a:xfrm>
           <a:prstGeom prst="rect">
             <a:avLst/>
@@ -4569,6 +4591,14 @@
                 </a:solidFill>
               </a:rPr>
               <a:t>Boardlet</a:t>
+            </a:r>
+            <a:r>
+              <a:rPr lang="en-US" sz="3200" b="1" dirty="0">
+                <a:solidFill>
+                  <a:srgbClr val="339966"/>
+                </a:solidFill>
+              </a:rPr>
+              <a:t/>
             </a:r>
             <a:br>
               <a:rPr lang="en-US" sz="3200" b="1" dirty="0">
@@ -4600,6 +4630,7 @@
       <p:pic>
         <p:nvPicPr>
           <p:cNvPr id="9" name="Picture 8">
+            <a:hlinkClick r:id="rId3" action="ppaction://hlinkfile"/>
             <a:extLst>
               <a:ext uri="{FF2B5EF4-FFF2-40B4-BE49-F238E27FC236}">
                 <a16:creationId xmlns:a16="http://schemas.microsoft.com/office/drawing/2014/main" id="{E1E731CC-AC70-4672-87B4-A38517AB7C9E}"/>
@@ -4612,7 +4643,7 @@
           <p:nvPr/>
         </p:nvPicPr>
         <p:blipFill>
-          <a:blip r:embed="rId3">
+          <a:blip r:embed="rId4">
             <a:extLst>
               <a:ext uri="{28A0092B-C50C-407E-A947-70E740481C1C}">
                 <a14:useLocalDpi xmlns:a14="http://schemas.microsoft.com/office/drawing/2010/main" val="0"/>
@@ -5053,6 +5084,468 @@
             <a:extLst>
               <a:ext uri="{FF2B5EF4-FFF2-40B4-BE49-F238E27FC236}">
                 <a16:creationId xmlns:a16="http://schemas.microsoft.com/office/drawing/2014/main" id="{4E0EFFFC-9F6B-4017-841B-A61961FD413E}"/>
+              </a:ext>
+            </a:extLst>
+          </p:cNvPr>
+          <p:cNvPicPr>
+            <a:picLocks noChangeAspect="1" noChangeArrowheads="1"/>
+          </p:cNvPicPr>
+          <p:nvPr/>
+        </p:nvPicPr>
+        <p:blipFill>
+          <a:blip r:embed="rId5" cstate="hqprint">
+            <a:extLst>
+              <a:ext uri="{BEBA8EAE-BF5A-486C-A8C5-ECC9F3942E4B}">
+                <a14:imgProps xmlns:a14="http://schemas.microsoft.com/office/drawing/2010/main">
+                  <a14:imgLayer r:embed="rId6">
+                    <a14:imgEffect>
+                      <a14:backgroundRemoval t="9109" b="95736" l="1482" r="99915">
+                        <a14:foregroundMark x1="19094" y1="9496" x2="19094" y2="9496"/>
+                        <a14:foregroundMark x1="4742" y1="19186" x2="4742" y2="19186"/>
+                        <a14:foregroundMark x1="1566" y1="45930" x2="1566" y2="45930"/>
+                        <a14:foregroundMark x1="20152" y1="96124" x2="20152" y2="96124"/>
+                        <a14:foregroundMark x1="39797" y1="58721" x2="39797" y2="58721"/>
+                        <a14:foregroundMark x1="51524" y1="44767" x2="51524" y2="44767"/>
+                        <a14:foregroundMark x1="58086" y1="43217" x2="58086" y2="43217"/>
+                        <a14:foregroundMark x1="64310" y1="42054" x2="64310" y2="42054"/>
+                        <a14:foregroundMark x1="72142" y1="42442" x2="72142" y2="42442"/>
+                        <a14:foregroundMark x1="78535" y1="42054" x2="78535" y2="42054"/>
+                        <a14:foregroundMark x1="89839" y1="29070" x2="89839" y2="29070"/>
+                        <a14:foregroundMark x1="95809" y1="25194" x2="95809" y2="25194"/>
+                        <a14:foregroundMark x1="99915" y1="24806" x2="99915" y2="24806"/>
+                      </a14:backgroundRemoval>
+                    </a14:imgEffect>
+                  </a14:imgLayer>
+                </a14:imgProps>
+              </a:ext>
+              <a:ext uri="{28A0092B-C50C-407E-A947-70E740481C1C}">
+                <a14:useLocalDpi xmlns:a14="http://schemas.microsoft.com/office/drawing/2010/main" val="0"/>
+              </a:ext>
+            </a:extLst>
+          </a:blip>
+          <a:srcRect/>
+          <a:stretch>
+            <a:fillRect/>
+          </a:stretch>
+        </p:blipFill>
+        <p:spPr bwMode="auto">
+          <a:xfrm>
+            <a:off x="10413546" y="140804"/>
+            <a:ext cx="1641442" cy="358638"/>
+          </a:xfrm>
+          <a:prstGeom prst="rect">
+            <a:avLst/>
+          </a:prstGeom>
+          <a:noFill/>
+          <a:extLst>
+            <a:ext uri="{909E8E84-426E-40DD-AFC4-6F175D3DCCD1}">
+              <a14:hiddenFill xmlns:a14="http://schemas.microsoft.com/office/drawing/2010/main">
+                <a:solidFill>
+                  <a:srgbClr val="FFFFFF"/>
+                </a:solidFill>
+              </a14:hiddenFill>
+            </a:ext>
+          </a:extLst>
+        </p:spPr>
+      </p:pic>
+    </p:spTree>
+    <p:extLst>
+      <p:ext uri="{BB962C8B-B14F-4D97-AF65-F5344CB8AC3E}">
+        <p14:creationId xmlns:p14="http://schemas.microsoft.com/office/powerpoint/2010/main" val="2074006709"/>
+      </p:ext>
+    </p:extLst>
+  </p:cSld>
+  <p:clrMapOvr>
+    <a:masterClrMapping/>
+  </p:clrMapOvr>
+  <p:timing>
+    <p:tnLst>
+      <p:par>
+        <p:cTn id="1" dur="indefinite" restart="never" nodeType="tmRoot"/>
+      </p:par>
+    </p:tnLst>
+  </p:timing>
+</p:sld>
+</file>
+
+<file path=ppt/slides/slide5.xml><?xml version="1.0" encoding="utf-8"?>
+<p:sld xmlns:a="http://schemas.openxmlformats.org/drawingml/2006/main" xmlns:r="http://schemas.openxmlformats.org/officeDocument/2006/relationships" xmlns:p="http://schemas.openxmlformats.org/presentationml/2006/main">
+  <p:cSld>
+    <p:spTree>
+      <p:nvGrpSpPr>
+        <p:cNvPr id="1" name=""/>
+        <p:cNvGrpSpPr/>
+        <p:nvPr/>
+      </p:nvGrpSpPr>
+      <p:grpSpPr>
+        <a:xfrm>
+          <a:off x="0" y="0"/>
+          <a:ext cx="0" cy="0"/>
+          <a:chOff x="0" y="0"/>
+          <a:chExt cx="0" cy="0"/>
+        </a:xfrm>
+      </p:grpSpPr>
+      <p:pic>
+        <p:nvPicPr>
+          <p:cNvPr id="11" name="Grafik 10"/>
+          <p:cNvPicPr>
+            <a:picLocks noChangeAspect="1"/>
+          </p:cNvPicPr>
+          <p:nvPr/>
+        </p:nvPicPr>
+        <p:blipFill>
+          <a:blip r:embed="rId2">
+            <a:extLst>
+              <a:ext uri="{28A0092B-C50C-407E-A947-70E740481C1C}">
+                <a14:useLocalDpi xmlns:a14="http://schemas.microsoft.com/office/drawing/2010/main" val="0"/>
+              </a:ext>
+            </a:extLst>
+          </a:blip>
+          <a:stretch>
+            <a:fillRect/>
+          </a:stretch>
+        </p:blipFill>
+        <p:spPr>
+          <a:xfrm>
+            <a:off x="686534" y="1010194"/>
+            <a:ext cx="6613491" cy="5468849"/>
+          </a:xfrm>
+          <a:prstGeom prst="rect">
+            <a:avLst/>
+          </a:prstGeom>
+        </p:spPr>
+      </p:pic>
+      <p:sp>
+        <p:nvSpPr>
+          <p:cNvPr id="2" name="Title 1">
+            <a:extLst>
+              <a:ext uri="{FF2B5EF4-FFF2-40B4-BE49-F238E27FC236}">
+                <a16:creationId xmlns:a16="http://schemas.microsoft.com/office/drawing/2014/main" id="{8AEB4669-5D9E-428A-9F10-64DC2B65A45E}"/>
+              </a:ext>
+            </a:extLst>
+          </p:cNvPr>
+          <p:cNvSpPr>
+            <a:spLocks noGrp="1"/>
+          </p:cNvSpPr>
+          <p:nvPr>
+            <p:ph type="title"/>
+          </p:nvPr>
+        </p:nvSpPr>
+        <p:spPr>
+          <a:xfrm>
+            <a:off x="0" y="18255"/>
+            <a:ext cx="12192000" cy="991939"/>
+          </a:xfrm>
+        </p:spPr>
+        <p:txBody>
+          <a:bodyPr>
+            <a:normAutofit/>
+          </a:bodyPr>
+          <a:lstStyle/>
+          <a:p>
+            <a:r>
+              <a:rPr lang="en-US" sz="3200" b="1" dirty="0">
+                <a:solidFill>
+                  <a:srgbClr val="339966"/>
+                </a:solidFill>
+              </a:rPr>
+              <a:t>Task Backlog – Overview</a:t>
+            </a:r>
+            <a:br>
+              <a:rPr lang="en-US" sz="3200" b="1" dirty="0">
+                <a:solidFill>
+                  <a:srgbClr val="339966"/>
+                </a:solidFill>
+              </a:rPr>
+            </a:br>
+            <a:r>
+              <a:rPr lang="en-US" sz="1600" b="1" dirty="0">
+                <a:solidFill>
+                  <a:schemeClr val="bg1">
+                    <a:lumMod val="50000"/>
+                  </a:schemeClr>
+                </a:solidFill>
+              </a:rPr>
+              <a:t>Overview of tasks: Week 10 </a:t>
+            </a:r>
+          </a:p>
+        </p:txBody>
+      </p:sp>
+      <p:pic>
+        <p:nvPicPr>
+          <p:cNvPr id="5" name="Picture 2" descr="Image result for gefasoft logo svg">
+            <a:extLst>
+              <a:ext uri="{FF2B5EF4-FFF2-40B4-BE49-F238E27FC236}">
+                <a16:creationId xmlns:a16="http://schemas.microsoft.com/office/drawing/2014/main" id="{5F490901-FAF6-4F6B-885B-A6CD92F7732F}"/>
+              </a:ext>
+            </a:extLst>
+          </p:cNvPr>
+          <p:cNvPicPr>
+            <a:picLocks noChangeAspect="1" noChangeArrowheads="1"/>
+          </p:cNvPicPr>
+          <p:nvPr/>
+        </p:nvPicPr>
+        <p:blipFill>
+          <a:blip r:embed="rId3" cstate="hqprint">
+            <a:extLst>
+              <a:ext uri="{BEBA8EAE-BF5A-486C-A8C5-ECC9F3942E4B}">
+                <a14:imgProps xmlns:a14="http://schemas.microsoft.com/office/drawing/2010/main">
+                  <a14:imgLayer r:embed="rId4">
+                    <a14:imgEffect>
+                      <a14:backgroundRemoval t="9109" b="95736" l="1482" r="99915">
+                        <a14:foregroundMark x1="19094" y1="9496" x2="19094" y2="9496"/>
+                        <a14:foregroundMark x1="4742" y1="19186" x2="4742" y2="19186"/>
+                        <a14:foregroundMark x1="1566" y1="45930" x2="1566" y2="45930"/>
+                        <a14:foregroundMark x1="20152" y1="96124" x2="20152" y2="96124"/>
+                        <a14:foregroundMark x1="39797" y1="58721" x2="39797" y2="58721"/>
+                        <a14:foregroundMark x1="51524" y1="44767" x2="51524" y2="44767"/>
+                        <a14:foregroundMark x1="58086" y1="43217" x2="58086" y2="43217"/>
+                        <a14:foregroundMark x1="64310" y1="42054" x2="64310" y2="42054"/>
+                        <a14:foregroundMark x1="72142" y1="42442" x2="72142" y2="42442"/>
+                        <a14:foregroundMark x1="78535" y1="42054" x2="78535" y2="42054"/>
+                        <a14:foregroundMark x1="89839" y1="29070" x2="89839" y2="29070"/>
+                        <a14:foregroundMark x1="95809" y1="25194" x2="95809" y2="25194"/>
+                        <a14:foregroundMark x1="99915" y1="24806" x2="99915" y2="24806"/>
+                      </a14:backgroundRemoval>
+                    </a14:imgEffect>
+                  </a14:imgLayer>
+                </a14:imgProps>
+              </a:ext>
+              <a:ext uri="{28A0092B-C50C-407E-A947-70E740481C1C}">
+                <a14:useLocalDpi xmlns:a14="http://schemas.microsoft.com/office/drawing/2010/main" val="0"/>
+              </a:ext>
+            </a:extLst>
+          </a:blip>
+          <a:srcRect/>
+          <a:stretch>
+            <a:fillRect/>
+          </a:stretch>
+        </p:blipFill>
+        <p:spPr bwMode="auto">
+          <a:xfrm>
+            <a:off x="10413546" y="140804"/>
+            <a:ext cx="1641442" cy="358638"/>
+          </a:xfrm>
+          <a:prstGeom prst="rect">
+            <a:avLst/>
+          </a:prstGeom>
+          <a:noFill/>
+          <a:extLst>
+            <a:ext uri="{909E8E84-426E-40DD-AFC4-6F175D3DCCD1}">
+              <a14:hiddenFill xmlns:a14="http://schemas.microsoft.com/office/drawing/2010/main">
+                <a:solidFill>
+                  <a:srgbClr val="FFFFFF"/>
+                </a:solidFill>
+              </a14:hiddenFill>
+            </a:ext>
+          </a:extLst>
+        </p:spPr>
+      </p:pic>
+      <p:sp>
+        <p:nvSpPr>
+          <p:cNvPr id="3" name="Rectangle 2">
+            <a:extLst>
+              <a:ext uri="{FF2B5EF4-FFF2-40B4-BE49-F238E27FC236}">
+                <a16:creationId xmlns:a16="http://schemas.microsoft.com/office/drawing/2014/main" id="{DB33D53D-CEA6-4793-AA59-162439CE6782}"/>
+              </a:ext>
+            </a:extLst>
+          </p:cNvPr>
+          <p:cNvSpPr/>
+          <p:nvPr/>
+        </p:nvSpPr>
+        <p:spPr>
+          <a:xfrm>
+            <a:off x="686533" y="3944007"/>
+            <a:ext cx="6613491" cy="1475891"/>
+          </a:xfrm>
+          <a:prstGeom prst="rect">
+            <a:avLst/>
+          </a:prstGeom>
+          <a:noFill/>
+          <a:ln w="57150">
+            <a:solidFill>
+              <a:schemeClr val="tx1"/>
+            </a:solidFill>
+          </a:ln>
+        </p:spPr>
+        <p:style>
+          <a:lnRef idx="2">
+            <a:schemeClr val="accent1">
+              <a:shade val="50000"/>
+            </a:schemeClr>
+          </a:lnRef>
+          <a:fillRef idx="1">
+            <a:schemeClr val="accent1"/>
+          </a:fillRef>
+          <a:effectRef idx="0">
+            <a:schemeClr val="accent1"/>
+          </a:effectRef>
+          <a:fontRef idx="minor">
+            <a:schemeClr val="lt1"/>
+          </a:fontRef>
+        </p:style>
+        <p:txBody>
+          <a:bodyPr rtlCol="0" anchor="ctr"/>
+          <a:lstStyle/>
+          <a:p>
+            <a:pPr algn="ctr"/>
+            <a:endParaRPr lang="en-US" dirty="0"/>
+          </a:p>
+        </p:txBody>
+      </p:sp>
+    </p:spTree>
+    <p:extLst>
+      <p:ext uri="{BB962C8B-B14F-4D97-AF65-F5344CB8AC3E}">
+        <p14:creationId xmlns:p14="http://schemas.microsoft.com/office/powerpoint/2010/main" val="2913005937"/>
+      </p:ext>
+    </p:extLst>
+  </p:cSld>
+  <p:clrMapOvr>
+    <a:masterClrMapping/>
+  </p:clrMapOvr>
+  <p:timing>
+    <p:tnLst>
+      <p:par>
+        <p:cTn id="1" dur="indefinite" restart="never" nodeType="tmRoot"/>
+      </p:par>
+    </p:tnLst>
+  </p:timing>
+</p:sld>
+</file>
+
+<file path=ppt/slides/slide6.xml><?xml version="1.0" encoding="utf-8"?>
+<p:sld xmlns:a="http://schemas.openxmlformats.org/drawingml/2006/main" xmlns:r="http://schemas.openxmlformats.org/officeDocument/2006/relationships" xmlns:p="http://schemas.openxmlformats.org/presentationml/2006/main">
+  <p:cSld>
+    <p:spTree>
+      <p:nvGrpSpPr>
+        <p:cNvPr id="1" name=""/>
+        <p:cNvGrpSpPr/>
+        <p:nvPr/>
+      </p:nvGrpSpPr>
+      <p:grpSpPr>
+        <a:xfrm>
+          <a:off x="0" y="0"/>
+          <a:ext cx="0" cy="0"/>
+          <a:chOff x="0" y="0"/>
+          <a:chExt cx="0" cy="0"/>
+        </a:xfrm>
+      </p:grpSpPr>
+      <p:pic>
+        <p:nvPicPr>
+          <p:cNvPr id="41" name="Inhaltsplatzhalter 40">
+            <a:hlinkClick r:id="rId2"/>
+          </p:cNvPr>
+          <p:cNvPicPr>
+            <a:picLocks noGrp="1" noChangeAspect="1"/>
+          </p:cNvPicPr>
+          <p:nvPr>
+            <p:ph idx="1"/>
+          </p:nvPr>
+        </p:nvPicPr>
+        <p:blipFill>
+          <a:blip r:embed="rId3">
+            <a:extLst>
+              <a:ext uri="{28A0092B-C50C-407E-A947-70E740481C1C}">
+                <a14:useLocalDpi xmlns:a14="http://schemas.microsoft.com/office/drawing/2010/main" val="0"/>
+              </a:ext>
+            </a:extLst>
+          </a:blip>
+          <a:stretch>
+            <a:fillRect/>
+          </a:stretch>
+        </p:blipFill>
+        <p:spPr>
+          <a:xfrm>
+            <a:off x="6893273" y="1327207"/>
+            <a:ext cx="4599625" cy="4735955"/>
+          </a:xfrm>
+        </p:spPr>
+      </p:pic>
+      <p:sp>
+        <p:nvSpPr>
+          <p:cNvPr id="2" name="Title 1">
+            <a:extLst>
+              <a:ext uri="{FF2B5EF4-FFF2-40B4-BE49-F238E27FC236}">
+                <a16:creationId xmlns:a16="http://schemas.microsoft.com/office/drawing/2014/main" id="{8AEB4669-5D9E-428A-9F10-64DC2B65A45E}"/>
+              </a:ext>
+            </a:extLst>
+          </p:cNvPr>
+          <p:cNvSpPr>
+            <a:spLocks noGrp="1"/>
+          </p:cNvSpPr>
+          <p:nvPr>
+            <p:ph type="title"/>
+          </p:nvPr>
+        </p:nvSpPr>
+        <p:spPr>
+          <a:xfrm>
+            <a:off x="0" y="18255"/>
+            <a:ext cx="12192000" cy="991939"/>
+          </a:xfrm>
+        </p:spPr>
+        <p:txBody>
+          <a:bodyPr>
+            <a:normAutofit/>
+          </a:bodyPr>
+          <a:lstStyle/>
+          <a:p>
+            <a:r>
+              <a:rPr lang="en-US" sz="3200" b="1" dirty="0">
+                <a:solidFill>
+                  <a:srgbClr val="339966"/>
+                </a:solidFill>
+              </a:rPr>
+              <a:t>Sapient </a:t>
+            </a:r>
+            <a:r>
+              <a:rPr lang="en-US" sz="3200" b="1" dirty="0" err="1">
+                <a:solidFill>
+                  <a:srgbClr val="339966"/>
+                </a:solidFill>
+              </a:rPr>
+              <a:t>Boardlet</a:t>
+            </a:r>
+            <a:r>
+              <a:rPr lang="en-US" sz="3200" b="1" dirty="0">
+                <a:solidFill>
+                  <a:srgbClr val="339966"/>
+                </a:solidFill>
+              </a:rPr>
+              <a:t/>
+            </a:r>
+            <a:br>
+              <a:rPr lang="en-US" sz="3200" b="1" dirty="0">
+                <a:solidFill>
+                  <a:srgbClr val="339966"/>
+                </a:solidFill>
+              </a:rPr>
+            </a:br>
+            <a:r>
+              <a:rPr lang="en-US" sz="1600" b="1" dirty="0">
+                <a:solidFill>
+                  <a:schemeClr val="bg1">
+                    <a:lumMod val="50000"/>
+                  </a:schemeClr>
+                </a:solidFill>
+              </a:rPr>
+              <a:t>Weekly Sprint 10</a:t>
+            </a:r>
+            <a:endParaRPr lang="en-US" sz="3200" dirty="0">
+              <a:solidFill>
+                <a:schemeClr val="bg1">
+                  <a:lumMod val="50000"/>
+                </a:schemeClr>
+              </a:solidFill>
+            </a:endParaRPr>
+          </a:p>
+        </p:txBody>
+      </p:sp>
+      <p:pic>
+        <p:nvPicPr>
+          <p:cNvPr id="9" name="Picture 2" descr="Image result for gefasoft logo svg">
+            <a:extLst>
+              <a:ext uri="{FF2B5EF4-FFF2-40B4-BE49-F238E27FC236}">
+                <a16:creationId xmlns:a16="http://schemas.microsoft.com/office/drawing/2014/main" id="{9E2A0D8B-D921-4381-A883-E701EB432AE7}"/>
               </a:ext>
             </a:extLst>
           </p:cNvPr>
@@ -5119,7 +5612,7 @@
       </p:pic>
       <p:sp>
         <p:nvSpPr>
-          <p:cNvPr id="17" name="Textfeld 16"/>
+          <p:cNvPr id="3" name="Textfeld 2"/>
           <p:cNvSpPr txBox="1"/>
           <p:nvPr/>
         </p:nvSpPr>
@@ -5155,442 +5648,16 @@
           </a:p>
         </p:txBody>
       </p:sp>
-    </p:spTree>
-    <p:extLst>
-      <p:ext uri="{BB962C8B-B14F-4D97-AF65-F5344CB8AC3E}">
-        <p14:creationId xmlns:p14="http://schemas.microsoft.com/office/powerpoint/2010/main" val="2074006709"/>
-      </p:ext>
-    </p:extLst>
-  </p:cSld>
-  <p:clrMapOvr>
-    <a:masterClrMapping/>
-  </p:clrMapOvr>
-</p:sld>
-</file>
-
-<file path=ppt/slides/slide5.xml><?xml version="1.0" encoding="utf-8"?>
-<p:sld xmlns:a="http://schemas.openxmlformats.org/drawingml/2006/main" xmlns:r="http://schemas.openxmlformats.org/officeDocument/2006/relationships" xmlns:p="http://schemas.openxmlformats.org/presentationml/2006/main">
-  <p:cSld>
-    <p:spTree>
-      <p:nvGrpSpPr>
-        <p:cNvPr id="1" name=""/>
-        <p:cNvGrpSpPr/>
-        <p:nvPr/>
-      </p:nvGrpSpPr>
-      <p:grpSpPr>
-        <a:xfrm>
-          <a:off x="0" y="0"/>
-          <a:ext cx="0" cy="0"/>
-          <a:chOff x="0" y="0"/>
-          <a:chExt cx="0" cy="0"/>
-        </a:xfrm>
-      </p:grpSpPr>
-      <p:sp>
-        <p:nvSpPr>
-          <p:cNvPr id="2" name="Title 1">
-            <a:extLst>
-              <a:ext uri="{FF2B5EF4-FFF2-40B4-BE49-F238E27FC236}">
-                <a16:creationId xmlns:a16="http://schemas.microsoft.com/office/drawing/2014/main" id="{8AEB4669-5D9E-428A-9F10-64DC2B65A45E}"/>
-              </a:ext>
-            </a:extLst>
-          </p:cNvPr>
-          <p:cNvSpPr>
-            <a:spLocks noGrp="1"/>
-          </p:cNvSpPr>
-          <p:nvPr>
-            <p:ph type="title"/>
-          </p:nvPr>
-        </p:nvSpPr>
-        <p:spPr>
-          <a:xfrm>
-            <a:off x="0" y="18255"/>
-            <a:ext cx="12192000" cy="991939"/>
-          </a:xfrm>
-        </p:spPr>
-        <p:txBody>
-          <a:bodyPr>
-            <a:normAutofit/>
-          </a:bodyPr>
-          <a:lstStyle/>
-          <a:p>
-            <a:r>
-              <a:rPr lang="en-US" sz="3200" b="1" dirty="0">
-                <a:solidFill>
-                  <a:srgbClr val="339966"/>
-                </a:solidFill>
-              </a:rPr>
-              <a:t>Task Backlog – Overview</a:t>
-            </a:r>
-            <a:br>
-              <a:rPr lang="en-US" sz="3200" b="1" dirty="0">
-                <a:solidFill>
-                  <a:srgbClr val="339966"/>
-                </a:solidFill>
-              </a:rPr>
-            </a:br>
-            <a:r>
-              <a:rPr lang="en-US" sz="1600" b="1" dirty="0">
-                <a:solidFill>
-                  <a:schemeClr val="bg1">
-                    <a:lumMod val="50000"/>
-                  </a:schemeClr>
-                </a:solidFill>
-              </a:rPr>
-              <a:t>Overview of tasks: Week 10 </a:t>
-            </a:r>
-          </a:p>
-        </p:txBody>
-      </p:sp>
       <p:pic>
         <p:nvPicPr>
-          <p:cNvPr id="5" name="Picture 2" descr="Image result for gefasoft logo svg">
-            <a:extLst>
-              <a:ext uri="{FF2B5EF4-FFF2-40B4-BE49-F238E27FC236}">
-                <a16:creationId xmlns:a16="http://schemas.microsoft.com/office/drawing/2014/main" id="{5F490901-FAF6-4F6B-885B-A6CD92F7732F}"/>
-              </a:ext>
-            </a:extLst>
-          </p:cNvPr>
+          <p:cNvPr id="24" name="Grafik 23"/>
           <p:cNvPicPr>
-            <a:picLocks noChangeAspect="1" noChangeArrowheads="1"/>
+            <a:picLocks noChangeAspect="1"/>
           </p:cNvPicPr>
           <p:nvPr/>
         </p:nvPicPr>
         <p:blipFill>
-          <a:blip r:embed="rId2" cstate="hqprint">
-            <a:extLst>
-              <a:ext uri="{BEBA8EAE-BF5A-486C-A8C5-ECC9F3942E4B}">
-                <a14:imgProps xmlns:a14="http://schemas.microsoft.com/office/drawing/2010/main">
-                  <a14:imgLayer r:embed="rId3">
-                    <a14:imgEffect>
-                      <a14:backgroundRemoval t="9109" b="95736" l="1482" r="99915">
-                        <a14:foregroundMark x1="19094" y1="9496" x2="19094" y2="9496"/>
-                        <a14:foregroundMark x1="4742" y1="19186" x2="4742" y2="19186"/>
-                        <a14:foregroundMark x1="1566" y1="45930" x2="1566" y2="45930"/>
-                        <a14:foregroundMark x1="20152" y1="96124" x2="20152" y2="96124"/>
-                        <a14:foregroundMark x1="39797" y1="58721" x2="39797" y2="58721"/>
-                        <a14:foregroundMark x1="51524" y1="44767" x2="51524" y2="44767"/>
-                        <a14:foregroundMark x1="58086" y1="43217" x2="58086" y2="43217"/>
-                        <a14:foregroundMark x1="64310" y1="42054" x2="64310" y2="42054"/>
-                        <a14:foregroundMark x1="72142" y1="42442" x2="72142" y2="42442"/>
-                        <a14:foregroundMark x1="78535" y1="42054" x2="78535" y2="42054"/>
-                        <a14:foregroundMark x1="89839" y1="29070" x2="89839" y2="29070"/>
-                        <a14:foregroundMark x1="95809" y1="25194" x2="95809" y2="25194"/>
-                        <a14:foregroundMark x1="99915" y1="24806" x2="99915" y2="24806"/>
-                      </a14:backgroundRemoval>
-                    </a14:imgEffect>
-                  </a14:imgLayer>
-                </a14:imgProps>
-              </a:ext>
-              <a:ext uri="{28A0092B-C50C-407E-A947-70E740481C1C}">
-                <a14:useLocalDpi xmlns:a14="http://schemas.microsoft.com/office/drawing/2010/main" val="0"/>
-              </a:ext>
-            </a:extLst>
-          </a:blip>
-          <a:srcRect/>
-          <a:stretch>
-            <a:fillRect/>
-          </a:stretch>
-        </p:blipFill>
-        <p:spPr bwMode="auto">
-          <a:xfrm>
-            <a:off x="10413546" y="140804"/>
-            <a:ext cx="1641442" cy="358638"/>
-          </a:xfrm>
-          <a:prstGeom prst="rect">
-            <a:avLst/>
-          </a:prstGeom>
-          <a:noFill/>
-          <a:extLst>
-            <a:ext uri="{909E8E84-426E-40DD-AFC4-6F175D3DCCD1}">
-              <a14:hiddenFill xmlns:a14="http://schemas.microsoft.com/office/drawing/2010/main">
-                <a:solidFill>
-                  <a:srgbClr val="FFFFFF"/>
-                </a:solidFill>
-              </a14:hiddenFill>
-            </a:ext>
-          </a:extLst>
-        </p:spPr>
-      </p:pic>
-      <p:grpSp>
-        <p:nvGrpSpPr>
-          <p:cNvPr id="8" name="Group 7">
-            <a:extLst>
-              <a:ext uri="{FF2B5EF4-FFF2-40B4-BE49-F238E27FC236}">
-                <a16:creationId xmlns:a16="http://schemas.microsoft.com/office/drawing/2014/main" id="{2C5AB8CB-794D-4078-B667-ED59A9550133}"/>
-              </a:ext>
-            </a:extLst>
-          </p:cNvPr>
-          <p:cNvGrpSpPr/>
-          <p:nvPr/>
-        </p:nvGrpSpPr>
-        <p:grpSpPr>
-          <a:xfrm>
-            <a:off x="611720" y="1010194"/>
-            <a:ext cx="6025085" cy="5554243"/>
-            <a:chOff x="611720" y="1010194"/>
-            <a:chExt cx="6025085" cy="5554243"/>
-          </a:xfrm>
-        </p:grpSpPr>
-        <p:grpSp>
-          <p:nvGrpSpPr>
-            <p:cNvPr id="7" name="Group 6">
-              <a:extLst>
-                <a:ext uri="{FF2B5EF4-FFF2-40B4-BE49-F238E27FC236}">
-                  <a16:creationId xmlns:a16="http://schemas.microsoft.com/office/drawing/2014/main" id="{2ADBC9FF-E3A3-4375-8F4F-14C696C90F64}"/>
-                </a:ext>
-              </a:extLst>
-            </p:cNvPr>
-            <p:cNvGrpSpPr/>
-            <p:nvPr/>
-          </p:nvGrpSpPr>
-          <p:grpSpPr>
-            <a:xfrm>
-              <a:off x="621245" y="1010194"/>
-              <a:ext cx="6015560" cy="5554243"/>
-              <a:chOff x="621245" y="1010194"/>
-              <a:chExt cx="6015560" cy="5554243"/>
-            </a:xfrm>
-          </p:grpSpPr>
-          <p:pic>
-            <p:nvPicPr>
-              <p:cNvPr id="22" name="Picture 21">
-                <a:extLst>
-                  <a:ext uri="{FF2B5EF4-FFF2-40B4-BE49-F238E27FC236}">
-                    <a16:creationId xmlns:a16="http://schemas.microsoft.com/office/drawing/2014/main" id="{CB3870D8-E8AA-4129-A0A2-D088B4BC1F0C}"/>
-                  </a:ext>
-                </a:extLst>
-              </p:cNvPr>
-              <p:cNvPicPr>
-                <a:picLocks noChangeAspect="1"/>
-              </p:cNvPicPr>
-              <p:nvPr/>
-            </p:nvPicPr>
-            <p:blipFill rotWithShape="1">
-              <a:blip r:embed="rId4">
-                <a:extLst>
-                  <a:ext uri="{28A0092B-C50C-407E-A947-70E740481C1C}">
-                    <a14:useLocalDpi xmlns:a14="http://schemas.microsoft.com/office/drawing/2010/main" val="0"/>
-                  </a:ext>
-                </a:extLst>
-              </a:blip>
-              <a:srcRect l="365"/>
-              <a:stretch/>
-            </p:blipFill>
-            <p:spPr>
-              <a:xfrm>
-                <a:off x="621245" y="1010194"/>
-                <a:ext cx="6015560" cy="5554243"/>
-              </a:xfrm>
-              <a:prstGeom prst="rect">
-                <a:avLst/>
-              </a:prstGeom>
-            </p:spPr>
-          </p:pic>
-          <p:pic>
-            <p:nvPicPr>
-              <p:cNvPr id="6" name="Picture 5">
-                <a:extLst>
-                  <a:ext uri="{FF2B5EF4-FFF2-40B4-BE49-F238E27FC236}">
-                    <a16:creationId xmlns:a16="http://schemas.microsoft.com/office/drawing/2014/main" id="{F0631BF7-9094-4F85-8563-2AA956409406}"/>
-                  </a:ext>
-                </a:extLst>
-              </p:cNvPr>
-              <p:cNvPicPr>
-                <a:picLocks noChangeAspect="1"/>
-              </p:cNvPicPr>
-              <p:nvPr/>
-            </p:nvPicPr>
-            <p:blipFill>
-              <a:blip r:embed="rId5" cstate="hqprint">
-                <a:extLst>
-                  <a:ext uri="{28A0092B-C50C-407E-A947-70E740481C1C}">
-                    <a14:useLocalDpi xmlns:a14="http://schemas.microsoft.com/office/drawing/2010/main" val="0"/>
-                  </a:ext>
-                </a:extLst>
-              </a:blip>
-              <a:stretch>
-                <a:fillRect/>
-              </a:stretch>
-            </p:blipFill>
-            <p:spPr>
-              <a:xfrm>
-                <a:off x="5658419" y="4112723"/>
-                <a:ext cx="944788" cy="185207"/>
-              </a:xfrm>
-              <a:prstGeom prst="rect">
-                <a:avLst/>
-              </a:prstGeom>
-            </p:spPr>
-          </p:pic>
-        </p:grpSp>
-        <p:sp>
-          <p:nvSpPr>
-            <p:cNvPr id="3" name="Rectangle 2">
-              <a:extLst>
-                <a:ext uri="{FF2B5EF4-FFF2-40B4-BE49-F238E27FC236}">
-                  <a16:creationId xmlns:a16="http://schemas.microsoft.com/office/drawing/2014/main" id="{DB33D53D-CEA6-4793-AA59-162439CE6782}"/>
-                </a:ext>
-              </a:extLst>
-            </p:cNvPr>
-            <p:cNvSpPr/>
-            <p:nvPr/>
-          </p:nvSpPr>
-          <p:spPr>
-            <a:xfrm>
-              <a:off x="611720" y="3705225"/>
-              <a:ext cx="6015560" cy="1885950"/>
-            </a:xfrm>
-            <a:prstGeom prst="rect">
-              <a:avLst/>
-            </a:prstGeom>
-            <a:noFill/>
-            <a:ln w="57150">
-              <a:solidFill>
-                <a:schemeClr val="tx1"/>
-              </a:solidFill>
-            </a:ln>
-          </p:spPr>
-          <p:style>
-            <a:lnRef idx="2">
-              <a:schemeClr val="accent1">
-                <a:shade val="50000"/>
-              </a:schemeClr>
-            </a:lnRef>
-            <a:fillRef idx="1">
-              <a:schemeClr val="accent1"/>
-            </a:fillRef>
-            <a:effectRef idx="0">
-              <a:schemeClr val="accent1"/>
-            </a:effectRef>
-            <a:fontRef idx="minor">
-              <a:schemeClr val="lt1"/>
-            </a:fontRef>
-          </p:style>
-          <p:txBody>
-            <a:bodyPr rtlCol="0" anchor="ctr"/>
-            <a:lstStyle/>
-            <a:p>
-              <a:pPr algn="ctr"/>
-              <a:endParaRPr lang="en-US" dirty="0"/>
-            </a:p>
-          </p:txBody>
-        </p:sp>
-        <p:pic>
-          <p:nvPicPr>
-            <p:cNvPr id="9" name="Picture 8">
-              <a:extLst>
-                <a:ext uri="{FF2B5EF4-FFF2-40B4-BE49-F238E27FC236}">
-                  <a16:creationId xmlns:a16="http://schemas.microsoft.com/office/drawing/2014/main" id="{EDE515BD-8B1A-4330-8534-9E2E46624B46}"/>
-                </a:ext>
-              </a:extLst>
-            </p:cNvPr>
-            <p:cNvPicPr>
-              <a:picLocks noChangeAspect="1"/>
-            </p:cNvPicPr>
-            <p:nvPr/>
-          </p:nvPicPr>
-          <p:blipFill rotWithShape="1">
-            <a:blip r:embed="rId6" cstate="hqprint">
-              <a:extLst>
-                <a:ext uri="{28A0092B-C50C-407E-A947-70E740481C1C}">
-                  <a14:useLocalDpi xmlns:a14="http://schemas.microsoft.com/office/drawing/2010/main" val="0"/>
-                </a:ext>
-              </a:extLst>
-            </a:blip>
-            <a:srcRect t="3510" r="796" b="5034"/>
-            <a:stretch/>
-          </p:blipFill>
-          <p:spPr>
-            <a:xfrm>
-              <a:off x="5660167" y="4859532"/>
-              <a:ext cx="938277" cy="179567"/>
-            </a:xfrm>
-            <a:prstGeom prst="rect">
-              <a:avLst/>
-            </a:prstGeom>
-          </p:spPr>
-        </p:pic>
-      </p:grpSp>
-      <p:sp>
-        <p:nvSpPr>
-          <p:cNvPr id="10" name="Textfeld 9"/>
-          <p:cNvSpPr txBox="1"/>
-          <p:nvPr/>
-        </p:nvSpPr>
-        <p:spPr>
-          <a:xfrm>
-            <a:off x="1288473" y="2769478"/>
-            <a:ext cx="3649287" cy="1323439"/>
-          </a:xfrm>
-          <a:prstGeom prst="rect">
-            <a:avLst/>
-          </a:prstGeom>
-          <a:noFill/>
-        </p:spPr>
-        <p:txBody>
-          <a:bodyPr wrap="square" rtlCol="0">
-            <a:spAutoFit/>
-          </a:bodyPr>
-          <a:lstStyle/>
-          <a:p>
-            <a:r>
-              <a:rPr lang="de-DE" sz="8000" dirty="0">
-                <a:solidFill>
-                  <a:srgbClr val="FF0000"/>
-                </a:solidFill>
-              </a:rPr>
-              <a:t>UPDATE</a:t>
-            </a:r>
-            <a:endParaRPr lang="de-DE" dirty="0">
-              <a:solidFill>
-                <a:srgbClr val="FF0000"/>
-              </a:solidFill>
-            </a:endParaRPr>
-          </a:p>
-        </p:txBody>
-      </p:sp>
-    </p:spTree>
-    <p:extLst>
-      <p:ext uri="{BB962C8B-B14F-4D97-AF65-F5344CB8AC3E}">
-        <p14:creationId xmlns:p14="http://schemas.microsoft.com/office/powerpoint/2010/main" val="2913005937"/>
-      </p:ext>
-    </p:extLst>
-  </p:cSld>
-  <p:clrMapOvr>
-    <a:masterClrMapping/>
-  </p:clrMapOvr>
-</p:sld>
-</file>
-
-<file path=ppt/slides/slide6.xml><?xml version="1.0" encoding="utf-8"?>
-<p:sld xmlns:a="http://schemas.openxmlformats.org/drawingml/2006/main" xmlns:r="http://schemas.openxmlformats.org/officeDocument/2006/relationships" xmlns:p="http://schemas.openxmlformats.org/presentationml/2006/main">
-  <p:cSld>
-    <p:spTree>
-      <p:nvGrpSpPr>
-        <p:cNvPr id="1" name=""/>
-        <p:cNvGrpSpPr/>
-        <p:nvPr/>
-      </p:nvGrpSpPr>
-      <p:grpSpPr>
-        <a:xfrm>
-          <a:off x="0" y="0"/>
-          <a:ext cx="0" cy="0"/>
-          <a:chOff x="0" y="0"/>
-          <a:chExt cx="0" cy="0"/>
-        </a:xfrm>
-      </p:grpSpPr>
-      <p:pic>
-        <p:nvPicPr>
-          <p:cNvPr id="41" name="Inhaltsplatzhalter 40"/>
-          <p:cNvPicPr>
-            <a:picLocks noGrp="1" noChangeAspect="1"/>
-          </p:cNvPicPr>
-          <p:nvPr>
-            <p:ph idx="1"/>
-          </p:nvPr>
-        </p:nvPicPr>
-        <p:blipFill>
-          <a:blip r:embed="rId2">
+          <a:blip r:embed="rId6">
             <a:extLst>
               <a:ext uri="{28A0092B-C50C-407E-A947-70E740481C1C}">
                 <a14:useLocalDpi xmlns:a14="http://schemas.microsoft.com/office/drawing/2010/main" val="0"/>
@@ -5603,838 +5670,14 @@
         </p:blipFill>
         <p:spPr>
           <a:xfrm>
-            <a:off x="7367098" y="1332411"/>
-            <a:ext cx="4599625" cy="4735955"/>
-          </a:xfrm>
+            <a:off x="626570" y="1243626"/>
+            <a:ext cx="5380966" cy="4903119"/>
+          </a:xfrm>
+          <a:prstGeom prst="rect">
+            <a:avLst/>
+          </a:prstGeom>
         </p:spPr>
       </p:pic>
-      <p:sp>
-        <p:nvSpPr>
-          <p:cNvPr id="2" name="Title 1">
-            <a:extLst>
-              <a:ext uri="{FF2B5EF4-FFF2-40B4-BE49-F238E27FC236}">
-                <a16:creationId xmlns:a16="http://schemas.microsoft.com/office/drawing/2014/main" id="{8AEB4669-5D9E-428A-9F10-64DC2B65A45E}"/>
-              </a:ext>
-            </a:extLst>
-          </p:cNvPr>
-          <p:cNvSpPr>
-            <a:spLocks noGrp="1"/>
-          </p:cNvSpPr>
-          <p:nvPr>
-            <p:ph type="title"/>
-          </p:nvPr>
-        </p:nvSpPr>
-        <p:spPr>
-          <a:xfrm>
-            <a:off x="0" y="18255"/>
-            <a:ext cx="12192000" cy="991939"/>
-          </a:xfrm>
-        </p:spPr>
-        <p:txBody>
-          <a:bodyPr>
-            <a:normAutofit/>
-          </a:bodyPr>
-          <a:lstStyle/>
-          <a:p>
-            <a:r>
-              <a:rPr lang="en-US" sz="3200" b="1" dirty="0">
-                <a:solidFill>
-                  <a:srgbClr val="339966"/>
-                </a:solidFill>
-              </a:rPr>
-              <a:t>Sapient </a:t>
-            </a:r>
-            <a:r>
-              <a:rPr lang="en-US" sz="3200" b="1" dirty="0" err="1">
-                <a:solidFill>
-                  <a:srgbClr val="339966"/>
-                </a:solidFill>
-              </a:rPr>
-              <a:t>Boardlet</a:t>
-            </a:r>
-            <a:br>
-              <a:rPr lang="en-US" sz="3200" b="1" dirty="0">
-                <a:solidFill>
-                  <a:srgbClr val="339966"/>
-                </a:solidFill>
-              </a:rPr>
-            </a:br>
-            <a:r>
-              <a:rPr lang="en-US" sz="1600" b="1" dirty="0">
-                <a:solidFill>
-                  <a:schemeClr val="bg1">
-                    <a:lumMod val="50000"/>
-                  </a:schemeClr>
-                </a:solidFill>
-              </a:rPr>
-              <a:t>Weekly Sprint 10</a:t>
-            </a:r>
-            <a:endParaRPr lang="en-US" sz="3200" dirty="0">
-              <a:solidFill>
-                <a:schemeClr val="bg1">
-                  <a:lumMod val="50000"/>
-                </a:schemeClr>
-              </a:solidFill>
-            </a:endParaRPr>
-          </a:p>
-        </p:txBody>
-      </p:sp>
-      <p:pic>
-        <p:nvPicPr>
-          <p:cNvPr id="9" name="Picture 2" descr="Image result for gefasoft logo svg">
-            <a:extLst>
-              <a:ext uri="{FF2B5EF4-FFF2-40B4-BE49-F238E27FC236}">
-                <a16:creationId xmlns:a16="http://schemas.microsoft.com/office/drawing/2014/main" id="{9E2A0D8B-D921-4381-A883-E701EB432AE7}"/>
-              </a:ext>
-            </a:extLst>
-          </p:cNvPr>
-          <p:cNvPicPr>
-            <a:picLocks noChangeAspect="1" noChangeArrowheads="1"/>
-          </p:cNvPicPr>
-          <p:nvPr/>
-        </p:nvPicPr>
-        <p:blipFill>
-          <a:blip r:embed="rId3" cstate="hqprint">
-            <a:extLst>
-              <a:ext uri="{BEBA8EAE-BF5A-486C-A8C5-ECC9F3942E4B}">
-                <a14:imgProps xmlns:a14="http://schemas.microsoft.com/office/drawing/2010/main">
-                  <a14:imgLayer r:embed="rId4">
-                    <a14:imgEffect>
-                      <a14:backgroundRemoval t="9109" b="95736" l="1482" r="99915">
-                        <a14:foregroundMark x1="19094" y1="9496" x2="19094" y2="9496"/>
-                        <a14:foregroundMark x1="4742" y1="19186" x2="4742" y2="19186"/>
-                        <a14:foregroundMark x1="1566" y1="45930" x2="1566" y2="45930"/>
-                        <a14:foregroundMark x1="20152" y1="96124" x2="20152" y2="96124"/>
-                        <a14:foregroundMark x1="39797" y1="58721" x2="39797" y2="58721"/>
-                        <a14:foregroundMark x1="51524" y1="44767" x2="51524" y2="44767"/>
-                        <a14:foregroundMark x1="58086" y1="43217" x2="58086" y2="43217"/>
-                        <a14:foregroundMark x1="64310" y1="42054" x2="64310" y2="42054"/>
-                        <a14:foregroundMark x1="72142" y1="42442" x2="72142" y2="42442"/>
-                        <a14:foregroundMark x1="78535" y1="42054" x2="78535" y2="42054"/>
-                        <a14:foregroundMark x1="89839" y1="29070" x2="89839" y2="29070"/>
-                        <a14:foregroundMark x1="95809" y1="25194" x2="95809" y2="25194"/>
-                        <a14:foregroundMark x1="99915" y1="24806" x2="99915" y2="24806"/>
-                      </a14:backgroundRemoval>
-                    </a14:imgEffect>
-                  </a14:imgLayer>
-                </a14:imgProps>
-              </a:ext>
-              <a:ext uri="{28A0092B-C50C-407E-A947-70E740481C1C}">
-                <a14:useLocalDpi xmlns:a14="http://schemas.microsoft.com/office/drawing/2010/main" val="0"/>
-              </a:ext>
-            </a:extLst>
-          </a:blip>
-          <a:srcRect/>
-          <a:stretch>
-            <a:fillRect/>
-          </a:stretch>
-        </p:blipFill>
-        <p:spPr bwMode="auto">
-          <a:xfrm>
-            <a:off x="10413546" y="140804"/>
-            <a:ext cx="1641442" cy="358638"/>
-          </a:xfrm>
-          <a:prstGeom prst="rect">
-            <a:avLst/>
-          </a:prstGeom>
-          <a:noFill/>
-          <a:extLst>
-            <a:ext uri="{909E8E84-426E-40DD-AFC4-6F175D3DCCD1}">
-              <a14:hiddenFill xmlns:a14="http://schemas.microsoft.com/office/drawing/2010/main">
-                <a:solidFill>
-                  <a:srgbClr val="FFFFFF"/>
-                </a:solidFill>
-              </a14:hiddenFill>
-            </a:ext>
-          </a:extLst>
-        </p:spPr>
-      </p:pic>
-      <p:sp>
-        <p:nvSpPr>
-          <p:cNvPr id="10" name="Right Bracket 35">
-            <a:extLst>
-              <a:ext uri="{FF2B5EF4-FFF2-40B4-BE49-F238E27FC236}">
-                <a16:creationId xmlns:a16="http://schemas.microsoft.com/office/drawing/2014/main" id="{CAAE665C-FA15-4AB5-B2E9-48AC00666170}"/>
-              </a:ext>
-            </a:extLst>
-          </p:cNvPr>
-          <p:cNvSpPr/>
-          <p:nvPr/>
-        </p:nvSpPr>
-        <p:spPr>
-          <a:xfrm>
-            <a:off x="6288694" y="2057288"/>
-            <a:ext cx="45719" cy="590804"/>
-          </a:xfrm>
-          <a:prstGeom prst="rightBracket">
-            <a:avLst/>
-          </a:prstGeom>
-          <a:ln w="19050">
-            <a:solidFill>
-              <a:schemeClr val="tx1"/>
-            </a:solidFill>
-          </a:ln>
-        </p:spPr>
-        <p:style>
-          <a:lnRef idx="1">
-            <a:schemeClr val="accent1"/>
-          </a:lnRef>
-          <a:fillRef idx="0">
-            <a:schemeClr val="accent1"/>
-          </a:fillRef>
-          <a:effectRef idx="0">
-            <a:schemeClr val="accent1"/>
-          </a:effectRef>
-          <a:fontRef idx="minor">
-            <a:schemeClr val="tx1"/>
-          </a:fontRef>
-        </p:style>
-        <p:txBody>
-          <a:bodyPr rtlCol="0" anchor="ctr"/>
-          <a:lstStyle/>
-          <a:p>
-            <a:pPr algn="ctr"/>
-            <a:endParaRPr lang="en-US">
-              <a:solidFill>
-                <a:srgbClr val="339966"/>
-              </a:solidFill>
-            </a:endParaRPr>
-          </a:p>
-        </p:txBody>
-      </p:sp>
-      <p:sp>
-        <p:nvSpPr>
-          <p:cNvPr id="12" name="Right Bracket 36">
-            <a:extLst>
-              <a:ext uri="{FF2B5EF4-FFF2-40B4-BE49-F238E27FC236}">
-                <a16:creationId xmlns:a16="http://schemas.microsoft.com/office/drawing/2014/main" id="{C74632AD-604D-40CC-92E7-8B6AF971D9CA}"/>
-              </a:ext>
-            </a:extLst>
-          </p:cNvPr>
-          <p:cNvSpPr/>
-          <p:nvPr/>
-        </p:nvSpPr>
-        <p:spPr>
-          <a:xfrm>
-            <a:off x="6288621" y="3695186"/>
-            <a:ext cx="45719" cy="1756815"/>
-          </a:xfrm>
-          <a:prstGeom prst="rightBracket">
-            <a:avLst/>
-          </a:prstGeom>
-          <a:ln w="19050">
-            <a:solidFill>
-              <a:schemeClr val="tx1"/>
-            </a:solidFill>
-          </a:ln>
-        </p:spPr>
-        <p:style>
-          <a:lnRef idx="1">
-            <a:schemeClr val="accent1"/>
-          </a:lnRef>
-          <a:fillRef idx="0">
-            <a:schemeClr val="accent1"/>
-          </a:fillRef>
-          <a:effectRef idx="0">
-            <a:schemeClr val="accent1"/>
-          </a:effectRef>
-          <a:fontRef idx="minor">
-            <a:schemeClr val="tx1"/>
-          </a:fontRef>
-        </p:style>
-        <p:txBody>
-          <a:bodyPr rtlCol="0" anchor="ctr"/>
-          <a:lstStyle/>
-          <a:p>
-            <a:pPr algn="ctr"/>
-            <a:endParaRPr lang="en-US"/>
-          </a:p>
-        </p:txBody>
-      </p:sp>
-      <p:sp>
-        <p:nvSpPr>
-          <p:cNvPr id="15" name="TextBox 65">
-            <a:extLst>
-              <a:ext uri="{FF2B5EF4-FFF2-40B4-BE49-F238E27FC236}">
-                <a16:creationId xmlns:a16="http://schemas.microsoft.com/office/drawing/2014/main" id="{78975B84-9F14-4273-97A7-41079DFED422}"/>
-              </a:ext>
-            </a:extLst>
-          </p:cNvPr>
-          <p:cNvSpPr txBox="1"/>
-          <p:nvPr/>
-        </p:nvSpPr>
-        <p:spPr>
-          <a:xfrm>
-            <a:off x="6304132" y="4358149"/>
-            <a:ext cx="976704" cy="430887"/>
-          </a:xfrm>
-          <a:prstGeom prst="rect">
-            <a:avLst/>
-          </a:prstGeom>
-          <a:noFill/>
-        </p:spPr>
-        <p:txBody>
-          <a:bodyPr wrap="square" rtlCol="0">
-            <a:spAutoFit/>
-          </a:bodyPr>
-          <a:lstStyle/>
-          <a:p>
-            <a:r>
-              <a:rPr lang="en-US" sz="1050" dirty="0"/>
-              <a:t>In client- background</a:t>
-            </a:r>
-          </a:p>
-        </p:txBody>
-      </p:sp>
-      <p:sp>
-        <p:nvSpPr>
-          <p:cNvPr id="19" name="TextBox 65">
-            <a:extLst>
-              <a:ext uri="{FF2B5EF4-FFF2-40B4-BE49-F238E27FC236}">
-                <a16:creationId xmlns:a16="http://schemas.microsoft.com/office/drawing/2014/main" id="{78975B84-9F14-4273-97A7-41079DFED422}"/>
-              </a:ext>
-            </a:extLst>
-          </p:cNvPr>
-          <p:cNvSpPr txBox="1"/>
-          <p:nvPr/>
-        </p:nvSpPr>
-        <p:spPr>
-          <a:xfrm>
-            <a:off x="6311480" y="2157258"/>
-            <a:ext cx="976704" cy="430887"/>
-          </a:xfrm>
-          <a:prstGeom prst="rect">
-            <a:avLst/>
-          </a:prstGeom>
-          <a:noFill/>
-        </p:spPr>
-        <p:txBody>
-          <a:bodyPr wrap="square" rtlCol="0">
-            <a:spAutoFit/>
-          </a:bodyPr>
-          <a:lstStyle/>
-          <a:p>
-            <a:r>
-              <a:rPr lang="en-US" sz="1050" dirty="0"/>
-              <a:t>In client- background</a:t>
-            </a:r>
-          </a:p>
-        </p:txBody>
-      </p:sp>
-      <p:grpSp>
-        <p:nvGrpSpPr>
-          <p:cNvPr id="5" name="Gruppieren 4"/>
-          <p:cNvGrpSpPr/>
-          <p:nvPr/>
-        </p:nvGrpSpPr>
-        <p:grpSpPr>
-          <a:xfrm>
-            <a:off x="430415" y="1332411"/>
-            <a:ext cx="5827510" cy="4739187"/>
-            <a:chOff x="430415" y="1332411"/>
-            <a:chExt cx="5827510" cy="4739187"/>
-          </a:xfrm>
-        </p:grpSpPr>
-        <p:pic>
-          <p:nvPicPr>
-            <p:cNvPr id="7" name="Picture 6">
-              <a:extLst>
-                <a:ext uri="{FF2B5EF4-FFF2-40B4-BE49-F238E27FC236}">
-                  <a16:creationId xmlns:a16="http://schemas.microsoft.com/office/drawing/2014/main" id="{BCB81954-080C-4557-AE15-EDA943CED04E}"/>
-                </a:ext>
-              </a:extLst>
-            </p:cNvPr>
-            <p:cNvPicPr>
-              <a:picLocks noChangeAspect="1"/>
-            </p:cNvPicPr>
-            <p:nvPr/>
-          </p:nvPicPr>
-          <p:blipFill rotWithShape="1">
-            <a:blip r:embed="rId5">
-              <a:extLst>
-                <a:ext uri="{28A0092B-C50C-407E-A947-70E740481C1C}">
-                  <a14:useLocalDpi xmlns:a14="http://schemas.microsoft.com/office/drawing/2010/main" val="0"/>
-                </a:ext>
-              </a:extLst>
-            </a:blip>
-            <a:srcRect t="326"/>
-            <a:stretch/>
-          </p:blipFill>
-          <p:spPr>
-            <a:xfrm>
-              <a:off x="430415" y="1332411"/>
-              <a:ext cx="5827510" cy="4739187"/>
-            </a:xfrm>
-            <a:prstGeom prst="rect">
-              <a:avLst/>
-            </a:prstGeom>
-          </p:spPr>
-        </p:pic>
-        <p:pic>
-          <p:nvPicPr>
-            <p:cNvPr id="11" name="Picture 10">
-              <a:extLst>
-                <a:ext uri="{FF2B5EF4-FFF2-40B4-BE49-F238E27FC236}">
-                  <a16:creationId xmlns:a16="http://schemas.microsoft.com/office/drawing/2014/main" id="{A856A323-56B0-4E2B-B967-EF66BDAAAC53}"/>
-                </a:ext>
-              </a:extLst>
-            </p:cNvPr>
-            <p:cNvPicPr>
-              <a:picLocks noChangeAspect="1"/>
-            </p:cNvPicPr>
-            <p:nvPr/>
-          </p:nvPicPr>
-          <p:blipFill rotWithShape="1">
-            <a:blip r:embed="rId6" cstate="hqprint">
-              <a:extLst>
-                <a:ext uri="{28A0092B-C50C-407E-A947-70E740481C1C}">
-                  <a14:useLocalDpi xmlns:a14="http://schemas.microsoft.com/office/drawing/2010/main" val="0"/>
-                </a:ext>
-              </a:extLst>
-            </a:blip>
-            <a:srcRect t="3510" r="796" b="5034"/>
-            <a:stretch/>
-          </p:blipFill>
-          <p:spPr>
-            <a:xfrm>
-              <a:off x="5302979" y="3169446"/>
-              <a:ext cx="938277" cy="179567"/>
-            </a:xfrm>
-            <a:prstGeom prst="rect">
-              <a:avLst/>
-            </a:prstGeom>
-          </p:spPr>
-        </p:pic>
-      </p:grpSp>
-      <p:sp>
-        <p:nvSpPr>
-          <p:cNvPr id="29" name="TextBox 65">
-            <a:extLst>
-              <a:ext uri="{FF2B5EF4-FFF2-40B4-BE49-F238E27FC236}">
-                <a16:creationId xmlns:a16="http://schemas.microsoft.com/office/drawing/2014/main" id="{78975B84-9F14-4273-97A7-41079DFED422}"/>
-              </a:ext>
-            </a:extLst>
-          </p:cNvPr>
-          <p:cNvSpPr txBox="1"/>
-          <p:nvPr/>
-        </p:nvSpPr>
-        <p:spPr>
-          <a:xfrm>
-            <a:off x="6192310" y="1673157"/>
-            <a:ext cx="238340" cy="276999"/>
-          </a:xfrm>
-          <a:prstGeom prst="rect">
-            <a:avLst/>
-          </a:prstGeom>
-          <a:noFill/>
-        </p:spPr>
-        <p:txBody>
-          <a:bodyPr wrap="square" rtlCol="0">
-            <a:spAutoFit/>
-          </a:bodyPr>
-          <a:lstStyle/>
-          <a:p>
-            <a:r>
-              <a:rPr lang="en-US" sz="1200" b="1" dirty="0"/>
-              <a:t>1</a:t>
-            </a:r>
-          </a:p>
-        </p:txBody>
-      </p:sp>
-      <p:sp>
-        <p:nvSpPr>
-          <p:cNvPr id="31" name="TextBox 65">
-            <a:extLst>
-              <a:ext uri="{FF2B5EF4-FFF2-40B4-BE49-F238E27FC236}">
-                <a16:creationId xmlns:a16="http://schemas.microsoft.com/office/drawing/2014/main" id="{78975B84-9F14-4273-97A7-41079DFED422}"/>
-              </a:ext>
-            </a:extLst>
-          </p:cNvPr>
-          <p:cNvSpPr txBox="1"/>
-          <p:nvPr/>
-        </p:nvSpPr>
-        <p:spPr>
-          <a:xfrm>
-            <a:off x="7265001" y="1593863"/>
-            <a:ext cx="238340" cy="338554"/>
-          </a:xfrm>
-          <a:prstGeom prst="rect">
-            <a:avLst/>
-          </a:prstGeom>
-          <a:noFill/>
-        </p:spPr>
-        <p:txBody>
-          <a:bodyPr wrap="square" rtlCol="0">
-            <a:spAutoFit/>
-          </a:bodyPr>
-          <a:lstStyle/>
-          <a:p>
-            <a:r>
-              <a:rPr lang="en-US" sz="1600" b="1" dirty="0"/>
-              <a:t>1</a:t>
-            </a:r>
-            <a:endParaRPr lang="en-US" sz="1400" b="1" dirty="0"/>
-          </a:p>
-        </p:txBody>
-      </p:sp>
-      <p:sp>
-        <p:nvSpPr>
-          <p:cNvPr id="32" name="TextBox 65">
-            <a:extLst>
-              <a:ext uri="{FF2B5EF4-FFF2-40B4-BE49-F238E27FC236}">
-                <a16:creationId xmlns:a16="http://schemas.microsoft.com/office/drawing/2014/main" id="{78975B84-9F14-4273-97A7-41079DFED422}"/>
-              </a:ext>
-            </a:extLst>
-          </p:cNvPr>
-          <p:cNvSpPr txBox="1"/>
-          <p:nvPr/>
-        </p:nvSpPr>
-        <p:spPr>
-          <a:xfrm>
-            <a:off x="6192310" y="2609562"/>
-            <a:ext cx="238340" cy="276999"/>
-          </a:xfrm>
-          <a:prstGeom prst="rect">
-            <a:avLst/>
-          </a:prstGeom>
-          <a:noFill/>
-        </p:spPr>
-        <p:txBody>
-          <a:bodyPr wrap="square" rtlCol="0">
-            <a:spAutoFit/>
-          </a:bodyPr>
-          <a:lstStyle/>
-          <a:p>
-            <a:r>
-              <a:rPr lang="en-US" sz="1200" b="1" dirty="0"/>
-              <a:t>2</a:t>
-            </a:r>
-          </a:p>
-        </p:txBody>
-      </p:sp>
-      <p:sp>
-        <p:nvSpPr>
-          <p:cNvPr id="33" name="TextBox 65">
-            <a:extLst>
-              <a:ext uri="{FF2B5EF4-FFF2-40B4-BE49-F238E27FC236}">
-                <a16:creationId xmlns:a16="http://schemas.microsoft.com/office/drawing/2014/main" id="{78975B84-9F14-4273-97A7-41079DFED422}"/>
-              </a:ext>
-            </a:extLst>
-          </p:cNvPr>
-          <p:cNvSpPr txBox="1"/>
-          <p:nvPr/>
-        </p:nvSpPr>
-        <p:spPr>
-          <a:xfrm>
-            <a:off x="6192310" y="2769478"/>
-            <a:ext cx="238340" cy="276999"/>
-          </a:xfrm>
-          <a:prstGeom prst="rect">
-            <a:avLst/>
-          </a:prstGeom>
-          <a:noFill/>
-        </p:spPr>
-        <p:txBody>
-          <a:bodyPr wrap="square" rtlCol="0">
-            <a:spAutoFit/>
-          </a:bodyPr>
-          <a:lstStyle/>
-          <a:p>
-            <a:r>
-              <a:rPr lang="en-US" sz="1200" b="1" dirty="0"/>
-              <a:t>3</a:t>
-            </a:r>
-          </a:p>
-        </p:txBody>
-      </p:sp>
-      <p:sp>
-        <p:nvSpPr>
-          <p:cNvPr id="34" name="TextBox 65">
-            <a:extLst>
-              <a:ext uri="{FF2B5EF4-FFF2-40B4-BE49-F238E27FC236}">
-                <a16:creationId xmlns:a16="http://schemas.microsoft.com/office/drawing/2014/main" id="{78975B84-9F14-4273-97A7-41079DFED422}"/>
-              </a:ext>
-            </a:extLst>
-          </p:cNvPr>
-          <p:cNvSpPr txBox="1"/>
-          <p:nvPr/>
-        </p:nvSpPr>
-        <p:spPr>
-          <a:xfrm>
-            <a:off x="6193080" y="2945164"/>
-            <a:ext cx="238340" cy="276999"/>
-          </a:xfrm>
-          <a:prstGeom prst="rect">
-            <a:avLst/>
-          </a:prstGeom>
-          <a:noFill/>
-        </p:spPr>
-        <p:txBody>
-          <a:bodyPr wrap="square" rtlCol="0">
-            <a:spAutoFit/>
-          </a:bodyPr>
-          <a:lstStyle/>
-          <a:p>
-            <a:r>
-              <a:rPr lang="en-US" sz="1200" b="1" dirty="0"/>
-              <a:t>4</a:t>
-            </a:r>
-          </a:p>
-        </p:txBody>
-      </p:sp>
-      <p:sp>
-        <p:nvSpPr>
-          <p:cNvPr id="35" name="TextBox 65">
-            <a:extLst>
-              <a:ext uri="{FF2B5EF4-FFF2-40B4-BE49-F238E27FC236}">
-                <a16:creationId xmlns:a16="http://schemas.microsoft.com/office/drawing/2014/main" id="{78975B84-9F14-4273-97A7-41079DFED422}"/>
-              </a:ext>
-            </a:extLst>
-          </p:cNvPr>
-          <p:cNvSpPr txBox="1"/>
-          <p:nvPr/>
-        </p:nvSpPr>
-        <p:spPr>
-          <a:xfrm>
-            <a:off x="6192310" y="3135684"/>
-            <a:ext cx="238340" cy="276999"/>
-          </a:xfrm>
-          <a:prstGeom prst="rect">
-            <a:avLst/>
-          </a:prstGeom>
-          <a:noFill/>
-        </p:spPr>
-        <p:txBody>
-          <a:bodyPr wrap="square" rtlCol="0">
-            <a:spAutoFit/>
-          </a:bodyPr>
-          <a:lstStyle/>
-          <a:p>
-            <a:r>
-              <a:rPr lang="en-US" sz="1200" b="1" dirty="0"/>
-              <a:t>5</a:t>
-            </a:r>
-          </a:p>
-        </p:txBody>
-      </p:sp>
-      <p:sp>
-        <p:nvSpPr>
-          <p:cNvPr id="36" name="TextBox 65">
-            <a:extLst>
-              <a:ext uri="{FF2B5EF4-FFF2-40B4-BE49-F238E27FC236}">
-                <a16:creationId xmlns:a16="http://schemas.microsoft.com/office/drawing/2014/main" id="{78975B84-9F14-4273-97A7-41079DFED422}"/>
-              </a:ext>
-            </a:extLst>
-          </p:cNvPr>
-          <p:cNvSpPr txBox="1"/>
-          <p:nvPr/>
-        </p:nvSpPr>
-        <p:spPr>
-          <a:xfrm>
-            <a:off x="7411906" y="1960822"/>
-            <a:ext cx="238340" cy="338554"/>
-          </a:xfrm>
-          <a:prstGeom prst="rect">
-            <a:avLst/>
-          </a:prstGeom>
-          <a:noFill/>
-        </p:spPr>
-        <p:txBody>
-          <a:bodyPr wrap="square" rtlCol="0">
-            <a:spAutoFit/>
-          </a:bodyPr>
-          <a:lstStyle/>
-          <a:p>
-            <a:r>
-              <a:rPr lang="en-US" sz="1600" b="1" dirty="0"/>
-              <a:t>2</a:t>
-            </a:r>
-            <a:endParaRPr lang="en-US" sz="1400" b="1" dirty="0"/>
-          </a:p>
-        </p:txBody>
-      </p:sp>
-      <p:sp>
-        <p:nvSpPr>
-          <p:cNvPr id="37" name="TextBox 65">
-            <a:extLst>
-              <a:ext uri="{FF2B5EF4-FFF2-40B4-BE49-F238E27FC236}">
-                <a16:creationId xmlns:a16="http://schemas.microsoft.com/office/drawing/2014/main" id="{78975B84-9F14-4273-97A7-41079DFED422}"/>
-              </a:ext>
-            </a:extLst>
-          </p:cNvPr>
-          <p:cNvSpPr txBox="1"/>
-          <p:nvPr/>
-        </p:nvSpPr>
-        <p:spPr>
-          <a:xfrm>
-            <a:off x="7413322" y="2130100"/>
-            <a:ext cx="238340" cy="338554"/>
-          </a:xfrm>
-          <a:prstGeom prst="rect">
-            <a:avLst/>
-          </a:prstGeom>
-          <a:noFill/>
-        </p:spPr>
-        <p:txBody>
-          <a:bodyPr wrap="square" rtlCol="0">
-            <a:spAutoFit/>
-          </a:bodyPr>
-          <a:lstStyle/>
-          <a:p>
-            <a:r>
-              <a:rPr lang="en-US" sz="1600" b="1" dirty="0"/>
-              <a:t>3</a:t>
-            </a:r>
-            <a:endParaRPr lang="en-US" sz="1400" b="1" dirty="0"/>
-          </a:p>
-        </p:txBody>
-      </p:sp>
-      <p:sp>
-        <p:nvSpPr>
-          <p:cNvPr id="38" name="TextBox 65">
-            <a:extLst>
-              <a:ext uri="{FF2B5EF4-FFF2-40B4-BE49-F238E27FC236}">
-                <a16:creationId xmlns:a16="http://schemas.microsoft.com/office/drawing/2014/main" id="{78975B84-9F14-4273-97A7-41079DFED422}"/>
-              </a:ext>
-            </a:extLst>
-          </p:cNvPr>
-          <p:cNvSpPr txBox="1"/>
-          <p:nvPr/>
-        </p:nvSpPr>
-        <p:spPr>
-          <a:xfrm>
-            <a:off x="7430658" y="5444524"/>
-            <a:ext cx="238340" cy="338554"/>
-          </a:xfrm>
-          <a:prstGeom prst="rect">
-            <a:avLst/>
-          </a:prstGeom>
-          <a:noFill/>
-        </p:spPr>
-        <p:txBody>
-          <a:bodyPr wrap="square" rtlCol="0">
-            <a:spAutoFit/>
-          </a:bodyPr>
-          <a:lstStyle/>
-          <a:p>
-            <a:r>
-              <a:rPr lang="en-US" sz="1600" b="1" dirty="0"/>
-              <a:t>4</a:t>
-            </a:r>
-            <a:endParaRPr lang="en-US" sz="1400" b="1" dirty="0"/>
-          </a:p>
-        </p:txBody>
-      </p:sp>
-      <p:sp>
-        <p:nvSpPr>
-          <p:cNvPr id="39" name="TextBox 65">
-            <a:extLst>
-              <a:ext uri="{FF2B5EF4-FFF2-40B4-BE49-F238E27FC236}">
-                <a16:creationId xmlns:a16="http://schemas.microsoft.com/office/drawing/2014/main" id="{78975B84-9F14-4273-97A7-41079DFED422}"/>
-              </a:ext>
-            </a:extLst>
-          </p:cNvPr>
-          <p:cNvSpPr txBox="1"/>
-          <p:nvPr/>
-        </p:nvSpPr>
-        <p:spPr>
-          <a:xfrm>
-            <a:off x="7429888" y="5671690"/>
-            <a:ext cx="238340" cy="338554"/>
-          </a:xfrm>
-          <a:prstGeom prst="rect">
-            <a:avLst/>
-          </a:prstGeom>
-          <a:noFill/>
-        </p:spPr>
-        <p:txBody>
-          <a:bodyPr wrap="square" rtlCol="0">
-            <a:spAutoFit/>
-          </a:bodyPr>
-          <a:lstStyle/>
-          <a:p>
-            <a:r>
-              <a:rPr lang="en-US" sz="1600" b="1" dirty="0"/>
-              <a:t>5</a:t>
-            </a:r>
-            <a:endParaRPr lang="en-US" sz="1400" b="1" dirty="0"/>
-          </a:p>
-        </p:txBody>
-      </p:sp>
-      <p:sp>
-        <p:nvSpPr>
-          <p:cNvPr id="42" name="TextBox 65">
-            <a:extLst>
-              <a:ext uri="{FF2B5EF4-FFF2-40B4-BE49-F238E27FC236}">
-                <a16:creationId xmlns:a16="http://schemas.microsoft.com/office/drawing/2014/main" id="{78975B84-9F14-4273-97A7-41079DFED422}"/>
-              </a:ext>
-            </a:extLst>
-          </p:cNvPr>
-          <p:cNvSpPr txBox="1"/>
-          <p:nvPr/>
-        </p:nvSpPr>
-        <p:spPr>
-          <a:xfrm>
-            <a:off x="9632838" y="5444524"/>
-            <a:ext cx="238340" cy="338554"/>
-          </a:xfrm>
-          <a:prstGeom prst="rect">
-            <a:avLst/>
-          </a:prstGeom>
-          <a:noFill/>
-        </p:spPr>
-        <p:txBody>
-          <a:bodyPr wrap="square" rtlCol="0">
-            <a:spAutoFit/>
-          </a:bodyPr>
-          <a:lstStyle/>
-          <a:p>
-            <a:r>
-              <a:rPr lang="en-US" sz="1600" b="1" dirty="0"/>
-              <a:t>4</a:t>
-            </a:r>
-            <a:endParaRPr lang="en-US" sz="1400" b="1" dirty="0"/>
-          </a:p>
-        </p:txBody>
-      </p:sp>
-      <p:sp>
-        <p:nvSpPr>
-          <p:cNvPr id="3" name="Textfeld 2"/>
-          <p:cNvSpPr txBox="1"/>
-          <p:nvPr/>
-        </p:nvSpPr>
-        <p:spPr>
-          <a:xfrm>
-            <a:off x="1288473" y="2769478"/>
-            <a:ext cx="3649287" cy="1323439"/>
-          </a:xfrm>
-          <a:prstGeom prst="rect">
-            <a:avLst/>
-          </a:prstGeom>
-          <a:noFill/>
-        </p:spPr>
-        <p:txBody>
-          <a:bodyPr wrap="square" rtlCol="0">
-            <a:spAutoFit/>
-          </a:bodyPr>
-          <a:lstStyle/>
-          <a:p>
-            <a:r>
-              <a:rPr lang="de-DE" sz="8000" dirty="0">
-                <a:solidFill>
-                  <a:srgbClr val="FF0000"/>
-                </a:solidFill>
-              </a:rPr>
-              <a:t>UPDATE</a:t>
-            </a:r>
-            <a:endParaRPr lang="de-DE" dirty="0">
-              <a:solidFill>
-                <a:srgbClr val="FF0000"/>
-              </a:solidFill>
-            </a:endParaRPr>
-          </a:p>
-        </p:txBody>
-      </p:sp>
     </p:spTree>
     <p:extLst>
       <p:ext uri="{BB962C8B-B14F-4D97-AF65-F5344CB8AC3E}">
@@ -6445,6 +5688,13 @@
   <p:clrMapOvr>
     <a:masterClrMapping/>
   </p:clrMapOvr>
+  <p:timing>
+    <p:tnLst>
+      <p:par>
+        <p:cTn id="1" dur="indefinite" restart="never" nodeType="tmRoot"/>
+      </p:par>
+    </p:tnLst>
+  </p:timing>
 </p:sld>
 </file>
 
@@ -11892,611 +11142,17 @@
   <p:clrMapOvr>
     <a:masterClrMapping/>
   </p:clrMapOvr>
+  <p:timing>
+    <p:tnLst>
+      <p:par>
+        <p:cTn id="1" dur="indefinite" restart="never" nodeType="tmRoot"/>
+      </p:par>
+    </p:tnLst>
+  </p:timing>
 </p:sld>
 </file>
 
 <file path=ppt/slides/slide8.xml><?xml version="1.0" encoding="utf-8"?>
-<p:sld xmlns:a="http://schemas.openxmlformats.org/drawingml/2006/main" xmlns:r="http://schemas.openxmlformats.org/officeDocument/2006/relationships" xmlns:p="http://schemas.openxmlformats.org/presentationml/2006/main">
-  <p:cSld>
-    <p:spTree>
-      <p:nvGrpSpPr>
-        <p:cNvPr id="1" name=""/>
-        <p:cNvGrpSpPr/>
-        <p:nvPr/>
-      </p:nvGrpSpPr>
-      <p:grpSpPr>
-        <a:xfrm>
-          <a:off x="0" y="0"/>
-          <a:ext cx="0" cy="0"/>
-          <a:chOff x="0" y="0"/>
-          <a:chExt cx="0" cy="0"/>
-        </a:xfrm>
-      </p:grpSpPr>
-      <p:sp>
-        <p:nvSpPr>
-          <p:cNvPr id="2" name="Title 1">
-            <a:extLst>
-              <a:ext uri="{FF2B5EF4-FFF2-40B4-BE49-F238E27FC236}">
-                <a16:creationId xmlns:a16="http://schemas.microsoft.com/office/drawing/2014/main" id="{8AEB4669-5D9E-428A-9F10-64DC2B65A45E}"/>
-              </a:ext>
-            </a:extLst>
-          </p:cNvPr>
-          <p:cNvSpPr>
-            <a:spLocks noGrp="1"/>
-          </p:cNvSpPr>
-          <p:nvPr>
-            <p:ph type="title"/>
-          </p:nvPr>
-        </p:nvSpPr>
-        <p:spPr>
-          <a:xfrm>
-            <a:off x="0" y="18255"/>
-            <a:ext cx="12192000" cy="991939"/>
-          </a:xfrm>
-        </p:spPr>
-        <p:txBody>
-          <a:bodyPr>
-            <a:normAutofit/>
-          </a:bodyPr>
-          <a:lstStyle/>
-          <a:p>
-            <a:r>
-              <a:rPr lang="en-GB" sz="3200" b="1" dirty="0">
-                <a:solidFill>
-                  <a:srgbClr val="339966"/>
-                </a:solidFill>
-              </a:rPr>
-              <a:t>3.4.8 – Vertex Layout Algorithm</a:t>
-            </a:r>
-            <a:br>
-              <a:rPr lang="en-GB" sz="3200" b="1" dirty="0">
-                <a:solidFill>
-                  <a:srgbClr val="339966"/>
-                </a:solidFill>
-              </a:rPr>
-            </a:br>
-            <a:r>
-              <a:rPr lang="en-GB" sz="1600" b="1" dirty="0">
-                <a:solidFill>
-                  <a:schemeClr val="bg1">
-                    <a:lumMod val="50000"/>
-                  </a:schemeClr>
-                </a:solidFill>
-              </a:rPr>
-              <a:t>Concept</a:t>
-            </a:r>
-            <a:endParaRPr lang="en-GB" sz="3200" dirty="0">
-              <a:solidFill>
-                <a:schemeClr val="bg1">
-                  <a:lumMod val="50000"/>
-                </a:schemeClr>
-              </a:solidFill>
-            </a:endParaRPr>
-          </a:p>
-        </p:txBody>
-      </p:sp>
-      <p:pic>
-        <p:nvPicPr>
-          <p:cNvPr id="9" name="Picture 2" descr="Image result for gefasoft logo svg">
-            <a:extLst>
-              <a:ext uri="{FF2B5EF4-FFF2-40B4-BE49-F238E27FC236}">
-                <a16:creationId xmlns:a16="http://schemas.microsoft.com/office/drawing/2014/main" id="{9E2A0D8B-D921-4381-A883-E701EB432AE7}"/>
-              </a:ext>
-            </a:extLst>
-          </p:cNvPr>
-          <p:cNvPicPr>
-            <a:picLocks noChangeAspect="1" noChangeArrowheads="1"/>
-          </p:cNvPicPr>
-          <p:nvPr/>
-        </p:nvPicPr>
-        <p:blipFill>
-          <a:blip r:embed="rId2" cstate="hqprint">
-            <a:extLst>
-              <a:ext uri="{BEBA8EAE-BF5A-486C-A8C5-ECC9F3942E4B}">
-                <a14:imgProps xmlns:a14="http://schemas.microsoft.com/office/drawing/2010/main">
-                  <a14:imgLayer r:embed="rId3">
-                    <a14:imgEffect>
-                      <a14:backgroundRemoval t="9109" b="95736" l="1482" r="99915">
-                        <a14:foregroundMark x1="19094" y1="9496" x2="19094" y2="9496"/>
-                        <a14:foregroundMark x1="4742" y1="19186" x2="4742" y2="19186"/>
-                        <a14:foregroundMark x1="1566" y1="45930" x2="1566" y2="45930"/>
-                        <a14:foregroundMark x1="20152" y1="96124" x2="20152" y2="96124"/>
-                        <a14:foregroundMark x1="39797" y1="58721" x2="39797" y2="58721"/>
-                        <a14:foregroundMark x1="51524" y1="44767" x2="51524" y2="44767"/>
-                        <a14:foregroundMark x1="58086" y1="43217" x2="58086" y2="43217"/>
-                        <a14:foregroundMark x1="64310" y1="42054" x2="64310" y2="42054"/>
-                        <a14:foregroundMark x1="72142" y1="42442" x2="72142" y2="42442"/>
-                        <a14:foregroundMark x1="78535" y1="42054" x2="78535" y2="42054"/>
-                        <a14:foregroundMark x1="89839" y1="29070" x2="89839" y2="29070"/>
-                        <a14:foregroundMark x1="95809" y1="25194" x2="95809" y2="25194"/>
-                        <a14:foregroundMark x1="99915" y1="24806" x2="99915" y2="24806"/>
-                      </a14:backgroundRemoval>
-                    </a14:imgEffect>
-                  </a14:imgLayer>
-                </a14:imgProps>
-              </a:ext>
-              <a:ext uri="{28A0092B-C50C-407E-A947-70E740481C1C}">
-                <a14:useLocalDpi xmlns:a14="http://schemas.microsoft.com/office/drawing/2010/main" val="0"/>
-              </a:ext>
-            </a:extLst>
-          </a:blip>
-          <a:srcRect/>
-          <a:stretch>
-            <a:fillRect/>
-          </a:stretch>
-        </p:blipFill>
-        <p:spPr bwMode="auto">
-          <a:xfrm>
-            <a:off x="10413546" y="140804"/>
-            <a:ext cx="1641442" cy="358638"/>
-          </a:xfrm>
-          <a:prstGeom prst="rect">
-            <a:avLst/>
-          </a:prstGeom>
-          <a:noFill/>
-          <a:extLst>
-            <a:ext uri="{909E8E84-426E-40DD-AFC4-6F175D3DCCD1}">
-              <a14:hiddenFill xmlns:a14="http://schemas.microsoft.com/office/drawing/2010/main">
-                <a:solidFill>
-                  <a:srgbClr val="FFFFFF"/>
-                </a:solidFill>
-              </a14:hiddenFill>
-            </a:ext>
-          </a:extLst>
-        </p:spPr>
-      </p:pic>
-      <p:sp>
-        <p:nvSpPr>
-          <p:cNvPr id="48" name="Content Placeholder 2">
-            <a:extLst>
-              <a:ext uri="{FF2B5EF4-FFF2-40B4-BE49-F238E27FC236}">
-                <a16:creationId xmlns:a16="http://schemas.microsoft.com/office/drawing/2014/main" id="{B6EEADBC-18EF-4D5E-AD61-A99C29F1EFBF}"/>
-              </a:ext>
-            </a:extLst>
-          </p:cNvPr>
-          <p:cNvSpPr>
-            <a:spLocks noGrp="1"/>
-          </p:cNvSpPr>
-          <p:nvPr>
-            <p:ph idx="1"/>
-          </p:nvPr>
-        </p:nvSpPr>
-        <p:spPr>
-          <a:xfrm>
-            <a:off x="216935" y="1177134"/>
-            <a:ext cx="5879064" cy="3305966"/>
-          </a:xfrm>
-        </p:spPr>
-        <p:txBody>
-          <a:bodyPr>
-            <a:noAutofit/>
-          </a:bodyPr>
-          <a:lstStyle/>
-          <a:p>
-            <a:pPr marL="0" indent="0" algn="just">
-              <a:buNone/>
-            </a:pPr>
-            <a:r>
-              <a:rPr lang="en-GB" sz="1800" b="1" dirty="0"/>
-              <a:t>Tree (hierarchy) traversal methods</a:t>
-            </a:r>
-          </a:p>
-          <a:p>
-            <a:pPr marL="0" indent="0" algn="just">
-              <a:buNone/>
-            </a:pPr>
-            <a:endParaRPr lang="en-GB" sz="1800" b="1" dirty="0"/>
-          </a:p>
-          <a:p>
-            <a:pPr algn="just"/>
-            <a:r>
-              <a:rPr lang="en-GB" sz="1600" b="1" dirty="0" err="1"/>
-              <a:t>Preorder</a:t>
-            </a:r>
-            <a:r>
-              <a:rPr lang="en-GB" sz="1600" b="1" dirty="0"/>
-              <a:t> [D][L][R]</a:t>
-            </a:r>
-          </a:p>
-          <a:p>
-            <a:pPr lvl="1" algn="just"/>
-            <a:endParaRPr lang="en-GB" sz="1600" b="1" dirty="0"/>
-          </a:p>
-          <a:p>
-            <a:pPr algn="just"/>
-            <a:r>
-              <a:rPr lang="en-GB" sz="1600" b="1" dirty="0" err="1"/>
-              <a:t>Inorder</a:t>
-            </a:r>
-            <a:r>
-              <a:rPr lang="en-GB" sz="1600" b="1" dirty="0"/>
-              <a:t> [L][D][R]</a:t>
-            </a:r>
-          </a:p>
-          <a:p>
-            <a:pPr lvl="1" algn="just"/>
-            <a:endParaRPr lang="en-GB" sz="1600" b="1" dirty="0"/>
-          </a:p>
-          <a:p>
-            <a:pPr algn="just"/>
-            <a:r>
-              <a:rPr lang="en-GB" sz="1600" b="1" dirty="0" err="1"/>
-              <a:t>Postorder</a:t>
-            </a:r>
-            <a:r>
-              <a:rPr lang="en-GB" sz="1600" b="1" dirty="0"/>
-              <a:t> [L][R][D]</a:t>
-            </a:r>
-          </a:p>
-          <a:p>
-            <a:pPr lvl="1" algn="just"/>
-            <a:r>
-              <a:rPr lang="en-GB" sz="1800" dirty="0">
-                <a:solidFill>
-                  <a:srgbClr val="00B050"/>
-                </a:solidFill>
-              </a:rPr>
-              <a:t>Vertex</a:t>
-            </a:r>
-            <a:r>
-              <a:rPr lang="en-GB" sz="1800" dirty="0"/>
-              <a:t> placement, then next </a:t>
-            </a:r>
-            <a:r>
-              <a:rPr lang="en-GB" sz="1800" dirty="0">
-                <a:solidFill>
-                  <a:srgbClr val="00B050"/>
-                </a:solidFill>
-              </a:rPr>
-              <a:t>vertex</a:t>
-            </a:r>
-            <a:r>
-              <a:rPr lang="en-GB" sz="1800" dirty="0"/>
-              <a:t> placement, then next </a:t>
-            </a:r>
-            <a:r>
-              <a:rPr lang="en-GB" sz="1800" dirty="0">
-                <a:solidFill>
-                  <a:srgbClr val="00B050"/>
-                </a:solidFill>
-              </a:rPr>
-              <a:t>vertex</a:t>
-            </a:r>
-            <a:r>
-              <a:rPr lang="en-GB" sz="1800" dirty="0"/>
-              <a:t> placement, … , finally </a:t>
-            </a:r>
-            <a:r>
-              <a:rPr lang="en-GB" sz="1800" dirty="0">
-                <a:solidFill>
-                  <a:srgbClr val="00B0F0"/>
-                </a:solidFill>
-              </a:rPr>
-              <a:t>group</a:t>
-            </a:r>
-            <a:r>
-              <a:rPr lang="en-GB" sz="1800" dirty="0"/>
-              <a:t> </a:t>
-            </a:r>
-            <a:r>
-              <a:rPr lang="en-GB" sz="1800" dirty="0" err="1"/>
-              <a:t>placment</a:t>
-            </a:r>
-            <a:endParaRPr lang="en-GB" sz="1800" dirty="0"/>
-          </a:p>
-          <a:p>
-            <a:pPr lvl="1" algn="just"/>
-            <a:endParaRPr lang="en-GB" sz="1800" dirty="0"/>
-          </a:p>
-          <a:p>
-            <a:pPr algn="just"/>
-            <a:endParaRPr lang="en-GB" sz="1800" dirty="0"/>
-          </a:p>
-        </p:txBody>
-      </p:sp>
-      <p:grpSp>
-        <p:nvGrpSpPr>
-          <p:cNvPr id="4" name="Gruppieren 3"/>
-          <p:cNvGrpSpPr/>
-          <p:nvPr/>
-        </p:nvGrpSpPr>
-        <p:grpSpPr>
-          <a:xfrm>
-            <a:off x="7556500" y="483160"/>
-            <a:ext cx="4304845" cy="6374840"/>
-            <a:chOff x="6362700" y="753121"/>
-            <a:chExt cx="3936546" cy="5829444"/>
-          </a:xfrm>
-        </p:grpSpPr>
-        <p:pic>
-          <p:nvPicPr>
-            <p:cNvPr id="3" name="Grafik 2"/>
-            <p:cNvPicPr>
-              <a:picLocks noChangeAspect="1"/>
-            </p:cNvPicPr>
-            <p:nvPr/>
-          </p:nvPicPr>
-          <p:blipFill>
-            <a:blip r:embed="rId4"/>
-            <a:stretch>
-              <a:fillRect/>
-            </a:stretch>
-          </p:blipFill>
-          <p:spPr>
-            <a:xfrm>
-              <a:off x="6362700" y="753121"/>
-              <a:ext cx="3936546" cy="5609579"/>
-            </a:xfrm>
-            <a:prstGeom prst="rect">
-              <a:avLst/>
-            </a:prstGeom>
-          </p:spPr>
-        </p:pic>
-        <p:sp>
-          <p:nvSpPr>
-            <p:cNvPr id="137" name="Content Placeholder 2">
-              <a:extLst>
-                <a:ext uri="{FF2B5EF4-FFF2-40B4-BE49-F238E27FC236}">
-                  <a16:creationId xmlns:a16="http://schemas.microsoft.com/office/drawing/2014/main" id="{B6EEADBC-18EF-4D5E-AD61-A99C29F1EFBF}"/>
-                </a:ext>
-              </a:extLst>
-            </p:cNvPr>
-            <p:cNvSpPr txBox="1">
-              <a:spLocks/>
-            </p:cNvSpPr>
-            <p:nvPr/>
-          </p:nvSpPr>
-          <p:spPr>
-            <a:xfrm>
-              <a:off x="6636040" y="6362700"/>
-              <a:ext cx="3389865" cy="219865"/>
-            </a:xfrm>
-            <a:prstGeom prst="rect">
-              <a:avLst/>
-            </a:prstGeom>
-          </p:spPr>
-          <p:txBody>
-            <a:bodyPr vert="horz" lIns="91440" tIns="45720" rIns="91440" bIns="45720" rtlCol="0">
-              <a:normAutofit/>
-            </a:bodyPr>
-            <a:lstStyle>
-              <a:lvl1pPr marL="228600" indent="-228600" algn="l" defTabSz="914400" rtl="0" eaLnBrk="1" latinLnBrk="0" hangingPunct="1">
-                <a:lnSpc>
-                  <a:spcPct val="90000"/>
-                </a:lnSpc>
-                <a:spcBef>
-                  <a:spcPts val="1000"/>
-                </a:spcBef>
-                <a:buFont typeface="Arial" panose="020B0604020202020204" pitchFamily="34" charset="0"/>
-                <a:buChar char="•"/>
-                <a:defRPr sz="2800" kern="1200">
-                  <a:solidFill>
-                    <a:schemeClr val="tx1"/>
-                  </a:solidFill>
-                  <a:latin typeface="+mn-lt"/>
-                  <a:ea typeface="+mn-ea"/>
-                  <a:cs typeface="+mn-cs"/>
-                </a:defRPr>
-              </a:lvl1pPr>
-              <a:lvl2pPr marL="685800" indent="-228600" algn="l" defTabSz="914400" rtl="0" eaLnBrk="1" latinLnBrk="0" hangingPunct="1">
-                <a:lnSpc>
-                  <a:spcPct val="90000"/>
-                </a:lnSpc>
-                <a:spcBef>
-                  <a:spcPts val="500"/>
-                </a:spcBef>
-                <a:buFont typeface="Arial" panose="020B0604020202020204" pitchFamily="34" charset="0"/>
-                <a:buChar char="•"/>
-                <a:defRPr sz="2400" kern="1200">
-                  <a:solidFill>
-                    <a:schemeClr val="tx1"/>
-                  </a:solidFill>
-                  <a:latin typeface="+mn-lt"/>
-                  <a:ea typeface="+mn-ea"/>
-                  <a:cs typeface="+mn-cs"/>
-                </a:defRPr>
-              </a:lvl2pPr>
-              <a:lvl3pPr marL="1143000" indent="-228600" algn="l" defTabSz="914400" rtl="0" eaLnBrk="1" latinLnBrk="0" hangingPunct="1">
-                <a:lnSpc>
-                  <a:spcPct val="90000"/>
-                </a:lnSpc>
-                <a:spcBef>
-                  <a:spcPts val="500"/>
-                </a:spcBef>
-                <a:buFont typeface="Arial" panose="020B0604020202020204" pitchFamily="34" charset="0"/>
-                <a:buChar char="•"/>
-                <a:defRPr sz="2000" kern="1200">
-                  <a:solidFill>
-                    <a:schemeClr val="tx1"/>
-                  </a:solidFill>
-                  <a:latin typeface="+mn-lt"/>
-                  <a:ea typeface="+mn-ea"/>
-                  <a:cs typeface="+mn-cs"/>
-                </a:defRPr>
-              </a:lvl3pPr>
-              <a:lvl4pPr marL="1600200" indent="-228600" algn="l" defTabSz="914400" rtl="0" eaLnBrk="1" latinLnBrk="0" hangingPunct="1">
-                <a:lnSpc>
-                  <a:spcPct val="90000"/>
-                </a:lnSpc>
-                <a:spcBef>
-                  <a:spcPts val="500"/>
-                </a:spcBef>
-                <a:buFont typeface="Arial" panose="020B0604020202020204" pitchFamily="34" charset="0"/>
-                <a:buChar char="•"/>
-                <a:defRPr sz="1800" kern="1200">
-                  <a:solidFill>
-                    <a:schemeClr val="tx1"/>
-                  </a:solidFill>
-                  <a:latin typeface="+mn-lt"/>
-                  <a:ea typeface="+mn-ea"/>
-                  <a:cs typeface="+mn-cs"/>
-                </a:defRPr>
-              </a:lvl4pPr>
-              <a:lvl5pPr marL="2057400" indent="-228600" algn="l" defTabSz="914400" rtl="0" eaLnBrk="1" latinLnBrk="0" hangingPunct="1">
-                <a:lnSpc>
-                  <a:spcPct val="90000"/>
-                </a:lnSpc>
-                <a:spcBef>
-                  <a:spcPts val="500"/>
-                </a:spcBef>
-                <a:buFont typeface="Arial" panose="020B0604020202020204" pitchFamily="34" charset="0"/>
-                <a:buChar char="•"/>
-                <a:defRPr sz="1800" kern="1200">
-                  <a:solidFill>
-                    <a:schemeClr val="tx1"/>
-                  </a:solidFill>
-                  <a:latin typeface="+mn-lt"/>
-                  <a:ea typeface="+mn-ea"/>
-                  <a:cs typeface="+mn-cs"/>
-                </a:defRPr>
-              </a:lvl5pPr>
-              <a:lvl6pPr marL="2514600" indent="-228600" algn="l" defTabSz="914400" rtl="0" eaLnBrk="1" latinLnBrk="0" hangingPunct="1">
-                <a:lnSpc>
-                  <a:spcPct val="90000"/>
-                </a:lnSpc>
-                <a:spcBef>
-                  <a:spcPts val="500"/>
-                </a:spcBef>
-                <a:buFont typeface="Arial" panose="020B0604020202020204" pitchFamily="34" charset="0"/>
-                <a:buChar char="•"/>
-                <a:defRPr sz="1800" kern="1200">
-                  <a:solidFill>
-                    <a:schemeClr val="tx1"/>
-                  </a:solidFill>
-                  <a:latin typeface="+mn-lt"/>
-                  <a:ea typeface="+mn-ea"/>
-                  <a:cs typeface="+mn-cs"/>
-                </a:defRPr>
-              </a:lvl6pPr>
-              <a:lvl7pPr marL="2971800" indent="-228600" algn="l" defTabSz="914400" rtl="0" eaLnBrk="1" latinLnBrk="0" hangingPunct="1">
-                <a:lnSpc>
-                  <a:spcPct val="90000"/>
-                </a:lnSpc>
-                <a:spcBef>
-                  <a:spcPts val="500"/>
-                </a:spcBef>
-                <a:buFont typeface="Arial" panose="020B0604020202020204" pitchFamily="34" charset="0"/>
-                <a:buChar char="•"/>
-                <a:defRPr sz="1800" kern="1200">
-                  <a:solidFill>
-                    <a:schemeClr val="tx1"/>
-                  </a:solidFill>
-                  <a:latin typeface="+mn-lt"/>
-                  <a:ea typeface="+mn-ea"/>
-                  <a:cs typeface="+mn-cs"/>
-                </a:defRPr>
-              </a:lvl7pPr>
-              <a:lvl8pPr marL="3429000" indent="-228600" algn="l" defTabSz="914400" rtl="0" eaLnBrk="1" latinLnBrk="0" hangingPunct="1">
-                <a:lnSpc>
-                  <a:spcPct val="90000"/>
-                </a:lnSpc>
-                <a:spcBef>
-                  <a:spcPts val="500"/>
-                </a:spcBef>
-                <a:buFont typeface="Arial" panose="020B0604020202020204" pitchFamily="34" charset="0"/>
-                <a:buChar char="•"/>
-                <a:defRPr sz="1800" kern="1200">
-                  <a:solidFill>
-                    <a:schemeClr val="tx1"/>
-                  </a:solidFill>
-                  <a:latin typeface="+mn-lt"/>
-                  <a:ea typeface="+mn-ea"/>
-                  <a:cs typeface="+mn-cs"/>
-                </a:defRPr>
-              </a:lvl8pPr>
-              <a:lvl9pPr marL="3886200" indent="-228600" algn="l" defTabSz="914400" rtl="0" eaLnBrk="1" latinLnBrk="0" hangingPunct="1">
-                <a:lnSpc>
-                  <a:spcPct val="90000"/>
-                </a:lnSpc>
-                <a:spcBef>
-                  <a:spcPts val="500"/>
-                </a:spcBef>
-                <a:buFont typeface="Arial" panose="020B0604020202020204" pitchFamily="34" charset="0"/>
-                <a:buChar char="•"/>
-                <a:defRPr sz="1800" kern="1200">
-                  <a:solidFill>
-                    <a:schemeClr val="tx1"/>
-                  </a:solidFill>
-                  <a:latin typeface="+mn-lt"/>
-                  <a:ea typeface="+mn-ea"/>
-                  <a:cs typeface="+mn-cs"/>
-                </a:defRPr>
-              </a:lvl9pPr>
-            </a:lstStyle>
-            <a:p>
-              <a:pPr marL="0" indent="0" algn="just">
-                <a:buNone/>
-              </a:pPr>
-              <a:r>
-                <a:rPr lang="en-GB" sz="800" dirty="0"/>
-                <a:t>https://medium.com/basecs/demystifying-depth-first-search-a7c14cccf056</a:t>
-              </a:r>
-            </a:p>
-          </p:txBody>
-        </p:sp>
-      </p:grpSp>
-      <p:sp>
-        <p:nvSpPr>
-          <p:cNvPr id="6" name="Pfeil nach rechts 5"/>
-          <p:cNvSpPr/>
-          <p:nvPr/>
-        </p:nvSpPr>
-        <p:spPr>
-          <a:xfrm rot="10800000">
-            <a:off x="2273300" y="3251200"/>
-            <a:ext cx="279400" cy="159462"/>
-          </a:xfrm>
-          <a:prstGeom prst="rightArrow">
-            <a:avLst/>
-          </a:prstGeom>
-          <a:solidFill>
-            <a:srgbClr val="00B050"/>
-          </a:solidFill>
-          <a:ln>
-            <a:solidFill>
-              <a:srgbClr val="00B050"/>
-            </a:solidFill>
-          </a:ln>
-        </p:spPr>
-        <p:style>
-          <a:lnRef idx="2">
-            <a:schemeClr val="accent1">
-              <a:shade val="50000"/>
-            </a:schemeClr>
-          </a:lnRef>
-          <a:fillRef idx="1">
-            <a:schemeClr val="accent1"/>
-          </a:fillRef>
-          <a:effectRef idx="0">
-            <a:schemeClr val="accent1"/>
-          </a:effectRef>
-          <a:fontRef idx="minor">
-            <a:schemeClr val="lt1"/>
-          </a:fontRef>
-        </p:style>
-        <p:txBody>
-          <a:bodyPr rtlCol="0" anchor="ctr"/>
-          <a:lstStyle/>
-          <a:p>
-            <a:pPr algn="ctr"/>
-            <a:endParaRPr lang="de-DE"/>
-          </a:p>
-        </p:txBody>
-      </p:sp>
-    </p:spTree>
-    <p:extLst>
-      <p:ext uri="{BB962C8B-B14F-4D97-AF65-F5344CB8AC3E}">
-        <p14:creationId xmlns:p14="http://schemas.microsoft.com/office/powerpoint/2010/main" val="3365206832"/>
-      </p:ext>
-    </p:extLst>
-  </p:cSld>
-  <p:clrMapOvr>
-    <a:masterClrMapping/>
-  </p:clrMapOvr>
-</p:sld>
-</file>
-
-<file path=ppt/slides/slide9.xml><?xml version="1.0" encoding="utf-8"?>
 <p:sld xmlns:a="http://schemas.openxmlformats.org/drawingml/2006/main" xmlns:r="http://schemas.openxmlformats.org/officeDocument/2006/relationships" xmlns:p="http://schemas.openxmlformats.org/presentationml/2006/main">
   <p:cSld>
     <p:spTree>
@@ -16710,6 +15366,648 @@
   <p:clrMapOvr>
     <a:masterClrMapping/>
   </p:clrMapOvr>
+  <p:timing>
+    <p:tnLst>
+      <p:par>
+        <p:cTn id="1" dur="indefinite" restart="never" nodeType="tmRoot"/>
+      </p:par>
+    </p:tnLst>
+  </p:timing>
+</p:sld>
+</file>
+
+<file path=ppt/slides/slide9.xml><?xml version="1.0" encoding="utf-8"?>
+<p:sld xmlns:a="http://schemas.openxmlformats.org/drawingml/2006/main" xmlns:r="http://schemas.openxmlformats.org/officeDocument/2006/relationships" xmlns:p="http://schemas.openxmlformats.org/presentationml/2006/main">
+  <p:cSld>
+    <p:spTree>
+      <p:nvGrpSpPr>
+        <p:cNvPr id="1" name=""/>
+        <p:cNvGrpSpPr/>
+        <p:nvPr/>
+      </p:nvGrpSpPr>
+      <p:grpSpPr>
+        <a:xfrm>
+          <a:off x="0" y="0"/>
+          <a:ext cx="0" cy="0"/>
+          <a:chOff x="0" y="0"/>
+          <a:chExt cx="0" cy="0"/>
+        </a:xfrm>
+      </p:grpSpPr>
+      <p:sp>
+        <p:nvSpPr>
+          <p:cNvPr id="2" name="Title 1">
+            <a:extLst>
+              <a:ext uri="{FF2B5EF4-FFF2-40B4-BE49-F238E27FC236}">
+                <a16:creationId xmlns:a16="http://schemas.microsoft.com/office/drawing/2014/main" id="{8AEB4669-5D9E-428A-9F10-64DC2B65A45E}"/>
+              </a:ext>
+            </a:extLst>
+          </p:cNvPr>
+          <p:cNvSpPr>
+            <a:spLocks noGrp="1"/>
+          </p:cNvSpPr>
+          <p:nvPr>
+            <p:ph type="title"/>
+          </p:nvPr>
+        </p:nvSpPr>
+        <p:spPr>
+          <a:xfrm>
+            <a:off x="0" y="18255"/>
+            <a:ext cx="12192000" cy="991939"/>
+          </a:xfrm>
+        </p:spPr>
+        <p:txBody>
+          <a:bodyPr>
+            <a:normAutofit/>
+          </a:bodyPr>
+          <a:lstStyle/>
+          <a:p>
+            <a:r>
+              <a:rPr lang="en-US" sz="3200" b="1" dirty="0">
+                <a:solidFill>
+                  <a:srgbClr val="339966"/>
+                </a:solidFill>
+              </a:rPr>
+              <a:t>Issues and challenges</a:t>
+            </a:r>
+            <a:br>
+              <a:rPr lang="en-US" sz="3200" b="1" dirty="0">
+                <a:solidFill>
+                  <a:srgbClr val="339966"/>
+                </a:solidFill>
+              </a:rPr>
+            </a:br>
+            <a:r>
+              <a:rPr lang="en-US" sz="1600" b="1" dirty="0">
+                <a:solidFill>
+                  <a:schemeClr val="bg1">
+                    <a:lumMod val="50000"/>
+                  </a:schemeClr>
+                </a:solidFill>
+              </a:rPr>
+              <a:t>Weekly Sprint 10</a:t>
+            </a:r>
+            <a:endParaRPr lang="en-US" sz="3200" dirty="0">
+              <a:solidFill>
+                <a:schemeClr val="bg1">
+                  <a:lumMod val="50000"/>
+                </a:schemeClr>
+              </a:solidFill>
+            </a:endParaRPr>
+          </a:p>
+        </p:txBody>
+      </p:sp>
+      <p:pic>
+        <p:nvPicPr>
+          <p:cNvPr id="3" name="Picture 2" descr="Image result for gefasoft logo svg">
+            <a:extLst>
+              <a:ext uri="{FF2B5EF4-FFF2-40B4-BE49-F238E27FC236}">
+                <a16:creationId xmlns:a16="http://schemas.microsoft.com/office/drawing/2014/main" id="{5DA2FDA9-D2FA-45F6-9AD2-642CB386E662}"/>
+              </a:ext>
+            </a:extLst>
+          </p:cNvPr>
+          <p:cNvPicPr>
+            <a:picLocks noChangeAspect="1" noChangeArrowheads="1"/>
+          </p:cNvPicPr>
+          <p:nvPr/>
+        </p:nvPicPr>
+        <p:blipFill>
+          <a:blip r:embed="rId2" cstate="hqprint">
+            <a:extLst>
+              <a:ext uri="{BEBA8EAE-BF5A-486C-A8C5-ECC9F3942E4B}">
+                <a14:imgProps xmlns:a14="http://schemas.microsoft.com/office/drawing/2010/main">
+                  <a14:imgLayer r:embed="rId3">
+                    <a14:imgEffect>
+                      <a14:backgroundRemoval t="9109" b="95736" l="1482" r="99915">
+                        <a14:foregroundMark x1="19094" y1="9496" x2="19094" y2="9496"/>
+                        <a14:foregroundMark x1="4742" y1="19186" x2="4742" y2="19186"/>
+                        <a14:foregroundMark x1="1566" y1="45930" x2="1566" y2="45930"/>
+                        <a14:foregroundMark x1="20152" y1="96124" x2="20152" y2="96124"/>
+                        <a14:foregroundMark x1="39797" y1="58721" x2="39797" y2="58721"/>
+                        <a14:foregroundMark x1="51524" y1="44767" x2="51524" y2="44767"/>
+                        <a14:foregroundMark x1="58086" y1="43217" x2="58086" y2="43217"/>
+                        <a14:foregroundMark x1="64310" y1="42054" x2="64310" y2="42054"/>
+                        <a14:foregroundMark x1="72142" y1="42442" x2="72142" y2="42442"/>
+                        <a14:foregroundMark x1="78535" y1="42054" x2="78535" y2="42054"/>
+                        <a14:foregroundMark x1="89839" y1="29070" x2="89839" y2="29070"/>
+                        <a14:foregroundMark x1="95809" y1="25194" x2="95809" y2="25194"/>
+                        <a14:foregroundMark x1="99915" y1="24806" x2="99915" y2="24806"/>
+                      </a14:backgroundRemoval>
+                    </a14:imgEffect>
+                  </a14:imgLayer>
+                </a14:imgProps>
+              </a:ext>
+              <a:ext uri="{28A0092B-C50C-407E-A947-70E740481C1C}">
+                <a14:useLocalDpi xmlns:a14="http://schemas.microsoft.com/office/drawing/2010/main" val="0"/>
+              </a:ext>
+            </a:extLst>
+          </a:blip>
+          <a:srcRect/>
+          <a:stretch>
+            <a:fillRect/>
+          </a:stretch>
+        </p:blipFill>
+        <p:spPr bwMode="auto">
+          <a:xfrm>
+            <a:off x="10413546" y="140804"/>
+            <a:ext cx="1641442" cy="358638"/>
+          </a:xfrm>
+          <a:prstGeom prst="rect">
+            <a:avLst/>
+          </a:prstGeom>
+          <a:noFill/>
+          <a:extLst>
+            <a:ext uri="{909E8E84-426E-40DD-AFC4-6F175D3DCCD1}">
+              <a14:hiddenFill xmlns:a14="http://schemas.microsoft.com/office/drawing/2010/main">
+                <a:solidFill>
+                  <a:srgbClr val="FFFFFF"/>
+                </a:solidFill>
+              </a14:hiddenFill>
+            </a:ext>
+          </a:extLst>
+        </p:spPr>
+      </p:pic>
+      <p:sp>
+        <p:nvSpPr>
+          <p:cNvPr id="4" name="Content Placeholder 2">
+            <a:extLst>
+              <a:ext uri="{FF2B5EF4-FFF2-40B4-BE49-F238E27FC236}">
+                <a16:creationId xmlns:a16="http://schemas.microsoft.com/office/drawing/2014/main" id="{B056E6DA-8F2D-4F02-95E0-EB7B6F24C8A6}"/>
+              </a:ext>
+            </a:extLst>
+          </p:cNvPr>
+          <p:cNvSpPr>
+            <a:spLocks noGrp="1"/>
+          </p:cNvSpPr>
+          <p:nvPr>
+            <p:ph idx="1"/>
+          </p:nvPr>
+        </p:nvSpPr>
+        <p:spPr>
+          <a:xfrm>
+            <a:off x="476363" y="1126808"/>
+            <a:ext cx="10890771" cy="5548309"/>
+          </a:xfrm>
+        </p:spPr>
+        <p:txBody>
+          <a:bodyPr/>
+          <a:lstStyle/>
+          <a:p>
+            <a:endParaRPr lang="en-US" sz="2000" dirty="0"/>
+          </a:p>
+          <a:p>
+            <a:endParaRPr lang="en-US" sz="2000" dirty="0"/>
+          </a:p>
+          <a:p>
+            <a:endParaRPr lang="en-US" sz="2000" dirty="0"/>
+          </a:p>
+        </p:txBody>
+      </p:sp>
+      <p:sp>
+        <p:nvSpPr>
+          <p:cNvPr id="5" name="Content Placeholder 2">
+            <a:extLst>
+              <a:ext uri="{FF2B5EF4-FFF2-40B4-BE49-F238E27FC236}">
+                <a16:creationId xmlns:a16="http://schemas.microsoft.com/office/drawing/2014/main" id="{B6EEADBC-18EF-4D5E-AD61-A99C29F1EFBF}"/>
+              </a:ext>
+            </a:extLst>
+          </p:cNvPr>
+          <p:cNvSpPr txBox="1">
+            <a:spLocks/>
+          </p:cNvSpPr>
+          <p:nvPr/>
+        </p:nvSpPr>
+        <p:spPr>
+          <a:xfrm>
+            <a:off x="374876" y="1126808"/>
+            <a:ext cx="5879064" cy="1690478"/>
+          </a:xfrm>
+          <a:prstGeom prst="rect">
+            <a:avLst/>
+          </a:prstGeom>
+        </p:spPr>
+        <p:txBody>
+          <a:bodyPr vert="horz" lIns="91440" tIns="45720" rIns="91440" bIns="45720" rtlCol="0">
+            <a:normAutofit/>
+          </a:bodyPr>
+          <a:lstStyle>
+            <a:lvl1pPr marL="228600" indent="-228600" algn="l" defTabSz="914400" rtl="0" eaLnBrk="1" latinLnBrk="0" hangingPunct="1">
+              <a:lnSpc>
+                <a:spcPct val="90000"/>
+              </a:lnSpc>
+              <a:spcBef>
+                <a:spcPts val="1000"/>
+              </a:spcBef>
+              <a:buFont typeface="Arial" panose="020B0604020202020204" pitchFamily="34" charset="0"/>
+              <a:buChar char="•"/>
+              <a:defRPr sz="2800" kern="1200">
+                <a:solidFill>
+                  <a:schemeClr val="tx1"/>
+                </a:solidFill>
+                <a:latin typeface="+mn-lt"/>
+                <a:ea typeface="+mn-ea"/>
+                <a:cs typeface="+mn-cs"/>
+              </a:defRPr>
+            </a:lvl1pPr>
+            <a:lvl2pPr marL="685800" indent="-228600" algn="l" defTabSz="914400" rtl="0" eaLnBrk="1" latinLnBrk="0" hangingPunct="1">
+              <a:lnSpc>
+                <a:spcPct val="90000"/>
+              </a:lnSpc>
+              <a:spcBef>
+                <a:spcPts val="500"/>
+              </a:spcBef>
+              <a:buFont typeface="Arial" panose="020B0604020202020204" pitchFamily="34" charset="0"/>
+              <a:buChar char="•"/>
+              <a:defRPr sz="2400" kern="1200">
+                <a:solidFill>
+                  <a:schemeClr val="tx1"/>
+                </a:solidFill>
+                <a:latin typeface="+mn-lt"/>
+                <a:ea typeface="+mn-ea"/>
+                <a:cs typeface="+mn-cs"/>
+              </a:defRPr>
+            </a:lvl2pPr>
+            <a:lvl3pPr marL="1143000" indent="-228600" algn="l" defTabSz="914400" rtl="0" eaLnBrk="1" latinLnBrk="0" hangingPunct="1">
+              <a:lnSpc>
+                <a:spcPct val="90000"/>
+              </a:lnSpc>
+              <a:spcBef>
+                <a:spcPts val="500"/>
+              </a:spcBef>
+              <a:buFont typeface="Arial" panose="020B0604020202020204" pitchFamily="34" charset="0"/>
+              <a:buChar char="•"/>
+              <a:defRPr sz="2000" kern="1200">
+                <a:solidFill>
+                  <a:schemeClr val="tx1"/>
+                </a:solidFill>
+                <a:latin typeface="+mn-lt"/>
+                <a:ea typeface="+mn-ea"/>
+                <a:cs typeface="+mn-cs"/>
+              </a:defRPr>
+            </a:lvl3pPr>
+            <a:lvl4pPr marL="1600200" indent="-228600" algn="l" defTabSz="914400" rtl="0" eaLnBrk="1" latinLnBrk="0" hangingPunct="1">
+              <a:lnSpc>
+                <a:spcPct val="90000"/>
+              </a:lnSpc>
+              <a:spcBef>
+                <a:spcPts val="500"/>
+              </a:spcBef>
+              <a:buFont typeface="Arial" panose="020B0604020202020204" pitchFamily="34" charset="0"/>
+              <a:buChar char="•"/>
+              <a:defRPr sz="1800" kern="1200">
+                <a:solidFill>
+                  <a:schemeClr val="tx1"/>
+                </a:solidFill>
+                <a:latin typeface="+mn-lt"/>
+                <a:ea typeface="+mn-ea"/>
+                <a:cs typeface="+mn-cs"/>
+              </a:defRPr>
+            </a:lvl4pPr>
+            <a:lvl5pPr marL="2057400" indent="-228600" algn="l" defTabSz="914400" rtl="0" eaLnBrk="1" latinLnBrk="0" hangingPunct="1">
+              <a:lnSpc>
+                <a:spcPct val="90000"/>
+              </a:lnSpc>
+              <a:spcBef>
+                <a:spcPts val="500"/>
+              </a:spcBef>
+              <a:buFont typeface="Arial" panose="020B0604020202020204" pitchFamily="34" charset="0"/>
+              <a:buChar char="•"/>
+              <a:defRPr sz="1800" kern="1200">
+                <a:solidFill>
+                  <a:schemeClr val="tx1"/>
+                </a:solidFill>
+                <a:latin typeface="+mn-lt"/>
+                <a:ea typeface="+mn-ea"/>
+                <a:cs typeface="+mn-cs"/>
+              </a:defRPr>
+            </a:lvl5pPr>
+            <a:lvl6pPr marL="2514600" indent="-228600" algn="l" defTabSz="914400" rtl="0" eaLnBrk="1" latinLnBrk="0" hangingPunct="1">
+              <a:lnSpc>
+                <a:spcPct val="90000"/>
+              </a:lnSpc>
+              <a:spcBef>
+                <a:spcPts val="500"/>
+              </a:spcBef>
+              <a:buFont typeface="Arial" panose="020B0604020202020204" pitchFamily="34" charset="0"/>
+              <a:buChar char="•"/>
+              <a:defRPr sz="1800" kern="1200">
+                <a:solidFill>
+                  <a:schemeClr val="tx1"/>
+                </a:solidFill>
+                <a:latin typeface="+mn-lt"/>
+                <a:ea typeface="+mn-ea"/>
+                <a:cs typeface="+mn-cs"/>
+              </a:defRPr>
+            </a:lvl6pPr>
+            <a:lvl7pPr marL="2971800" indent="-228600" algn="l" defTabSz="914400" rtl="0" eaLnBrk="1" latinLnBrk="0" hangingPunct="1">
+              <a:lnSpc>
+                <a:spcPct val="90000"/>
+              </a:lnSpc>
+              <a:spcBef>
+                <a:spcPts val="500"/>
+              </a:spcBef>
+              <a:buFont typeface="Arial" panose="020B0604020202020204" pitchFamily="34" charset="0"/>
+              <a:buChar char="•"/>
+              <a:defRPr sz="1800" kern="1200">
+                <a:solidFill>
+                  <a:schemeClr val="tx1"/>
+                </a:solidFill>
+                <a:latin typeface="+mn-lt"/>
+                <a:ea typeface="+mn-ea"/>
+                <a:cs typeface="+mn-cs"/>
+              </a:defRPr>
+            </a:lvl7pPr>
+            <a:lvl8pPr marL="3429000" indent="-228600" algn="l" defTabSz="914400" rtl="0" eaLnBrk="1" latinLnBrk="0" hangingPunct="1">
+              <a:lnSpc>
+                <a:spcPct val="90000"/>
+              </a:lnSpc>
+              <a:spcBef>
+                <a:spcPts val="500"/>
+              </a:spcBef>
+              <a:buFont typeface="Arial" panose="020B0604020202020204" pitchFamily="34" charset="0"/>
+              <a:buChar char="•"/>
+              <a:defRPr sz="1800" kern="1200">
+                <a:solidFill>
+                  <a:schemeClr val="tx1"/>
+                </a:solidFill>
+                <a:latin typeface="+mn-lt"/>
+                <a:ea typeface="+mn-ea"/>
+                <a:cs typeface="+mn-cs"/>
+              </a:defRPr>
+            </a:lvl8pPr>
+            <a:lvl9pPr marL="3886200" indent="-228600" algn="l" defTabSz="914400" rtl="0" eaLnBrk="1" latinLnBrk="0" hangingPunct="1">
+              <a:lnSpc>
+                <a:spcPct val="90000"/>
+              </a:lnSpc>
+              <a:spcBef>
+                <a:spcPts val="500"/>
+              </a:spcBef>
+              <a:buFont typeface="Arial" panose="020B0604020202020204" pitchFamily="34" charset="0"/>
+              <a:buChar char="•"/>
+              <a:defRPr sz="1800" kern="1200">
+                <a:solidFill>
+                  <a:schemeClr val="tx1"/>
+                </a:solidFill>
+                <a:latin typeface="+mn-lt"/>
+                <a:ea typeface="+mn-ea"/>
+                <a:cs typeface="+mn-cs"/>
+              </a:defRPr>
+            </a:lvl9pPr>
+          </a:lstStyle>
+          <a:p>
+            <a:pPr algn="just"/>
+            <a:endParaRPr lang="en-GB" sz="1400" dirty="0"/>
+          </a:p>
+        </p:txBody>
+      </p:sp>
+      <p:sp>
+        <p:nvSpPr>
+          <p:cNvPr id="6" name="Content Placeholder 2">
+            <a:extLst>
+              <a:ext uri="{FF2B5EF4-FFF2-40B4-BE49-F238E27FC236}">
+                <a16:creationId xmlns:a16="http://schemas.microsoft.com/office/drawing/2014/main" id="{B6EEADBC-18EF-4D5E-AD61-A99C29F1EFBF}"/>
+              </a:ext>
+            </a:extLst>
+          </p:cNvPr>
+          <p:cNvSpPr txBox="1">
+            <a:spLocks/>
+          </p:cNvSpPr>
+          <p:nvPr/>
+        </p:nvSpPr>
+        <p:spPr>
+          <a:xfrm>
+            <a:off x="416440" y="1118945"/>
+            <a:ext cx="5879064" cy="4223763"/>
+          </a:xfrm>
+          <a:prstGeom prst="rect">
+            <a:avLst/>
+          </a:prstGeom>
+        </p:spPr>
+        <p:txBody>
+          <a:bodyPr vert="horz" lIns="91440" tIns="45720" rIns="91440" bIns="45720" rtlCol="0">
+            <a:normAutofit/>
+          </a:bodyPr>
+          <a:lstStyle>
+            <a:lvl1pPr marL="228600" indent="-228600" algn="l" defTabSz="914400" rtl="0" eaLnBrk="1" latinLnBrk="0" hangingPunct="1">
+              <a:lnSpc>
+                <a:spcPct val="90000"/>
+              </a:lnSpc>
+              <a:spcBef>
+                <a:spcPts val="1000"/>
+              </a:spcBef>
+              <a:buFont typeface="Arial" panose="020B0604020202020204" pitchFamily="34" charset="0"/>
+              <a:buChar char="•"/>
+              <a:defRPr sz="2800" kern="1200">
+                <a:solidFill>
+                  <a:schemeClr val="tx1"/>
+                </a:solidFill>
+                <a:latin typeface="+mn-lt"/>
+                <a:ea typeface="+mn-ea"/>
+                <a:cs typeface="+mn-cs"/>
+              </a:defRPr>
+            </a:lvl1pPr>
+            <a:lvl2pPr marL="685800" indent="-228600" algn="l" defTabSz="914400" rtl="0" eaLnBrk="1" latinLnBrk="0" hangingPunct="1">
+              <a:lnSpc>
+                <a:spcPct val="90000"/>
+              </a:lnSpc>
+              <a:spcBef>
+                <a:spcPts val="500"/>
+              </a:spcBef>
+              <a:buFont typeface="Arial" panose="020B0604020202020204" pitchFamily="34" charset="0"/>
+              <a:buChar char="•"/>
+              <a:defRPr sz="2400" kern="1200">
+                <a:solidFill>
+                  <a:schemeClr val="tx1"/>
+                </a:solidFill>
+                <a:latin typeface="+mn-lt"/>
+                <a:ea typeface="+mn-ea"/>
+                <a:cs typeface="+mn-cs"/>
+              </a:defRPr>
+            </a:lvl2pPr>
+            <a:lvl3pPr marL="1143000" indent="-228600" algn="l" defTabSz="914400" rtl="0" eaLnBrk="1" latinLnBrk="0" hangingPunct="1">
+              <a:lnSpc>
+                <a:spcPct val="90000"/>
+              </a:lnSpc>
+              <a:spcBef>
+                <a:spcPts val="500"/>
+              </a:spcBef>
+              <a:buFont typeface="Arial" panose="020B0604020202020204" pitchFamily="34" charset="0"/>
+              <a:buChar char="•"/>
+              <a:defRPr sz="2000" kern="1200">
+                <a:solidFill>
+                  <a:schemeClr val="tx1"/>
+                </a:solidFill>
+                <a:latin typeface="+mn-lt"/>
+                <a:ea typeface="+mn-ea"/>
+                <a:cs typeface="+mn-cs"/>
+              </a:defRPr>
+            </a:lvl3pPr>
+            <a:lvl4pPr marL="1600200" indent="-228600" algn="l" defTabSz="914400" rtl="0" eaLnBrk="1" latinLnBrk="0" hangingPunct="1">
+              <a:lnSpc>
+                <a:spcPct val="90000"/>
+              </a:lnSpc>
+              <a:spcBef>
+                <a:spcPts val="500"/>
+              </a:spcBef>
+              <a:buFont typeface="Arial" panose="020B0604020202020204" pitchFamily="34" charset="0"/>
+              <a:buChar char="•"/>
+              <a:defRPr sz="1800" kern="1200">
+                <a:solidFill>
+                  <a:schemeClr val="tx1"/>
+                </a:solidFill>
+                <a:latin typeface="+mn-lt"/>
+                <a:ea typeface="+mn-ea"/>
+                <a:cs typeface="+mn-cs"/>
+              </a:defRPr>
+            </a:lvl4pPr>
+            <a:lvl5pPr marL="2057400" indent="-228600" algn="l" defTabSz="914400" rtl="0" eaLnBrk="1" latinLnBrk="0" hangingPunct="1">
+              <a:lnSpc>
+                <a:spcPct val="90000"/>
+              </a:lnSpc>
+              <a:spcBef>
+                <a:spcPts val="500"/>
+              </a:spcBef>
+              <a:buFont typeface="Arial" panose="020B0604020202020204" pitchFamily="34" charset="0"/>
+              <a:buChar char="•"/>
+              <a:defRPr sz="1800" kern="1200">
+                <a:solidFill>
+                  <a:schemeClr val="tx1"/>
+                </a:solidFill>
+                <a:latin typeface="+mn-lt"/>
+                <a:ea typeface="+mn-ea"/>
+                <a:cs typeface="+mn-cs"/>
+              </a:defRPr>
+            </a:lvl5pPr>
+            <a:lvl6pPr marL="2514600" indent="-228600" algn="l" defTabSz="914400" rtl="0" eaLnBrk="1" latinLnBrk="0" hangingPunct="1">
+              <a:lnSpc>
+                <a:spcPct val="90000"/>
+              </a:lnSpc>
+              <a:spcBef>
+                <a:spcPts val="500"/>
+              </a:spcBef>
+              <a:buFont typeface="Arial" panose="020B0604020202020204" pitchFamily="34" charset="0"/>
+              <a:buChar char="•"/>
+              <a:defRPr sz="1800" kern="1200">
+                <a:solidFill>
+                  <a:schemeClr val="tx1"/>
+                </a:solidFill>
+                <a:latin typeface="+mn-lt"/>
+                <a:ea typeface="+mn-ea"/>
+                <a:cs typeface="+mn-cs"/>
+              </a:defRPr>
+            </a:lvl6pPr>
+            <a:lvl7pPr marL="2971800" indent="-228600" algn="l" defTabSz="914400" rtl="0" eaLnBrk="1" latinLnBrk="0" hangingPunct="1">
+              <a:lnSpc>
+                <a:spcPct val="90000"/>
+              </a:lnSpc>
+              <a:spcBef>
+                <a:spcPts val="500"/>
+              </a:spcBef>
+              <a:buFont typeface="Arial" panose="020B0604020202020204" pitchFamily="34" charset="0"/>
+              <a:buChar char="•"/>
+              <a:defRPr sz="1800" kern="1200">
+                <a:solidFill>
+                  <a:schemeClr val="tx1"/>
+                </a:solidFill>
+                <a:latin typeface="+mn-lt"/>
+                <a:ea typeface="+mn-ea"/>
+                <a:cs typeface="+mn-cs"/>
+              </a:defRPr>
+            </a:lvl7pPr>
+            <a:lvl8pPr marL="3429000" indent="-228600" algn="l" defTabSz="914400" rtl="0" eaLnBrk="1" latinLnBrk="0" hangingPunct="1">
+              <a:lnSpc>
+                <a:spcPct val="90000"/>
+              </a:lnSpc>
+              <a:spcBef>
+                <a:spcPts val="500"/>
+              </a:spcBef>
+              <a:buFont typeface="Arial" panose="020B0604020202020204" pitchFamily="34" charset="0"/>
+              <a:buChar char="•"/>
+              <a:defRPr sz="1800" kern="1200">
+                <a:solidFill>
+                  <a:schemeClr val="tx1"/>
+                </a:solidFill>
+                <a:latin typeface="+mn-lt"/>
+                <a:ea typeface="+mn-ea"/>
+                <a:cs typeface="+mn-cs"/>
+              </a:defRPr>
+            </a:lvl8pPr>
+            <a:lvl9pPr marL="3886200" indent="-228600" algn="l" defTabSz="914400" rtl="0" eaLnBrk="1" latinLnBrk="0" hangingPunct="1">
+              <a:lnSpc>
+                <a:spcPct val="90000"/>
+              </a:lnSpc>
+              <a:spcBef>
+                <a:spcPts val="500"/>
+              </a:spcBef>
+              <a:buFont typeface="Arial" panose="020B0604020202020204" pitchFamily="34" charset="0"/>
+              <a:buChar char="•"/>
+              <a:defRPr sz="1800" kern="1200">
+                <a:solidFill>
+                  <a:schemeClr val="tx1"/>
+                </a:solidFill>
+                <a:latin typeface="+mn-lt"/>
+                <a:ea typeface="+mn-ea"/>
+                <a:cs typeface="+mn-cs"/>
+              </a:defRPr>
+            </a:lvl9pPr>
+          </a:lstStyle>
+          <a:p>
+            <a:pPr marL="0" indent="0" algn="just">
+              <a:buFont typeface="Arial" panose="020B0604020202020204" pitchFamily="34" charset="0"/>
+              <a:buNone/>
+            </a:pPr>
+            <a:r>
+              <a:rPr lang="en-GB" sz="2400" b="1" dirty="0" smtClean="0"/>
+              <a:t>Finish </a:t>
+            </a:r>
+          </a:p>
+          <a:p>
+            <a:pPr algn="just"/>
+            <a:r>
+              <a:rPr lang="en-GB" sz="2000" dirty="0" smtClean="0"/>
+              <a:t>Connection to Database</a:t>
+            </a:r>
+          </a:p>
+          <a:p>
+            <a:pPr lvl="1" algn="just"/>
+            <a:r>
+              <a:rPr lang="en-GB" sz="1600" dirty="0" smtClean="0"/>
+              <a:t>Problem: Tables not in repository</a:t>
+            </a:r>
+          </a:p>
+          <a:p>
+            <a:pPr lvl="1" algn="just"/>
+            <a:r>
+              <a:rPr lang="en-GB" sz="1600" dirty="0" smtClean="0"/>
+              <a:t>Solution: Added tables to Repository</a:t>
+            </a:r>
+          </a:p>
+          <a:p>
+            <a:pPr algn="just"/>
+            <a:endParaRPr lang="en-GB" sz="2000" dirty="0"/>
+          </a:p>
+          <a:p>
+            <a:pPr algn="just"/>
+            <a:endParaRPr lang="en-GB" sz="1400" dirty="0"/>
+          </a:p>
+        </p:txBody>
+      </p:sp>
+    </p:spTree>
+    <p:extLst>
+      <p:ext uri="{BB962C8B-B14F-4D97-AF65-F5344CB8AC3E}">
+        <p14:creationId xmlns:p14="http://schemas.microsoft.com/office/powerpoint/2010/main" val="2843521589"/>
+      </p:ext>
+    </p:extLst>
+  </p:cSld>
+  <p:clrMapOvr>
+    <a:masterClrMapping/>
+  </p:clrMapOvr>
+  <p:timing>
+    <p:tnLst>
+      <p:par>
+        <p:cTn id="1" dur="indefinite" restart="never" nodeType="tmRoot"/>
+      </p:par>
+    </p:tnLst>
+  </p:timing>
 </p:sld>
 </file>
 

</xml_diff>

<commit_message>
Updates Code/app/components and Code/app/templates.
</commit_message>
<xml_diff>
--- a/3 Entwicklungsphase/weekly_meeting_10.pptx
+++ b/3 Entwicklungsphase/weekly_meeting_10.pptx
@@ -323,7 +323,7 @@
           <a:p>
             <a:fld id="{99293C7F-59EB-4A3A-A30C-171723B2F31C}" type="slidenum">
               <a:rPr lang="en-US" smtClean="0"/>
-              <a:t>‹Nr.›</a:t>
+              <a:t>‹#›</a:t>
             </a:fld>
             <a:endParaRPr lang="en-US"/>
           </a:p>
@@ -521,7 +521,7 @@
           <a:p>
             <a:fld id="{99293C7F-59EB-4A3A-A30C-171723B2F31C}" type="slidenum">
               <a:rPr lang="en-US" smtClean="0"/>
-              <a:t>‹Nr.›</a:t>
+              <a:t>‹#›</a:t>
             </a:fld>
             <a:endParaRPr lang="en-US"/>
           </a:p>
@@ -729,7 +729,7 @@
           <a:p>
             <a:fld id="{99293C7F-59EB-4A3A-A30C-171723B2F31C}" type="slidenum">
               <a:rPr lang="en-US" smtClean="0"/>
-              <a:t>‹Nr.›</a:t>
+              <a:t>‹#›</a:t>
             </a:fld>
             <a:endParaRPr lang="en-US"/>
           </a:p>
@@ -927,7 +927,7 @@
           <a:p>
             <a:fld id="{99293C7F-59EB-4A3A-A30C-171723B2F31C}" type="slidenum">
               <a:rPr lang="en-US" smtClean="0"/>
-              <a:t>‹Nr.›</a:t>
+              <a:t>‹#›</a:t>
             </a:fld>
             <a:endParaRPr lang="en-US"/>
           </a:p>
@@ -1202,7 +1202,7 @@
           <a:p>
             <a:fld id="{99293C7F-59EB-4A3A-A30C-171723B2F31C}" type="slidenum">
               <a:rPr lang="en-US" smtClean="0"/>
-              <a:t>‹Nr.›</a:t>
+              <a:t>‹#›</a:t>
             </a:fld>
             <a:endParaRPr lang="en-US"/>
           </a:p>
@@ -1467,7 +1467,7 @@
           <a:p>
             <a:fld id="{99293C7F-59EB-4A3A-A30C-171723B2F31C}" type="slidenum">
               <a:rPr lang="en-US" smtClean="0"/>
-              <a:t>‹Nr.›</a:t>
+              <a:t>‹#›</a:t>
             </a:fld>
             <a:endParaRPr lang="en-US"/>
           </a:p>
@@ -1879,7 +1879,7 @@
           <a:p>
             <a:fld id="{99293C7F-59EB-4A3A-A30C-171723B2F31C}" type="slidenum">
               <a:rPr lang="en-US" smtClean="0"/>
-              <a:t>‹Nr.›</a:t>
+              <a:t>‹#›</a:t>
             </a:fld>
             <a:endParaRPr lang="en-US"/>
           </a:p>
@@ -2020,7 +2020,7 @@
           <a:p>
             <a:fld id="{99293C7F-59EB-4A3A-A30C-171723B2F31C}" type="slidenum">
               <a:rPr lang="en-US" smtClean="0"/>
-              <a:t>‹Nr.›</a:t>
+              <a:t>‹#›</a:t>
             </a:fld>
             <a:endParaRPr lang="en-US"/>
           </a:p>
@@ -2133,7 +2133,7 @@
           <a:p>
             <a:fld id="{99293C7F-59EB-4A3A-A30C-171723B2F31C}" type="slidenum">
               <a:rPr lang="en-US" smtClean="0"/>
-              <a:t>‹Nr.›</a:t>
+              <a:t>‹#›</a:t>
             </a:fld>
             <a:endParaRPr lang="en-US"/>
           </a:p>
@@ -2444,7 +2444,7 @@
           <a:p>
             <a:fld id="{99293C7F-59EB-4A3A-A30C-171723B2F31C}" type="slidenum">
               <a:rPr lang="en-US" smtClean="0"/>
-              <a:t>‹Nr.›</a:t>
+              <a:t>‹#›</a:t>
             </a:fld>
             <a:endParaRPr lang="en-US"/>
           </a:p>
@@ -2732,7 +2732,7 @@
           <a:p>
             <a:fld id="{99293C7F-59EB-4A3A-A30C-171723B2F31C}" type="slidenum">
               <a:rPr lang="en-US" smtClean="0"/>
-              <a:t>‹Nr.›</a:t>
+              <a:t>‹#›</a:t>
             </a:fld>
             <a:endParaRPr lang="en-US"/>
           </a:p>
@@ -3009,7 +3009,7 @@
           <a:p>
             <a:fld id="{99293C7F-59EB-4A3A-A30C-171723B2F31C}" type="slidenum">
               <a:rPr lang="en-US" smtClean="0"/>
-              <a:t>‹Nr.›</a:t>
+              <a:t>‹#›</a:t>
             </a:fld>
             <a:endParaRPr lang="en-US"/>
           </a:p>
@@ -3558,13 +3558,6 @@
   <p:clrMapOvr>
     <a:masterClrMapping/>
   </p:clrMapOvr>
-  <p:timing>
-    <p:tnLst>
-      <p:par>
-        <p:cTn id="1" dur="indefinite" restart="never" nodeType="tmRoot"/>
-      </p:par>
-    </p:tnLst>
-  </p:timing>
 </p:sld>
 </file>
 
@@ -3619,7 +3612,15 @@
                   <a:srgbClr val="339966"/>
                 </a:solidFill>
               </a:rPr>
-              <a:t>Next Sprint</a:t>
+              <a:t>Next Sprint – </a:t>
+            </a:r>
+            <a:r>
+              <a:rPr lang="en-US" sz="3200" b="1" dirty="0" err="1">
+                <a:solidFill>
+                  <a:srgbClr val="339966"/>
+                </a:solidFill>
+              </a:rPr>
+              <a:t>ToDos</a:t>
             </a:r>
             <a:br>
               <a:rPr lang="en-US" sz="3200" b="1" dirty="0">
@@ -3736,97 +3737,283 @@
         </p:nvSpPr>
         <p:spPr>
           <a:xfrm>
-            <a:off x="416440" y="1118945"/>
-            <a:ext cx="5879064" cy="4223763"/>
+            <a:off x="610225" y="1305007"/>
+            <a:ext cx="10949976" cy="5156349"/>
           </a:xfrm>
         </p:spPr>
         <p:txBody>
           <a:bodyPr>
-            <a:normAutofit/>
+            <a:normAutofit fontScale="92500" lnSpcReduction="10000"/>
           </a:bodyPr>
           <a:lstStyle/>
           <a:p>
-            <a:pPr marL="0" indent="0" algn="just">
-              <a:buNone/>
+            <a:pPr algn="just">
+              <a:buClr>
+                <a:srgbClr val="FFC000"/>
+              </a:buClr>
+              <a:buFont typeface="Wingdings" panose="05000000000000000000" pitchFamily="2" charset="2"/>
+              <a:buChar char="§"/>
             </a:pPr>
             <a:r>
-              <a:rPr lang="en-GB" sz="2400" b="1" dirty="0" smtClean="0"/>
-              <a:t>Finish </a:t>
-            </a:r>
-            <a:endParaRPr lang="en-GB" sz="2400" b="1" dirty="0"/>
-          </a:p>
-          <a:p>
-            <a:pPr algn="just"/>
-            <a:r>
-              <a:rPr lang="en-GB" sz="2000" dirty="0" err="1" smtClean="0"/>
+              <a:rPr lang="en-GB" sz="2000" dirty="0" err="1"/>
               <a:t>Boardlet</a:t>
             </a:r>
             <a:r>
-              <a:rPr lang="en-GB" sz="2000" dirty="0" smtClean="0"/>
+              <a:rPr lang="en-GB" sz="2000" dirty="0"/>
               <a:t> Design</a:t>
             </a:r>
           </a:p>
           <a:p>
-            <a:pPr lvl="1" algn="just"/>
-            <a:r>
-              <a:rPr lang="en-GB" sz="1600" dirty="0" smtClean="0"/>
-              <a:t>Fix floating buttons (side-by-side)</a:t>
-            </a:r>
-            <a:endParaRPr lang="en-GB" sz="1600" dirty="0" smtClean="0"/>
-          </a:p>
-          <a:p>
-            <a:pPr algn="just"/>
-            <a:r>
-              <a:rPr lang="en-GB" sz="2000" dirty="0" smtClean="0"/>
+            <a:pPr lvl="1" algn="just">
+              <a:buClr>
+                <a:srgbClr val="FFC000"/>
+              </a:buClr>
+              <a:buFont typeface="Wingdings" panose="05000000000000000000" pitchFamily="2" charset="2"/>
+              <a:buChar char="§"/>
+            </a:pPr>
+            <a:r>
+              <a:rPr lang="en-GB" sz="1600" dirty="0"/>
+              <a:t>Fix floating buttons (side-by-side) </a:t>
+            </a:r>
+          </a:p>
+          <a:p>
+            <a:pPr lvl="1" algn="just">
+              <a:buClr>
+                <a:srgbClr val="FFC000"/>
+              </a:buClr>
+              <a:buFont typeface="Wingdings" panose="05000000000000000000" pitchFamily="2" charset="2"/>
+              <a:buChar char="§"/>
+            </a:pPr>
+            <a:r>
+              <a:rPr lang="en-GB" sz="1600" dirty="0"/>
+              <a:t>Root node selection also for multiple (with </a:t>
+            </a:r>
+            <a:r>
+              <a:rPr lang="en-GB" sz="1600" dirty="0" err="1"/>
+              <a:t>parameters.nodeList</a:t>
+            </a:r>
+            <a:r>
+              <a:rPr lang="en-GB" sz="1600" dirty="0"/>
+              <a:t>)</a:t>
+            </a:r>
+          </a:p>
+          <a:p>
+            <a:pPr lvl="1" algn="just">
+              <a:buClr>
+                <a:srgbClr val="FFC000"/>
+              </a:buClr>
+              <a:buFont typeface="Wingdings" panose="05000000000000000000" pitchFamily="2" charset="2"/>
+              <a:buChar char="§"/>
+            </a:pPr>
+            <a:r>
+              <a:rPr lang="en-GB" sz="1600" dirty="0"/>
+              <a:t>Design of root-node-selection input field</a:t>
+            </a:r>
+          </a:p>
+          <a:p>
+            <a:pPr algn="just">
+              <a:buClr>
+                <a:srgbClr val="FFC000"/>
+              </a:buClr>
+              <a:buFont typeface="Wingdings" panose="05000000000000000000" pitchFamily="2" charset="2"/>
+              <a:buChar char="§"/>
+            </a:pPr>
+            <a:r>
+              <a:rPr lang="en-GB" sz="2000" dirty="0"/>
+              <a:t>Build Hierarchy Function</a:t>
+            </a:r>
+          </a:p>
+          <a:p>
+            <a:pPr lvl="1" algn="just">
+              <a:buClr>
+                <a:srgbClr val="FFC000"/>
+              </a:buClr>
+              <a:buFont typeface="Wingdings" panose="05000000000000000000" pitchFamily="2" charset="2"/>
+              <a:buChar char="§"/>
+            </a:pPr>
+            <a:r>
+              <a:rPr lang="en-GB" sz="1600" dirty="0"/>
+              <a:t>Fix to start from selected root node (to work out for multiple)</a:t>
+            </a:r>
+          </a:p>
+          <a:p>
+            <a:pPr algn="just">
+              <a:buClr>
+                <a:srgbClr val="FFC000"/>
+              </a:buClr>
+              <a:buFont typeface="Wingdings" panose="05000000000000000000" pitchFamily="2" charset="2"/>
+              <a:buChar char="§"/>
+            </a:pPr>
+            <a:r>
+              <a:rPr lang="en-GB" sz="2000" dirty="0"/>
               <a:t>Database queries</a:t>
             </a:r>
           </a:p>
           <a:p>
-            <a:pPr lvl="1" algn="just"/>
+            <a:pPr lvl="1" algn="just">
+              <a:buClr>
+                <a:srgbClr val="FFC000"/>
+              </a:buClr>
+              <a:buFont typeface="Wingdings" panose="05000000000000000000" pitchFamily="2" charset="2"/>
+              <a:buChar char="§"/>
+            </a:pPr>
             <a:r>
               <a:rPr lang="en-GB" sz="1600" dirty="0"/>
-              <a:t>Nodes</a:t>
-            </a:r>
-          </a:p>
-          <a:p>
-            <a:pPr lvl="1" algn="just"/>
+              <a:t>Connect remaining tables to repository with LC2 (instructions in daily-routine notes)</a:t>
+            </a:r>
+          </a:p>
+          <a:p>
+            <a:pPr lvl="1" algn="just">
+              <a:buClr>
+                <a:srgbClr val="FFC000"/>
+              </a:buClr>
+              <a:buFont typeface="Wingdings" panose="05000000000000000000" pitchFamily="2" charset="2"/>
+              <a:buChar char="§"/>
+            </a:pPr>
+            <a:r>
+              <a:rPr lang="en-GB" sz="1600" dirty="0" err="1"/>
+              <a:t>getData</a:t>
+            </a:r>
             <a:r>
               <a:rPr lang="en-GB" sz="1600" dirty="0"/>
-              <a:t>Connections</a:t>
-            </a:r>
-          </a:p>
-          <a:p>
-            <a:pPr lvl="1" algn="just"/>
+              <a:t>() generic Function</a:t>
+            </a:r>
+          </a:p>
+          <a:p>
+            <a:pPr lvl="1" algn="just">
+              <a:buClr>
+                <a:srgbClr val="FFC000"/>
+              </a:buClr>
+              <a:buFont typeface="Wingdings" panose="05000000000000000000" pitchFamily="2" charset="2"/>
+              <a:buChar char="§"/>
+            </a:pPr>
+            <a:r>
+              <a:rPr lang="en-GB" sz="1600" dirty="0" err="1"/>
+              <a:t>pidRootNode</a:t>
+            </a:r>
             <a:r>
               <a:rPr lang="en-GB" sz="1600" dirty="0"/>
-              <a:t>Process Variables</a:t>
-            </a:r>
-          </a:p>
-          <a:p>
-            <a:pPr algn="just"/>
-            <a:r>
-              <a:rPr lang="en-GB" sz="2000" dirty="0" smtClean="0"/>
-              <a:t>Graph layout algorithm</a:t>
-            </a:r>
-          </a:p>
-          <a:p>
-            <a:pPr algn="just"/>
-            <a:r>
-              <a:rPr lang="en-GB" sz="2000" dirty="0" smtClean="0"/>
+              <a:t> name query (to display in input field on </a:t>
+            </a:r>
+            <a:r>
+              <a:rPr lang="en-GB" sz="1600" dirty="0" err="1"/>
+              <a:t>updateInput</a:t>
+            </a:r>
+            <a:r>
+              <a:rPr lang="en-GB" sz="1600" dirty="0"/>
+              <a:t>())</a:t>
+            </a:r>
+          </a:p>
+          <a:p>
+            <a:pPr lvl="1" algn="just">
+              <a:buClr>
+                <a:srgbClr val="FFC000"/>
+              </a:buClr>
+              <a:buFont typeface="Wingdings" panose="05000000000000000000" pitchFamily="2" charset="2"/>
+              <a:buChar char="§"/>
+            </a:pPr>
+            <a:r>
+              <a:rPr lang="en-GB" sz="1600" dirty="0" err="1"/>
+              <a:t>pidNodes</a:t>
+            </a:r>
+            <a:r>
+              <a:rPr lang="en-GB" sz="1600" dirty="0"/>
+              <a:t> parameter definition</a:t>
+            </a:r>
+          </a:p>
+          <a:p>
+            <a:pPr lvl="1" algn="just">
+              <a:buClr>
+                <a:srgbClr val="FFC000"/>
+              </a:buClr>
+              <a:buFont typeface="Wingdings" panose="05000000000000000000" pitchFamily="2" charset="2"/>
+              <a:buChar char="§"/>
+            </a:pPr>
+            <a:r>
+              <a:rPr lang="en-GB" sz="1600" dirty="0" err="1"/>
+              <a:t>pidConnections</a:t>
+            </a:r>
+            <a:r>
+              <a:rPr lang="en-GB" sz="1600" dirty="0"/>
+              <a:t> parameter definition</a:t>
+            </a:r>
+          </a:p>
+          <a:p>
+            <a:pPr lvl="1" algn="just">
+              <a:buClr>
+                <a:srgbClr val="FFC000"/>
+              </a:buClr>
+              <a:buFont typeface="Wingdings" panose="05000000000000000000" pitchFamily="2" charset="2"/>
+              <a:buChar char="§"/>
+            </a:pPr>
+            <a:r>
+              <a:rPr lang="en-GB" sz="1600" dirty="0"/>
+              <a:t>Process Variables parameter definition</a:t>
+            </a:r>
+          </a:p>
+          <a:p>
+            <a:pPr algn="just">
+              <a:buClr>
+                <a:srgbClr val="FFC000"/>
+              </a:buClr>
+              <a:buFont typeface="Wingdings" panose="05000000000000000000" pitchFamily="2" charset="2"/>
+              <a:buChar char="§"/>
+            </a:pPr>
+            <a:r>
+              <a:rPr lang="en-GB" sz="2000" dirty="0"/>
               <a:t>Animations via sapient-bind</a:t>
             </a:r>
           </a:p>
           <a:p>
-            <a:pPr algn="just"/>
-            <a:r>
-              <a:rPr lang="en-GB" sz="2000" dirty="0" smtClean="0"/>
+            <a:pPr algn="just">
+              <a:buClr>
+                <a:srgbClr val="FFC000"/>
+              </a:buClr>
+              <a:buFont typeface="Wingdings" panose="05000000000000000000" pitchFamily="2" charset="2"/>
+              <a:buChar char="§"/>
+            </a:pPr>
+            <a:r>
+              <a:rPr lang="en-GB" sz="2000" dirty="0"/>
               <a:t>Documentation and Commenting</a:t>
             </a:r>
           </a:p>
           <a:p>
-            <a:pPr algn="just"/>
-            <a:r>
-              <a:rPr lang="en-GB" sz="2000" dirty="0" smtClean="0"/>
+            <a:pPr lvl="1" algn="just">
+              <a:buClr>
+                <a:srgbClr val="FFC000"/>
+              </a:buClr>
+              <a:buFont typeface="Wingdings" panose="05000000000000000000" pitchFamily="2" charset="2"/>
+              <a:buChar char="§"/>
+            </a:pPr>
+            <a:r>
+              <a:rPr lang="en-GB" sz="1600" dirty="0"/>
+              <a:t>Modularization of code</a:t>
+            </a:r>
+          </a:p>
+          <a:p>
+            <a:pPr lvl="1" algn="just">
+              <a:buClr>
+                <a:srgbClr val="FFC000"/>
+              </a:buClr>
+              <a:buFont typeface="Wingdings" panose="05000000000000000000" pitchFamily="2" charset="2"/>
+              <a:buChar char="§"/>
+            </a:pPr>
+            <a:r>
+              <a:rPr lang="en-GB" sz="1600" dirty="0" err="1"/>
+              <a:t>JsDocs</a:t>
+            </a:r>
+            <a:endParaRPr lang="en-GB" sz="1600" dirty="0"/>
+          </a:p>
+          <a:p>
+            <a:pPr algn="just">
+              <a:buClr>
+                <a:srgbClr val="FFC000"/>
+              </a:buClr>
+              <a:buFont typeface="Wingdings" panose="05000000000000000000" pitchFamily="2" charset="2"/>
+              <a:buChar char="§"/>
+            </a:pPr>
+            <a:r>
+              <a:rPr lang="en-GB" sz="2000" dirty="0"/>
               <a:t>Testing</a:t>
             </a:r>
           </a:p>
@@ -3850,13 +4037,6 @@
   <p:clrMapOvr>
     <a:masterClrMapping/>
   </p:clrMapOvr>
-  <p:timing>
-    <p:tnLst>
-      <p:par>
-        <p:cTn id="1" dur="indefinite" restart="never" nodeType="tmRoot"/>
-      </p:par>
-    </p:tnLst>
-  </p:timing>
 </p:sld>
 </file>
 
@@ -3906,20 +4086,12 @@
           <a:lstStyle/>
           <a:p>
             <a:r>
-              <a:rPr lang="en-US" sz="3200" b="1" dirty="0" smtClean="0">
+              <a:rPr lang="en-US" sz="3200" b="1" dirty="0">
                 <a:solidFill>
                   <a:srgbClr val="339966"/>
                 </a:solidFill>
               </a:rPr>
-              <a:t>Project </a:t>
-            </a:r>
-            <a:r>
-              <a:rPr lang="en-US" sz="3200" b="1" dirty="0">
-                <a:solidFill>
-                  <a:srgbClr val="339966"/>
-                </a:solidFill>
-              </a:rPr>
-              <a:t>– Overview</a:t>
+              <a:t>Project – Overview</a:t>
             </a:r>
             <a:br>
               <a:rPr lang="en-US" sz="3200" b="1" dirty="0">
@@ -4053,13 +4225,6 @@
   <p:clrMapOvr>
     <a:masterClrMapping/>
   </p:clrMapOvr>
-  <p:timing>
-    <p:tnLst>
-      <p:par>
-        <p:cTn id="1" dur="indefinite" restart="never" nodeType="tmRoot"/>
-      </p:par>
-    </p:tnLst>
-  </p:timing>
 </p:sld>
 </file>
 
@@ -4246,13 +4411,6 @@
   <p:clrMapOvr>
     <a:masterClrMapping/>
   </p:clrMapOvr>
-  <p:timing>
-    <p:tnLst>
-      <p:par>
-        <p:cTn id="1" dur="indefinite" restart="never" nodeType="tmRoot"/>
-      </p:par>
-    </p:tnLst>
-  </p:timing>
 </p:sld>
 </file>
 
@@ -4491,13 +4649,6 @@
   <p:clrMapOvr>
     <a:masterClrMapping/>
   </p:clrMapOvr>
-  <p:timing>
-    <p:tnLst>
-      <p:par>
-        <p:cTn id="1" dur="indefinite" restart="never" nodeType="tmRoot"/>
-      </p:par>
-    </p:tnLst>
-  </p:timing>
 </p:sld>
 </file>
 
@@ -4592,14 +4743,6 @@
               </a:rPr>
               <a:t>Boardlet</a:t>
             </a:r>
-            <a:r>
-              <a:rPr lang="en-US" sz="3200" b="1" dirty="0">
-                <a:solidFill>
-                  <a:srgbClr val="339966"/>
-                </a:solidFill>
-              </a:rPr>
-              <a:t/>
-            </a:r>
             <a:br>
               <a:rPr lang="en-US" sz="3200" b="1" dirty="0">
                 <a:solidFill>
@@ -5158,13 +5301,6 @@
   <p:clrMapOvr>
     <a:masterClrMapping/>
   </p:clrMapOvr>
-  <p:timing>
-    <p:tnLst>
-      <p:par>
-        <p:cTn id="1" dur="indefinite" restart="never" nodeType="tmRoot"/>
-      </p:par>
-    </p:tnLst>
-  </p:timing>
 </p:sld>
 </file>
 
@@ -5403,13 +5539,6 @@
   <p:clrMapOvr>
     <a:masterClrMapping/>
   </p:clrMapOvr>
-  <p:timing>
-    <p:tnLst>
-      <p:par>
-        <p:cTn id="1" dur="indefinite" restart="never" nodeType="tmRoot"/>
-      </p:par>
-    </p:tnLst>
-  </p:timing>
 </p:sld>
 </file>
 
@@ -5505,14 +5634,6 @@
               </a:rPr>
               <a:t>Boardlet</a:t>
             </a:r>
-            <a:r>
-              <a:rPr lang="en-US" sz="3200" b="1" dirty="0">
-                <a:solidFill>
-                  <a:srgbClr val="339966"/>
-                </a:solidFill>
-              </a:rPr>
-              <a:t/>
-            </a:r>
             <a:br>
               <a:rPr lang="en-US" sz="3200" b="1" dirty="0">
                 <a:solidFill>
@@ -5688,13 +5809,6 @@
   <p:clrMapOvr>
     <a:masterClrMapping/>
   </p:clrMapOvr>
-  <p:timing>
-    <p:tnLst>
-      <p:par>
-        <p:cTn id="1" dur="indefinite" restart="never" nodeType="tmRoot"/>
-      </p:par>
-    </p:tnLst>
-  </p:timing>
 </p:sld>
 </file>
 
@@ -11142,13 +11256,6 @@
   <p:clrMapOvr>
     <a:masterClrMapping/>
   </p:clrMapOvr>
-  <p:timing>
-    <p:tnLst>
-      <p:par>
-        <p:cTn id="1" dur="indefinite" restart="never" nodeType="tmRoot"/>
-      </p:par>
-    </p:tnLst>
-  </p:timing>
 </p:sld>
 </file>
 
@@ -15366,13 +15473,6 @@
   <p:clrMapOvr>
     <a:masterClrMapping/>
   </p:clrMapOvr>
-  <p:timing>
-    <p:tnLst>
-      <p:par>
-        <p:cTn id="1" dur="indefinite" restart="never" nodeType="tmRoot"/>
-      </p:par>
-    </p:tnLst>
-  </p:timing>
 </p:sld>
 </file>
 
@@ -15951,34 +16051,24 @@
             </a:lvl9pPr>
           </a:lstStyle>
           <a:p>
-            <a:pPr marL="0" indent="0" algn="just">
-              <a:buFont typeface="Arial" panose="020B0604020202020204" pitchFamily="34" charset="0"/>
-              <a:buNone/>
-            </a:pPr>
-            <a:r>
-              <a:rPr lang="en-GB" sz="2400" b="1" dirty="0" smtClean="0"/>
-              <a:t>Finish </a:t>
-            </a:r>
-          </a:p>
-          <a:p>
             <a:pPr algn="just"/>
             <a:r>
-              <a:rPr lang="en-GB" sz="2000" dirty="0" smtClean="0"/>
+              <a:rPr lang="en-GB" sz="2000" dirty="0"/>
               <a:t>Connection to Database</a:t>
             </a:r>
           </a:p>
           <a:p>
             <a:pPr lvl="1" algn="just"/>
             <a:r>
-              <a:rPr lang="en-GB" sz="1600" dirty="0" smtClean="0"/>
+              <a:rPr lang="en-GB" sz="1600" dirty="0"/>
               <a:t>Problem: Tables not in repository</a:t>
             </a:r>
           </a:p>
           <a:p>
             <a:pPr lvl="1" algn="just"/>
             <a:r>
-              <a:rPr lang="en-GB" sz="1600" dirty="0" smtClean="0"/>
-              <a:t>Solution: Added tables to Repository</a:t>
+              <a:rPr lang="en-GB" sz="1600" dirty="0"/>
+              <a:t>Solution: Added tables to Repository via LC2</a:t>
             </a:r>
           </a:p>
           <a:p>
@@ -16001,13 +16091,6 @@
   <p:clrMapOvr>
     <a:masterClrMapping/>
   </p:clrMapOvr>
-  <p:timing>
-    <p:tnLst>
-      <p:par>
-        <p:cTn id="1" dur="indefinite" restart="never" nodeType="tmRoot"/>
-      </p:par>
-    </p:tnLst>
-  </p:timing>
 </p:sld>
 </file>
 

</xml_diff>